<commit_message>
Add Payment Flow slide to business plan
</commit_message>
<xml_diff>
--- a/pitch/MOTRA-Business-Plan.pptx
+++ b/pitch/MOTRA-Business-Plan.pptx
@@ -27,6 +27,7 @@
     <p:sldId id="275" r:id="rId26"/>
     <p:sldId id="276" r:id="rId27"/>
     <p:sldId id="277" r:id="rId28"/>
+    <p:sldId id="278" r:id="rId29"/>
   </p:sldIdLst>
   <p:sldSz cx="9144000" cy="5143500" type="screen4x3"/>
   <p:notesSz cx="6858000" cy="9144000"/>
@@ -5191,7 +5192,7 @@
               </a:defRPr>
             </a:pPr>
             <a:r>
-              <a:t>Revenue Streams</a:t>
+              <a:t>Payment Flow — How Money Moves</a:t>
             </a:r>
           </a:p>
         </p:txBody>
@@ -5229,253 +5230,238 @@
               </a:defRPr>
             </a:pPr>
             <a:r>
-              <a:t>PER-SERVICE PRICING:</a:t>
-            </a:r>
-          </a:p>
-          <a:p>
-            <a:pPr>
-              <a:spcAft>
-                <a:spcPts val="400"/>
-              </a:spcAft>
-              <a:defRPr sz="1100">
-                <a:solidFill>
-                  <a:srgbClr val="323232"/>
-                </a:solidFill>
-              </a:defRPr>
-            </a:pPr>
-            <a:r>
-              <a:t>• Quick Clean (5-10 min): $12-18</a:t>
-            </a:r>
-          </a:p>
-          <a:p>
-            <a:pPr>
-              <a:spcAft>
-                <a:spcPts val="400"/>
-              </a:spcAft>
-              <a:defRPr sz="1100">
-                <a:solidFill>
-                  <a:srgbClr val="323232"/>
-                </a:solidFill>
-              </a:defRPr>
-            </a:pPr>
-            <a:r>
-              <a:t>• Deep Clean (30-60 min): $45-75</a:t>
-            </a:r>
-          </a:p>
-          <a:p>
-            <a:pPr>
-              <a:spcAft>
-                <a:spcPts val="400"/>
-              </a:spcAft>
-              <a:defRPr sz="1100">
-                <a:solidFill>
-                  <a:srgbClr val="323232"/>
-                </a:solidFill>
-              </a:defRPr>
-            </a:pPr>
-            <a:r>
-              <a:t>• Light Maintenance: $25-50</a:t>
-            </a:r>
-          </a:p>
-          <a:p>
-            <a:pPr>
-              <a:spcAft>
-                <a:spcPts val="400"/>
-              </a:spcAft>
-              <a:defRPr sz="1100">
-                <a:solidFill>
-                  <a:srgbClr val="323232"/>
-                </a:solidFill>
-              </a:defRPr>
-            </a:pPr>
-            <a:r>
-              <a:t>• Emergency Response: $75-150 (premium)</a:t>
-            </a:r>
-          </a:p>
-          <a:p>
-            <a:pPr>
-              <a:spcAft>
-                <a:spcPts val="400"/>
-              </a:spcAft>
-              <a:defRPr sz="1100">
-                <a:solidFill>
-                  <a:srgbClr val="323232"/>
-                </a:solidFill>
-              </a:defRPr>
-            </a:pPr>
-          </a:p>
-          <a:p>
-            <a:pPr>
-              <a:spcAft>
-                <a:spcPts val="400"/>
-              </a:spcAft>
-              <a:defRPr sz="1100">
-                <a:solidFill>
-                  <a:srgbClr val="323232"/>
-                </a:solidFill>
-              </a:defRPr>
-            </a:pPr>
-            <a:r>
-              <a:t>UNIT ECONOMICS:</a:t>
-            </a:r>
-          </a:p>
-          <a:p>
-            <a:pPr>
-              <a:spcAft>
-                <a:spcPts val="400"/>
-              </a:spcAft>
-              <a:defRPr sz="1100">
-                <a:solidFill>
-                  <a:srgbClr val="323232"/>
-                </a:solidFill>
-              </a:defRPr>
-            </a:pPr>
-            <a:r>
-              <a:t>• Average service price: $15</a:t>
-            </a:r>
-          </a:p>
-          <a:p>
-            <a:pPr>
-              <a:spcAft>
-                <a:spcPts val="400"/>
-              </a:spcAft>
-              <a:defRPr sz="1100">
-                <a:solidFill>
-                  <a:srgbClr val="323232"/>
-                </a:solidFill>
-              </a:defRPr>
-            </a:pPr>
-            <a:r>
-              <a:t>• Technician payout: $10-11 (65-70%)</a:t>
-            </a:r>
-          </a:p>
-          <a:p>
-            <a:pPr>
-              <a:spcAft>
-                <a:spcPts val="400"/>
-              </a:spcAft>
-              <a:defRPr sz="1100">
-                <a:solidFill>
-                  <a:srgbClr val="323232"/>
-                </a:solidFill>
-              </a:defRPr>
-            </a:pPr>
-            <a:r>
-              <a:t>• Platform margin: $4-5 (27-33%)</a:t>
-            </a:r>
-          </a:p>
-          <a:p>
-            <a:pPr>
-              <a:spcAft>
-                <a:spcPts val="400"/>
-              </a:spcAft>
-              <a:defRPr sz="1100">
-                <a:solidFill>
-                  <a:srgbClr val="323232"/>
-                </a:solidFill>
-              </a:defRPr>
-            </a:pPr>
-          </a:p>
-          <a:p>
-            <a:pPr>
-              <a:spcAft>
-                <a:spcPts val="400"/>
-              </a:spcAft>
-              <a:defRPr sz="1100">
-                <a:solidFill>
-                  <a:srgbClr val="323232"/>
-                </a:solidFill>
-              </a:defRPr>
-            </a:pPr>
-            <a:r>
-              <a:t>AT SCALE:</a:t>
-            </a:r>
-          </a:p>
-          <a:p>
-            <a:pPr>
-              <a:spcAft>
-                <a:spcPts val="400"/>
-              </a:spcAft>
-              <a:defRPr sz="1100">
-                <a:solidFill>
-                  <a:srgbClr val="323232"/>
-                </a:solidFill>
-              </a:defRPr>
-            </a:pPr>
-            <a:r>
-              <a:t>• 1,000 services/day = $15K revenue, $4-5K margin</a:t>
-            </a:r>
-          </a:p>
-          <a:p>
-            <a:pPr>
-              <a:spcAft>
-                <a:spcPts val="400"/>
-              </a:spcAft>
-              <a:defRPr sz="1100">
-                <a:solidFill>
-                  <a:srgbClr val="323232"/>
-                </a:solidFill>
-              </a:defRPr>
-            </a:pPr>
-            <a:r>
-              <a:t>• 10,000 services/day = $150K revenue, $40-50K margin</a:t>
-            </a:r>
-          </a:p>
-          <a:p>
-            <a:pPr>
-              <a:spcAft>
-                <a:spcPts val="400"/>
-              </a:spcAft>
-              <a:defRPr sz="1100">
-                <a:solidFill>
-                  <a:srgbClr val="323232"/>
-                </a:solidFill>
-              </a:defRPr>
-            </a:pPr>
-          </a:p>
-          <a:p>
-            <a:pPr>
-              <a:spcAft>
-                <a:spcPts val="400"/>
-              </a:spcAft>
-              <a:defRPr sz="1100">
-                <a:solidFill>
-                  <a:srgbClr val="323232"/>
-                </a:solidFill>
-              </a:defRPr>
-            </a:pPr>
-            <a:r>
-              <a:t>ENTERPRISE CONTRACTS:</a:t>
-            </a:r>
-          </a:p>
-          <a:p>
-            <a:pPr>
-              <a:spcAft>
-                <a:spcPts val="400"/>
-              </a:spcAft>
-              <a:defRPr sz="1100">
-                <a:solidFill>
-                  <a:srgbClr val="323232"/>
-                </a:solidFill>
-              </a:defRPr>
-            </a:pPr>
-            <a:r>
-              <a:t>• Volume discounts for committed minimums</a:t>
-            </a:r>
-          </a:p>
-          <a:p>
-            <a:pPr>
-              <a:spcAft>
-                <a:spcPts val="400"/>
-              </a:spcAft>
-              <a:defRPr sz="1100">
-                <a:solidFill>
-                  <a:srgbClr val="323232"/>
-                </a:solidFill>
-              </a:defRPr>
-            </a:pPr>
-            <a:r>
-              <a:t>• SLA guarantees (response time, quality scores)</a:t>
+              <a:t>STEP 1: Fleet Operator (Waymo) pays MOTRA per service</a:t>
+            </a:r>
+          </a:p>
+          <a:p>
+            <a:pPr>
+              <a:spcAft>
+                <a:spcPts val="400"/>
+              </a:spcAft>
+              <a:defRPr sz="1100">
+                <a:solidFill>
+                  <a:srgbClr val="323232"/>
+                </a:solidFill>
+              </a:defRPr>
+            </a:pPr>
+            <a:r>
+              <a:t>    - Invoice monthly or per-service via API</a:t>
+            </a:r>
+          </a:p>
+          <a:p>
+            <a:pPr>
+              <a:spcAft>
+                <a:spcPts val="400"/>
+              </a:spcAft>
+              <a:defRPr sz="1100">
+                <a:solidFill>
+                  <a:srgbClr val="323232"/>
+                </a:solidFill>
+              </a:defRPr>
+            </a:pPr>
+            <a:r>
+              <a:t>    - Enterprise contracts with volume discounts</a:t>
+            </a:r>
+          </a:p>
+          <a:p>
+            <a:pPr>
+              <a:spcAft>
+                <a:spcPts val="400"/>
+              </a:spcAft>
+              <a:defRPr sz="1100">
+                <a:solidFill>
+                  <a:srgbClr val="323232"/>
+                </a:solidFill>
+              </a:defRPr>
+            </a:pPr>
+          </a:p>
+          <a:p>
+            <a:pPr>
+              <a:spcAft>
+                <a:spcPts val="400"/>
+              </a:spcAft>
+              <a:defRPr sz="1100">
+                <a:solidFill>
+                  <a:srgbClr val="323232"/>
+                </a:solidFill>
+              </a:defRPr>
+            </a:pPr>
+            <a:r>
+              <a:t>STEP 2: MOTRA takes platform cut (25-35%)</a:t>
+            </a:r>
+          </a:p>
+          <a:p>
+            <a:pPr>
+              <a:spcAft>
+                <a:spcPts val="400"/>
+              </a:spcAft>
+              <a:defRPr sz="1100">
+                <a:solidFill>
+                  <a:srgbClr val="323232"/>
+                </a:solidFill>
+              </a:defRPr>
+            </a:pPr>
+            <a:r>
+              <a:t>    - Covers: platform, insurance, support, quality assurance</a:t>
+            </a:r>
+          </a:p>
+          <a:p>
+            <a:pPr>
+              <a:spcAft>
+                <a:spcPts val="400"/>
+              </a:spcAft>
+              <a:defRPr sz="1100">
+                <a:solidFill>
+                  <a:srgbClr val="323232"/>
+                </a:solidFill>
+              </a:defRPr>
+            </a:pPr>
+            <a:r>
+              <a:t>    - $4-5 per $15 service</a:t>
+            </a:r>
+          </a:p>
+          <a:p>
+            <a:pPr>
+              <a:spcAft>
+                <a:spcPts val="400"/>
+              </a:spcAft>
+              <a:defRPr sz="1100">
+                <a:solidFill>
+                  <a:srgbClr val="323232"/>
+                </a:solidFill>
+              </a:defRPr>
+            </a:pPr>
+          </a:p>
+          <a:p>
+            <a:pPr>
+              <a:spcAft>
+                <a:spcPts val="400"/>
+              </a:spcAft>
+              <a:defRPr sz="1100">
+                <a:solidFill>
+                  <a:srgbClr val="323232"/>
+                </a:solidFill>
+              </a:defRPr>
+            </a:pPr>
+            <a:r>
+              <a:t>STEP 3: MOTRA pays Technician via app</a:t>
+            </a:r>
+          </a:p>
+          <a:p>
+            <a:pPr>
+              <a:spcAft>
+                <a:spcPts val="400"/>
+              </a:spcAft>
+              <a:defRPr sz="1100">
+                <a:solidFill>
+                  <a:srgbClr val="323232"/>
+                </a:solidFill>
+              </a:defRPr>
+            </a:pPr>
+            <a:r>
+              <a:t>    - 1099 contractor (not Waymo employee)</a:t>
+            </a:r>
+          </a:p>
+          <a:p>
+            <a:pPr>
+              <a:spcAft>
+                <a:spcPts val="400"/>
+              </a:spcAft>
+              <a:defRPr sz="1100">
+                <a:solidFill>
+                  <a:srgbClr val="323232"/>
+                </a:solidFill>
+              </a:defRPr>
+            </a:pPr>
+            <a:r>
+              <a:t>    - $10-11 per service ($15-20/hour effective rate)</a:t>
+            </a:r>
+          </a:p>
+          <a:p>
+            <a:pPr>
+              <a:spcAft>
+                <a:spcPts val="400"/>
+              </a:spcAft>
+              <a:defRPr sz="1100">
+                <a:solidFill>
+                  <a:srgbClr val="323232"/>
+                </a:solidFill>
+              </a:defRPr>
+            </a:pPr>
+            <a:r>
+              <a:t>    - Weekly direct deposit or instant pay option</a:t>
+            </a:r>
+          </a:p>
+          <a:p>
+            <a:pPr>
+              <a:spcAft>
+                <a:spcPts val="400"/>
+              </a:spcAft>
+              <a:defRPr sz="1100">
+                <a:solidFill>
+                  <a:srgbClr val="323232"/>
+                </a:solidFill>
+              </a:defRPr>
+            </a:pPr>
+          </a:p>
+          <a:p>
+            <a:pPr>
+              <a:spcAft>
+                <a:spcPts val="400"/>
+              </a:spcAft>
+              <a:defRPr sz="1100">
+                <a:solidFill>
+                  <a:srgbClr val="323232"/>
+                </a:solidFill>
+              </a:defRPr>
+            </a:pPr>
+            <a:r>
+              <a:t>KEY INSIGHT:</a:t>
+            </a:r>
+          </a:p>
+          <a:p>
+            <a:pPr>
+              <a:spcAft>
+                <a:spcPts val="400"/>
+              </a:spcAft>
+              <a:defRPr sz="1100">
+                <a:solidFill>
+                  <a:srgbClr val="323232"/>
+                </a:solidFill>
+              </a:defRPr>
+            </a:pPr>
+            <a:r>
+              <a:t>Waymo gets ONE vendor, ONE invoice, ZERO worker management</a:t>
+            </a:r>
+          </a:p>
+          <a:p>
+            <a:pPr>
+              <a:spcAft>
+                <a:spcPts val="400"/>
+              </a:spcAft>
+              <a:defRPr sz="1100">
+                <a:solidFill>
+                  <a:srgbClr val="323232"/>
+                </a:solidFill>
+              </a:defRPr>
+            </a:pPr>
+            <a:r>
+              <a:t>MOTRA handles recruiting, training, payroll, insurance, quality</a:t>
+            </a:r>
+          </a:p>
+          <a:p>
+            <a:pPr>
+              <a:spcAft>
+                <a:spcPts val="400"/>
+              </a:spcAft>
+              <a:defRPr sz="1100">
+                <a:solidFill>
+                  <a:srgbClr val="323232"/>
+                </a:solidFill>
+              </a:defRPr>
+            </a:pPr>
+            <a:r>
+              <a:t>Technicians get flexible gig work with consistent demand</a:t>
             </a:r>
           </a:p>
         </p:txBody>
@@ -5606,7 +5592,7 @@
               </a:defRPr>
             </a:pPr>
             <a:r>
-              <a:t>Key Activities</a:t>
+              <a:t>Revenue Streams</a:t>
             </a:r>
           </a:p>
         </p:txBody>
@@ -5644,211 +5630,196 @@
               </a:defRPr>
             </a:pPr>
             <a:r>
-              <a:t>PLATFORM DEVELOPMENT:</a:t>
-            </a:r>
-          </a:p>
-          <a:p>
-            <a:pPr>
-              <a:spcAft>
-                <a:spcPts val="400"/>
-              </a:spcAft>
-              <a:defRPr sz="1100">
-                <a:solidFill>
-                  <a:srgbClr val="323232"/>
-                </a:solidFill>
-              </a:defRPr>
-            </a:pPr>
-            <a:r>
-              <a:t>• Fleet operator dashboard (scheduling, tracking, analytics)</a:t>
-            </a:r>
-          </a:p>
-          <a:p>
-            <a:pPr>
-              <a:spcAft>
-                <a:spcPts val="400"/>
-              </a:spcAft>
-              <a:defRPr sz="1100">
-                <a:solidFill>
-                  <a:srgbClr val="323232"/>
-                </a:solidFill>
-              </a:defRPr>
-            </a:pPr>
-            <a:r>
-              <a:t>• Technician mobile app (dispatch, checklists, earnings)</a:t>
-            </a:r>
-          </a:p>
-          <a:p>
-            <a:pPr>
-              <a:spcAft>
-                <a:spcPts val="400"/>
-              </a:spcAft>
-              <a:defRPr sz="1100">
-                <a:solidFill>
-                  <a:srgbClr val="323232"/>
-                </a:solidFill>
-              </a:defRPr>
-            </a:pPr>
-            <a:r>
-              <a:t>• API for fleet management system integration</a:t>
-            </a:r>
-          </a:p>
-          <a:p>
-            <a:pPr>
-              <a:spcAft>
-                <a:spcPts val="400"/>
-              </a:spcAft>
-              <a:defRPr sz="1100">
-                <a:solidFill>
-                  <a:srgbClr val="323232"/>
-                </a:solidFill>
-              </a:defRPr>
-            </a:pPr>
-          </a:p>
-          <a:p>
-            <a:pPr>
-              <a:spcAft>
-                <a:spcPts val="400"/>
-              </a:spcAft>
-              <a:defRPr sz="1100">
-                <a:solidFill>
-                  <a:srgbClr val="323232"/>
-                </a:solidFill>
-              </a:defRPr>
-            </a:pPr>
-            <a:r>
-              <a:t>NETWORK OPERATIONS:</a:t>
-            </a:r>
-          </a:p>
-          <a:p>
-            <a:pPr>
-              <a:spcAft>
-                <a:spcPts val="400"/>
-              </a:spcAft>
-              <a:defRPr sz="1100">
-                <a:solidFill>
-                  <a:srgbClr val="323232"/>
-                </a:solidFill>
-              </a:defRPr>
-            </a:pPr>
-            <a:r>
-              <a:t>• Technician recruitment and onboarding</a:t>
-            </a:r>
-          </a:p>
-          <a:p>
-            <a:pPr>
-              <a:spcAft>
-                <a:spcPts val="400"/>
-              </a:spcAft>
-              <a:defRPr sz="1100">
-                <a:solidFill>
-                  <a:srgbClr val="323232"/>
-                </a:solidFill>
-              </a:defRPr>
-            </a:pPr>
-            <a:r>
-              <a:t>• AV-specific training and certification</a:t>
-            </a:r>
-          </a:p>
-          <a:p>
-            <a:pPr>
-              <a:spcAft>
-                <a:spcPts val="400"/>
-              </a:spcAft>
-              <a:defRPr sz="1100">
-                <a:solidFill>
-                  <a:srgbClr val="323232"/>
-                </a:solidFill>
-              </a:defRPr>
-            </a:pPr>
-            <a:r>
-              <a:t>• Quality assurance and performance management</a:t>
-            </a:r>
-          </a:p>
-          <a:p>
-            <a:pPr>
-              <a:spcAft>
-                <a:spcPts val="400"/>
-              </a:spcAft>
-              <a:defRPr sz="1100">
-                <a:solidFill>
-                  <a:srgbClr val="323232"/>
-                </a:solidFill>
-              </a:defRPr>
-            </a:pPr>
-            <a:r>
-              <a:t>• Equipment kit distribution</a:t>
-            </a:r>
-          </a:p>
-          <a:p>
-            <a:pPr>
-              <a:spcAft>
-                <a:spcPts val="400"/>
-              </a:spcAft>
-              <a:defRPr sz="1100">
-                <a:solidFill>
-                  <a:srgbClr val="323232"/>
-                </a:solidFill>
-              </a:defRPr>
-            </a:pPr>
-          </a:p>
-          <a:p>
-            <a:pPr>
-              <a:spcAft>
-                <a:spcPts val="400"/>
-              </a:spcAft>
-              <a:defRPr sz="1100">
-                <a:solidFill>
-                  <a:srgbClr val="323232"/>
-                </a:solidFill>
-              </a:defRPr>
-            </a:pPr>
-            <a:r>
-              <a:t>ENTERPRISE SALES:</a:t>
-            </a:r>
-          </a:p>
-          <a:p>
-            <a:pPr>
-              <a:spcAft>
-                <a:spcPts val="400"/>
-              </a:spcAft>
-              <a:defRPr sz="1100">
-                <a:solidFill>
-                  <a:srgbClr val="323232"/>
-                </a:solidFill>
-              </a:defRPr>
-            </a:pPr>
-            <a:r>
-              <a:t>• Outreach to AV fleet operators</a:t>
-            </a:r>
-          </a:p>
-          <a:p>
-            <a:pPr>
-              <a:spcAft>
-                <a:spcPts val="400"/>
-              </a:spcAft>
-              <a:defRPr sz="1100">
-                <a:solidFill>
-                  <a:srgbClr val="323232"/>
-                </a:solidFill>
-              </a:defRPr>
-            </a:pPr>
-            <a:r>
-              <a:t>• Pilot program management</a:t>
-            </a:r>
-          </a:p>
-          <a:p>
-            <a:pPr>
-              <a:spcAft>
-                <a:spcPts val="400"/>
-              </a:spcAft>
-              <a:defRPr sz="1100">
-                <a:solidFill>
-                  <a:srgbClr val="323232"/>
-                </a:solidFill>
-              </a:defRPr>
-            </a:pPr>
-            <a:r>
-              <a:t>• Account expansion and retention</a:t>
+              <a:t>PER-SERVICE PRICING:</a:t>
+            </a:r>
+          </a:p>
+          <a:p>
+            <a:pPr>
+              <a:spcAft>
+                <a:spcPts val="400"/>
+              </a:spcAft>
+              <a:defRPr sz="1100">
+                <a:solidFill>
+                  <a:srgbClr val="323232"/>
+                </a:solidFill>
+              </a:defRPr>
+            </a:pPr>
+            <a:r>
+              <a:t>• Quick Clean (5-10 min): $12-18</a:t>
+            </a:r>
+          </a:p>
+          <a:p>
+            <a:pPr>
+              <a:spcAft>
+                <a:spcPts val="400"/>
+              </a:spcAft>
+              <a:defRPr sz="1100">
+                <a:solidFill>
+                  <a:srgbClr val="323232"/>
+                </a:solidFill>
+              </a:defRPr>
+            </a:pPr>
+            <a:r>
+              <a:t>• Deep Clean (30-60 min): $45-75</a:t>
+            </a:r>
+          </a:p>
+          <a:p>
+            <a:pPr>
+              <a:spcAft>
+                <a:spcPts val="400"/>
+              </a:spcAft>
+              <a:defRPr sz="1100">
+                <a:solidFill>
+                  <a:srgbClr val="323232"/>
+                </a:solidFill>
+              </a:defRPr>
+            </a:pPr>
+            <a:r>
+              <a:t>• Light Maintenance: $25-50</a:t>
+            </a:r>
+          </a:p>
+          <a:p>
+            <a:pPr>
+              <a:spcAft>
+                <a:spcPts val="400"/>
+              </a:spcAft>
+              <a:defRPr sz="1100">
+                <a:solidFill>
+                  <a:srgbClr val="323232"/>
+                </a:solidFill>
+              </a:defRPr>
+            </a:pPr>
+            <a:r>
+              <a:t>• Emergency Response: $75-150 (premium)</a:t>
+            </a:r>
+          </a:p>
+          <a:p>
+            <a:pPr>
+              <a:spcAft>
+                <a:spcPts val="400"/>
+              </a:spcAft>
+              <a:defRPr sz="1100">
+                <a:solidFill>
+                  <a:srgbClr val="323232"/>
+                </a:solidFill>
+              </a:defRPr>
+            </a:pPr>
+          </a:p>
+          <a:p>
+            <a:pPr>
+              <a:spcAft>
+                <a:spcPts val="400"/>
+              </a:spcAft>
+              <a:defRPr sz="1100">
+                <a:solidFill>
+                  <a:srgbClr val="323232"/>
+                </a:solidFill>
+              </a:defRPr>
+            </a:pPr>
+            <a:r>
+              <a:t>UNIT ECONOMICS:</a:t>
+            </a:r>
+          </a:p>
+          <a:p>
+            <a:pPr>
+              <a:spcAft>
+                <a:spcPts val="400"/>
+              </a:spcAft>
+              <a:defRPr sz="1100">
+                <a:solidFill>
+                  <a:srgbClr val="323232"/>
+                </a:solidFill>
+              </a:defRPr>
+            </a:pPr>
+            <a:r>
+              <a:t>• Average service price: $15</a:t>
+            </a:r>
+          </a:p>
+          <a:p>
+            <a:pPr>
+              <a:spcAft>
+                <a:spcPts val="400"/>
+              </a:spcAft>
+              <a:defRPr sz="1100">
+                <a:solidFill>
+                  <a:srgbClr val="323232"/>
+                </a:solidFill>
+              </a:defRPr>
+            </a:pPr>
+            <a:r>
+              <a:t>• Technician payout: $10-11 (65-70%)</a:t>
+            </a:r>
+          </a:p>
+          <a:p>
+            <a:pPr>
+              <a:spcAft>
+                <a:spcPts val="400"/>
+              </a:spcAft>
+              <a:defRPr sz="1100">
+                <a:solidFill>
+                  <a:srgbClr val="323232"/>
+                </a:solidFill>
+              </a:defRPr>
+            </a:pPr>
+            <a:r>
+              <a:t>• Platform margin: $4-5 (27-33%)</a:t>
+            </a:r>
+          </a:p>
+          <a:p>
+            <a:pPr>
+              <a:spcAft>
+                <a:spcPts val="400"/>
+              </a:spcAft>
+              <a:defRPr sz="1100">
+                <a:solidFill>
+                  <a:srgbClr val="323232"/>
+                </a:solidFill>
+              </a:defRPr>
+            </a:pPr>
+          </a:p>
+          <a:p>
+            <a:pPr>
+              <a:spcAft>
+                <a:spcPts val="400"/>
+              </a:spcAft>
+              <a:defRPr sz="1100">
+                <a:solidFill>
+                  <a:srgbClr val="323232"/>
+                </a:solidFill>
+              </a:defRPr>
+            </a:pPr>
+            <a:r>
+              <a:t>AT SCALE:</a:t>
+            </a:r>
+          </a:p>
+          <a:p>
+            <a:pPr>
+              <a:spcAft>
+                <a:spcPts val="400"/>
+              </a:spcAft>
+              <a:defRPr sz="1100">
+                <a:solidFill>
+                  <a:srgbClr val="323232"/>
+                </a:solidFill>
+              </a:defRPr>
+            </a:pPr>
+            <a:r>
+              <a:t>• 1,000 services/day = $15K revenue, $4-5K margin</a:t>
+            </a:r>
+          </a:p>
+          <a:p>
+            <a:pPr>
+              <a:spcAft>
+                <a:spcPts val="400"/>
+              </a:spcAft>
+              <a:defRPr sz="1100">
+                <a:solidFill>
+                  <a:srgbClr val="323232"/>
+                </a:solidFill>
+              </a:defRPr>
+            </a:pPr>
+            <a:r>
+              <a:t>• 10,000 services/day = $150K revenue, $40-50K margin</a:t>
             </a:r>
           </a:p>
         </p:txBody>
@@ -5979,7 +5950,7 @@
               </a:defRPr>
             </a:pPr>
             <a:r>
-              <a:t>Key Resources</a:t>
+              <a:t>Key Activities</a:t>
             </a:r>
           </a:p>
         </p:txBody>
@@ -6017,268 +5988,196 @@
               </a:defRPr>
             </a:pPr>
             <a:r>
-              <a:t>TECHNOLOGY:</a:t>
-            </a:r>
-          </a:p>
-          <a:p>
-            <a:pPr>
-              <a:spcAft>
-                <a:spcPts val="400"/>
-              </a:spcAft>
-              <a:defRPr sz="1100">
-                <a:solidFill>
-                  <a:srgbClr val="323232"/>
-                </a:solidFill>
-              </a:defRPr>
-            </a:pPr>
-            <a:r>
-              <a:t>• Dispatch and routing platform</a:t>
-            </a:r>
-          </a:p>
-          <a:p>
-            <a:pPr>
-              <a:spcAft>
-                <a:spcPts val="400"/>
-              </a:spcAft>
-              <a:defRPr sz="1100">
-                <a:solidFill>
-                  <a:srgbClr val="323232"/>
-                </a:solidFill>
-              </a:defRPr>
-            </a:pPr>
-            <a:r>
-              <a:t>• Fleet operator dashboard</a:t>
-            </a:r>
-          </a:p>
-          <a:p>
-            <a:pPr>
-              <a:spcAft>
-                <a:spcPts val="400"/>
-              </a:spcAft>
-              <a:defRPr sz="1100">
-                <a:solidFill>
-                  <a:srgbClr val="323232"/>
-                </a:solidFill>
-              </a:defRPr>
-            </a:pPr>
-            <a:r>
-              <a:t>• Technician mobile application</a:t>
-            </a:r>
-          </a:p>
-          <a:p>
-            <a:pPr>
-              <a:spcAft>
-                <a:spcPts val="400"/>
-              </a:spcAft>
-              <a:defRPr sz="1100">
-                <a:solidFill>
-                  <a:srgbClr val="323232"/>
-                </a:solidFill>
-              </a:defRPr>
-            </a:pPr>
-            <a:r>
-              <a:t>• API integration layer</a:t>
-            </a:r>
-          </a:p>
-          <a:p>
-            <a:pPr>
-              <a:spcAft>
-                <a:spcPts val="400"/>
-              </a:spcAft>
-              <a:defRPr sz="1100">
-                <a:solidFill>
-                  <a:srgbClr val="323232"/>
-                </a:solidFill>
-              </a:defRPr>
-            </a:pPr>
-          </a:p>
-          <a:p>
-            <a:pPr>
-              <a:spcAft>
-                <a:spcPts val="400"/>
-              </a:spcAft>
-              <a:defRPr sz="1100">
-                <a:solidFill>
-                  <a:srgbClr val="323232"/>
-                </a:solidFill>
-              </a:defRPr>
-            </a:pPr>
-            <a:r>
-              <a:t>HUMAN:</a:t>
-            </a:r>
-          </a:p>
-          <a:p>
-            <a:pPr>
-              <a:spcAft>
-                <a:spcPts val="400"/>
-              </a:spcAft>
-              <a:defRPr sz="1100">
-                <a:solidFill>
-                  <a:srgbClr val="323232"/>
-                </a:solidFill>
-              </a:defRPr>
-            </a:pPr>
-            <a:r>
-              <a:t>• Engineering team (platform development)</a:t>
-            </a:r>
-          </a:p>
-          <a:p>
-            <a:pPr>
-              <a:spcAft>
-                <a:spcPts val="400"/>
-              </a:spcAft>
-              <a:defRPr sz="1100">
-                <a:solidFill>
-                  <a:srgbClr val="323232"/>
-                </a:solidFill>
-              </a:defRPr>
-            </a:pPr>
-            <a:r>
-              <a:t>• Operations team (network management)</a:t>
-            </a:r>
-          </a:p>
-          <a:p>
-            <a:pPr>
-              <a:spcAft>
-                <a:spcPts val="400"/>
-              </a:spcAft>
-              <a:defRPr sz="1100">
-                <a:solidFill>
-                  <a:srgbClr val="323232"/>
-                </a:solidFill>
-              </a:defRPr>
-            </a:pPr>
-            <a:r>
-              <a:t>• Sales team (enterprise relationships)</a:t>
-            </a:r>
-          </a:p>
-          <a:p>
-            <a:pPr>
-              <a:spcAft>
-                <a:spcPts val="400"/>
-              </a:spcAft>
-              <a:defRPr sz="1100">
-                <a:solidFill>
-                  <a:srgbClr val="323232"/>
-                </a:solidFill>
-              </a:defRPr>
-            </a:pPr>
-            <a:r>
-              <a:t>• Trained technician network</a:t>
-            </a:r>
-          </a:p>
-          <a:p>
-            <a:pPr>
-              <a:spcAft>
-                <a:spcPts val="400"/>
-              </a:spcAft>
-              <a:defRPr sz="1100">
-                <a:solidFill>
-                  <a:srgbClr val="323232"/>
-                </a:solidFill>
-              </a:defRPr>
-            </a:pPr>
-          </a:p>
-          <a:p>
-            <a:pPr>
-              <a:spcAft>
-                <a:spcPts val="400"/>
-              </a:spcAft>
-              <a:defRPr sz="1100">
-                <a:solidFill>
-                  <a:srgbClr val="323232"/>
-                </a:solidFill>
-              </a:defRPr>
-            </a:pPr>
-            <a:r>
-              <a:t>INTELLECTUAL:</a:t>
-            </a:r>
-          </a:p>
-          <a:p>
-            <a:pPr>
-              <a:spcAft>
-                <a:spcPts val="400"/>
-              </a:spcAft>
-              <a:defRPr sz="1100">
-                <a:solidFill>
-                  <a:srgbClr val="323232"/>
-                </a:solidFill>
-              </a:defRPr>
-            </a:pPr>
-            <a:r>
-              <a:t>• AV-specific training curriculum</a:t>
-            </a:r>
-          </a:p>
-          <a:p>
-            <a:pPr>
-              <a:spcAft>
-                <a:spcPts val="400"/>
-              </a:spcAft>
-              <a:defRPr sz="1100">
-                <a:solidFill>
-                  <a:srgbClr val="323232"/>
-                </a:solidFill>
-              </a:defRPr>
-            </a:pPr>
-            <a:r>
-              <a:t>• Quality standards and checklists</a:t>
-            </a:r>
-          </a:p>
-          <a:p>
-            <a:pPr>
-              <a:spcAft>
-                <a:spcPts val="400"/>
-              </a:spcAft>
-              <a:defRPr sz="1100">
-                <a:solidFill>
-                  <a:srgbClr val="323232"/>
-                </a:solidFill>
-              </a:defRPr>
-            </a:pPr>
-            <a:r>
-              <a:t>• Operational playbooks for each market</a:t>
-            </a:r>
-          </a:p>
-          <a:p>
-            <a:pPr>
-              <a:spcAft>
-                <a:spcPts val="400"/>
-              </a:spcAft>
-              <a:defRPr sz="1100">
-                <a:solidFill>
-                  <a:srgbClr val="323232"/>
-                </a:solidFill>
-              </a:defRPr>
-            </a:pPr>
-          </a:p>
-          <a:p>
-            <a:pPr>
-              <a:spcAft>
-                <a:spcPts val="400"/>
-              </a:spcAft>
-              <a:defRPr sz="1100">
-                <a:solidFill>
-                  <a:srgbClr val="323232"/>
-                </a:solidFill>
-              </a:defRPr>
-            </a:pPr>
-            <a:r>
-              <a:t>FINANCIAL:</a:t>
-            </a:r>
-          </a:p>
-          <a:p>
-            <a:pPr>
-              <a:spcAft>
-                <a:spcPts val="400"/>
-              </a:spcAft>
-              <a:defRPr sz="1100">
-                <a:solidFill>
-                  <a:srgbClr val="323232"/>
-                </a:solidFill>
-              </a:defRPr>
-            </a:pPr>
-            <a:r>
-              <a:t>• Seed funding for 18-month runway</a:t>
+              <a:t>PLATFORM DEVELOPMENT:</a:t>
+            </a:r>
+          </a:p>
+          <a:p>
+            <a:pPr>
+              <a:spcAft>
+                <a:spcPts val="400"/>
+              </a:spcAft>
+              <a:defRPr sz="1100">
+                <a:solidFill>
+                  <a:srgbClr val="323232"/>
+                </a:solidFill>
+              </a:defRPr>
+            </a:pPr>
+            <a:r>
+              <a:t>• Fleet operator dashboard (scheduling, tracking, analytics)</a:t>
+            </a:r>
+          </a:p>
+          <a:p>
+            <a:pPr>
+              <a:spcAft>
+                <a:spcPts val="400"/>
+              </a:spcAft>
+              <a:defRPr sz="1100">
+                <a:solidFill>
+                  <a:srgbClr val="323232"/>
+                </a:solidFill>
+              </a:defRPr>
+            </a:pPr>
+            <a:r>
+              <a:t>• Technician mobile app (dispatch, checklists, earnings)</a:t>
+            </a:r>
+          </a:p>
+          <a:p>
+            <a:pPr>
+              <a:spcAft>
+                <a:spcPts val="400"/>
+              </a:spcAft>
+              <a:defRPr sz="1100">
+                <a:solidFill>
+                  <a:srgbClr val="323232"/>
+                </a:solidFill>
+              </a:defRPr>
+            </a:pPr>
+            <a:r>
+              <a:t>• API for fleet management system integration</a:t>
+            </a:r>
+          </a:p>
+          <a:p>
+            <a:pPr>
+              <a:spcAft>
+                <a:spcPts val="400"/>
+              </a:spcAft>
+              <a:defRPr sz="1100">
+                <a:solidFill>
+                  <a:srgbClr val="323232"/>
+                </a:solidFill>
+              </a:defRPr>
+            </a:pPr>
+          </a:p>
+          <a:p>
+            <a:pPr>
+              <a:spcAft>
+                <a:spcPts val="400"/>
+              </a:spcAft>
+              <a:defRPr sz="1100">
+                <a:solidFill>
+                  <a:srgbClr val="323232"/>
+                </a:solidFill>
+              </a:defRPr>
+            </a:pPr>
+            <a:r>
+              <a:t>NETWORK OPERATIONS:</a:t>
+            </a:r>
+          </a:p>
+          <a:p>
+            <a:pPr>
+              <a:spcAft>
+                <a:spcPts val="400"/>
+              </a:spcAft>
+              <a:defRPr sz="1100">
+                <a:solidFill>
+                  <a:srgbClr val="323232"/>
+                </a:solidFill>
+              </a:defRPr>
+            </a:pPr>
+            <a:r>
+              <a:t>• Technician recruitment and onboarding</a:t>
+            </a:r>
+          </a:p>
+          <a:p>
+            <a:pPr>
+              <a:spcAft>
+                <a:spcPts val="400"/>
+              </a:spcAft>
+              <a:defRPr sz="1100">
+                <a:solidFill>
+                  <a:srgbClr val="323232"/>
+                </a:solidFill>
+              </a:defRPr>
+            </a:pPr>
+            <a:r>
+              <a:t>• AV-specific training and certification</a:t>
+            </a:r>
+          </a:p>
+          <a:p>
+            <a:pPr>
+              <a:spcAft>
+                <a:spcPts val="400"/>
+              </a:spcAft>
+              <a:defRPr sz="1100">
+                <a:solidFill>
+                  <a:srgbClr val="323232"/>
+                </a:solidFill>
+              </a:defRPr>
+            </a:pPr>
+            <a:r>
+              <a:t>• Quality assurance and performance management</a:t>
+            </a:r>
+          </a:p>
+          <a:p>
+            <a:pPr>
+              <a:spcAft>
+                <a:spcPts val="400"/>
+              </a:spcAft>
+              <a:defRPr sz="1100">
+                <a:solidFill>
+                  <a:srgbClr val="323232"/>
+                </a:solidFill>
+              </a:defRPr>
+            </a:pPr>
+          </a:p>
+          <a:p>
+            <a:pPr>
+              <a:spcAft>
+                <a:spcPts val="400"/>
+              </a:spcAft>
+              <a:defRPr sz="1100">
+                <a:solidFill>
+                  <a:srgbClr val="323232"/>
+                </a:solidFill>
+              </a:defRPr>
+            </a:pPr>
+            <a:r>
+              <a:t>ENTERPRISE SALES:</a:t>
+            </a:r>
+          </a:p>
+          <a:p>
+            <a:pPr>
+              <a:spcAft>
+                <a:spcPts val="400"/>
+              </a:spcAft>
+              <a:defRPr sz="1100">
+                <a:solidFill>
+                  <a:srgbClr val="323232"/>
+                </a:solidFill>
+              </a:defRPr>
+            </a:pPr>
+            <a:r>
+              <a:t>• Outreach to AV fleet operators</a:t>
+            </a:r>
+          </a:p>
+          <a:p>
+            <a:pPr>
+              <a:spcAft>
+                <a:spcPts val="400"/>
+              </a:spcAft>
+              <a:defRPr sz="1100">
+                <a:solidFill>
+                  <a:srgbClr val="323232"/>
+                </a:solidFill>
+              </a:defRPr>
+            </a:pPr>
+            <a:r>
+              <a:t>• Pilot program management</a:t>
+            </a:r>
+          </a:p>
+          <a:p>
+            <a:pPr>
+              <a:spcAft>
+                <a:spcPts val="400"/>
+              </a:spcAft>
+              <a:defRPr sz="1100">
+                <a:solidFill>
+                  <a:srgbClr val="323232"/>
+                </a:solidFill>
+              </a:defRPr>
+            </a:pPr>
+            <a:r>
+              <a:t>• Account expansion and retention</a:t>
             </a:r>
           </a:p>
         </p:txBody>
@@ -6409,7 +6308,7 @@
               </a:defRPr>
             </a:pPr>
             <a:r>
-              <a:t>Key Partners</a:t>
+              <a:t>Key Resources</a:t>
             </a:r>
           </a:p>
         </p:txBody>
@@ -6447,253 +6346,223 @@
               </a:defRPr>
             </a:pPr>
             <a:r>
-              <a:t>AV ECOSYSTEM:</a:t>
-            </a:r>
-          </a:p>
-          <a:p>
-            <a:pPr>
-              <a:spcAft>
-                <a:spcPts val="400"/>
-              </a:spcAft>
-              <a:defRPr sz="1100">
-                <a:solidFill>
-                  <a:srgbClr val="323232"/>
-                </a:solidFill>
-              </a:defRPr>
-            </a:pPr>
-            <a:r>
-              <a:t>• Waymo, Cruise, Zoox, Tesla (customers)</a:t>
-            </a:r>
-          </a:p>
-          <a:p>
-            <a:pPr>
-              <a:spcAft>
-                <a:spcPts val="400"/>
-              </a:spcAft>
-              <a:defRPr sz="1100">
-                <a:solidFill>
-                  <a:srgbClr val="323232"/>
-                </a:solidFill>
-              </a:defRPr>
-            </a:pPr>
-            <a:r>
-              <a:t>• AV industry associations</a:t>
-            </a:r>
-          </a:p>
-          <a:p>
-            <a:pPr>
-              <a:spcAft>
-                <a:spcPts val="400"/>
-              </a:spcAft>
-              <a:defRPr sz="1100">
-                <a:solidFill>
-                  <a:srgbClr val="323232"/>
-                </a:solidFill>
-              </a:defRPr>
-            </a:pPr>
-            <a:r>
-              <a:t>• Fleet management software providers</a:t>
-            </a:r>
-          </a:p>
-          <a:p>
-            <a:pPr>
-              <a:spcAft>
-                <a:spcPts val="400"/>
-              </a:spcAft>
-              <a:defRPr sz="1100">
-                <a:solidFill>
-                  <a:srgbClr val="323232"/>
-                </a:solidFill>
-              </a:defRPr>
-            </a:pPr>
-          </a:p>
-          <a:p>
-            <a:pPr>
-              <a:spcAft>
-                <a:spcPts val="400"/>
-              </a:spcAft>
-              <a:defRPr sz="1100">
-                <a:solidFill>
-                  <a:srgbClr val="323232"/>
-                </a:solidFill>
-              </a:defRPr>
-            </a:pPr>
-            <a:r>
-              <a:t>GIG ECONOMY:</a:t>
-            </a:r>
-          </a:p>
-          <a:p>
-            <a:pPr>
-              <a:spcAft>
-                <a:spcPts val="400"/>
-              </a:spcAft>
-              <a:defRPr sz="1100">
-                <a:solidFill>
-                  <a:srgbClr val="323232"/>
-                </a:solidFill>
-              </a:defRPr>
-            </a:pPr>
-            <a:r>
-              <a:t>• Existing gig platforms (recruitment channel)</a:t>
-            </a:r>
-          </a:p>
-          <a:p>
-            <a:pPr>
-              <a:spcAft>
-                <a:spcPts val="400"/>
-              </a:spcAft>
-              <a:defRPr sz="1100">
-                <a:solidFill>
-                  <a:srgbClr val="323232"/>
-                </a:solidFill>
-              </a:defRPr>
-            </a:pPr>
-            <a:r>
-              <a:t>• Detailing/cleaning training providers</a:t>
-            </a:r>
-          </a:p>
-          <a:p>
-            <a:pPr>
-              <a:spcAft>
-                <a:spcPts val="400"/>
-              </a:spcAft>
-              <a:defRPr sz="1100">
-                <a:solidFill>
-                  <a:srgbClr val="323232"/>
-                </a:solidFill>
-              </a:defRPr>
-            </a:pPr>
-            <a:r>
-              <a:t>• Equipment suppliers</a:t>
-            </a:r>
-          </a:p>
-          <a:p>
-            <a:pPr>
-              <a:spcAft>
-                <a:spcPts val="400"/>
-              </a:spcAft>
-              <a:defRPr sz="1100">
-                <a:solidFill>
-                  <a:srgbClr val="323232"/>
-                </a:solidFill>
-              </a:defRPr>
-            </a:pPr>
-          </a:p>
-          <a:p>
-            <a:pPr>
-              <a:spcAft>
-                <a:spcPts val="400"/>
-              </a:spcAft>
-              <a:defRPr sz="1100">
-                <a:solidFill>
-                  <a:srgbClr val="323232"/>
-                </a:solidFill>
-              </a:defRPr>
-            </a:pPr>
-            <a:r>
-              <a:t>SUPPORTING:</a:t>
-            </a:r>
-          </a:p>
-          <a:p>
-            <a:pPr>
-              <a:spcAft>
-                <a:spcPts val="400"/>
-              </a:spcAft>
-              <a:defRPr sz="1100">
-                <a:solidFill>
-                  <a:srgbClr val="323232"/>
-                </a:solidFill>
-              </a:defRPr>
-            </a:pPr>
-            <a:r>
-              <a:t>• Insurance providers (commercial auto, liability)</a:t>
-            </a:r>
-          </a:p>
-          <a:p>
-            <a:pPr>
-              <a:spcAft>
-                <a:spcPts val="400"/>
-              </a:spcAft>
-              <a:defRPr sz="1100">
-                <a:solidFill>
-                  <a:srgbClr val="323232"/>
-                </a:solidFill>
-              </a:defRPr>
-            </a:pPr>
-            <a:r>
-              <a:t>• Background check services</a:t>
-            </a:r>
-          </a:p>
-          <a:p>
-            <a:pPr>
-              <a:spcAft>
-                <a:spcPts val="400"/>
-              </a:spcAft>
-              <a:defRPr sz="1100">
-                <a:solidFill>
-                  <a:srgbClr val="323232"/>
-                </a:solidFill>
-              </a:defRPr>
-            </a:pPr>
-            <a:r>
-              <a:t>• Payment processing (Stripe, etc.)</a:t>
-            </a:r>
-          </a:p>
-          <a:p>
-            <a:pPr>
-              <a:spcAft>
-                <a:spcPts val="400"/>
-              </a:spcAft>
-              <a:defRPr sz="1100">
-                <a:solidFill>
-                  <a:srgbClr val="323232"/>
-                </a:solidFill>
-              </a:defRPr>
-            </a:pPr>
-          </a:p>
-          <a:p>
-            <a:pPr>
-              <a:spcAft>
-                <a:spcPts val="400"/>
-              </a:spcAft>
-              <a:defRPr sz="1100">
-                <a:solidFill>
-                  <a:srgbClr val="323232"/>
-                </a:solidFill>
-              </a:defRPr>
-            </a:pPr>
-            <a:r>
-              <a:t>STRATEGIC:</a:t>
-            </a:r>
-          </a:p>
-          <a:p>
-            <a:pPr>
-              <a:spcAft>
-                <a:spcPts val="400"/>
-              </a:spcAft>
-              <a:defRPr sz="1100">
-                <a:solidFill>
-                  <a:srgbClr val="323232"/>
-                </a:solidFill>
-              </a:defRPr>
-            </a:pPr>
-            <a:r>
-              <a:t>• EV charging networks (co-location opportunities)</a:t>
-            </a:r>
-          </a:p>
-          <a:p>
-            <a:pPr>
-              <a:spcAft>
-                <a:spcPts val="400"/>
-              </a:spcAft>
-              <a:defRPr sz="1100">
-                <a:solidFill>
-                  <a:srgbClr val="323232"/>
-                </a:solidFill>
-              </a:defRPr>
-            </a:pPr>
-            <a:r>
-              <a:t>• Parking/logistics providers</a:t>
+              <a:t>TECHNOLOGY:</a:t>
+            </a:r>
+          </a:p>
+          <a:p>
+            <a:pPr>
+              <a:spcAft>
+                <a:spcPts val="400"/>
+              </a:spcAft>
+              <a:defRPr sz="1100">
+                <a:solidFill>
+                  <a:srgbClr val="323232"/>
+                </a:solidFill>
+              </a:defRPr>
+            </a:pPr>
+            <a:r>
+              <a:t>• Dispatch and routing platform</a:t>
+            </a:r>
+          </a:p>
+          <a:p>
+            <a:pPr>
+              <a:spcAft>
+                <a:spcPts val="400"/>
+              </a:spcAft>
+              <a:defRPr sz="1100">
+                <a:solidFill>
+                  <a:srgbClr val="323232"/>
+                </a:solidFill>
+              </a:defRPr>
+            </a:pPr>
+            <a:r>
+              <a:t>• Fleet operator dashboard</a:t>
+            </a:r>
+          </a:p>
+          <a:p>
+            <a:pPr>
+              <a:spcAft>
+                <a:spcPts val="400"/>
+              </a:spcAft>
+              <a:defRPr sz="1100">
+                <a:solidFill>
+                  <a:srgbClr val="323232"/>
+                </a:solidFill>
+              </a:defRPr>
+            </a:pPr>
+            <a:r>
+              <a:t>• Technician mobile application</a:t>
+            </a:r>
+          </a:p>
+          <a:p>
+            <a:pPr>
+              <a:spcAft>
+                <a:spcPts val="400"/>
+              </a:spcAft>
+              <a:defRPr sz="1100">
+                <a:solidFill>
+                  <a:srgbClr val="323232"/>
+                </a:solidFill>
+              </a:defRPr>
+            </a:pPr>
+          </a:p>
+          <a:p>
+            <a:pPr>
+              <a:spcAft>
+                <a:spcPts val="400"/>
+              </a:spcAft>
+              <a:defRPr sz="1100">
+                <a:solidFill>
+                  <a:srgbClr val="323232"/>
+                </a:solidFill>
+              </a:defRPr>
+            </a:pPr>
+            <a:r>
+              <a:t>HUMAN:</a:t>
+            </a:r>
+          </a:p>
+          <a:p>
+            <a:pPr>
+              <a:spcAft>
+                <a:spcPts val="400"/>
+              </a:spcAft>
+              <a:defRPr sz="1100">
+                <a:solidFill>
+                  <a:srgbClr val="323232"/>
+                </a:solidFill>
+              </a:defRPr>
+            </a:pPr>
+            <a:r>
+              <a:t>• Engineering team (platform development)</a:t>
+            </a:r>
+          </a:p>
+          <a:p>
+            <a:pPr>
+              <a:spcAft>
+                <a:spcPts val="400"/>
+              </a:spcAft>
+              <a:defRPr sz="1100">
+                <a:solidFill>
+                  <a:srgbClr val="323232"/>
+                </a:solidFill>
+              </a:defRPr>
+            </a:pPr>
+            <a:r>
+              <a:t>• Operations team (network management)</a:t>
+            </a:r>
+          </a:p>
+          <a:p>
+            <a:pPr>
+              <a:spcAft>
+                <a:spcPts val="400"/>
+              </a:spcAft>
+              <a:defRPr sz="1100">
+                <a:solidFill>
+                  <a:srgbClr val="323232"/>
+                </a:solidFill>
+              </a:defRPr>
+            </a:pPr>
+            <a:r>
+              <a:t>• Trained technician network</a:t>
+            </a:r>
+          </a:p>
+          <a:p>
+            <a:pPr>
+              <a:spcAft>
+                <a:spcPts val="400"/>
+              </a:spcAft>
+              <a:defRPr sz="1100">
+                <a:solidFill>
+                  <a:srgbClr val="323232"/>
+                </a:solidFill>
+              </a:defRPr>
+            </a:pPr>
+          </a:p>
+          <a:p>
+            <a:pPr>
+              <a:spcAft>
+                <a:spcPts val="400"/>
+              </a:spcAft>
+              <a:defRPr sz="1100">
+                <a:solidFill>
+                  <a:srgbClr val="323232"/>
+                </a:solidFill>
+              </a:defRPr>
+            </a:pPr>
+            <a:r>
+              <a:t>INTELLECTUAL:</a:t>
+            </a:r>
+          </a:p>
+          <a:p>
+            <a:pPr>
+              <a:spcAft>
+                <a:spcPts val="400"/>
+              </a:spcAft>
+              <a:defRPr sz="1100">
+                <a:solidFill>
+                  <a:srgbClr val="323232"/>
+                </a:solidFill>
+              </a:defRPr>
+            </a:pPr>
+            <a:r>
+              <a:t>• AV-specific training curriculum</a:t>
+            </a:r>
+          </a:p>
+          <a:p>
+            <a:pPr>
+              <a:spcAft>
+                <a:spcPts val="400"/>
+              </a:spcAft>
+              <a:defRPr sz="1100">
+                <a:solidFill>
+                  <a:srgbClr val="323232"/>
+                </a:solidFill>
+              </a:defRPr>
+            </a:pPr>
+            <a:r>
+              <a:t>• Quality standards and checklists</a:t>
+            </a:r>
+          </a:p>
+          <a:p>
+            <a:pPr>
+              <a:spcAft>
+                <a:spcPts val="400"/>
+              </a:spcAft>
+              <a:defRPr sz="1100">
+                <a:solidFill>
+                  <a:srgbClr val="323232"/>
+                </a:solidFill>
+              </a:defRPr>
+            </a:pPr>
+          </a:p>
+          <a:p>
+            <a:pPr>
+              <a:spcAft>
+                <a:spcPts val="400"/>
+              </a:spcAft>
+              <a:defRPr sz="1100">
+                <a:solidFill>
+                  <a:srgbClr val="323232"/>
+                </a:solidFill>
+              </a:defRPr>
+            </a:pPr>
+            <a:r>
+              <a:t>FINANCIAL:</a:t>
+            </a:r>
+          </a:p>
+          <a:p>
+            <a:pPr>
+              <a:spcAft>
+                <a:spcPts val="400"/>
+              </a:spcAft>
+              <a:defRPr sz="1100">
+                <a:solidFill>
+                  <a:srgbClr val="323232"/>
+                </a:solidFill>
+              </a:defRPr>
+            </a:pPr>
+            <a:r>
+              <a:t>• Seed funding for 18-month runway</a:t>
             </a:r>
           </a:p>
         </p:txBody>
@@ -6824,7 +6693,7 @@
               </a:defRPr>
             </a:pPr>
             <a:r>
-              <a:t>Cost Structure</a:t>
+              <a:t>Key Partners</a:t>
             </a:r>
           </a:p>
         </p:txBody>
@@ -6862,253 +6731,181 @@
               </a:defRPr>
             </a:pPr>
             <a:r>
-              <a:t>VARIABLE COSTS (scale with volume):</a:t>
-            </a:r>
-          </a:p>
-          <a:p>
-            <a:pPr>
-              <a:spcAft>
-                <a:spcPts val="400"/>
-              </a:spcAft>
-              <a:defRPr sz="1100">
-                <a:solidFill>
-                  <a:srgbClr val="323232"/>
-                </a:solidFill>
-              </a:defRPr>
-            </a:pPr>
-            <a:r>
-              <a:t>• Technician payouts: 65-70% of service revenue</a:t>
-            </a:r>
-          </a:p>
-          <a:p>
-            <a:pPr>
-              <a:spcAft>
-                <a:spcPts val="400"/>
-              </a:spcAft>
-              <a:defRPr sz="1100">
-                <a:solidFill>
-                  <a:srgbClr val="323232"/>
-                </a:solidFill>
-              </a:defRPr>
-            </a:pPr>
-            <a:r>
-              <a:t>• Payment processing: 2-3%</a:t>
-            </a:r>
-          </a:p>
-          <a:p>
-            <a:pPr>
-              <a:spcAft>
-                <a:spcPts val="400"/>
-              </a:spcAft>
-              <a:defRPr sz="1100">
-                <a:solidFill>
-                  <a:srgbClr val="323232"/>
-                </a:solidFill>
-              </a:defRPr>
-            </a:pPr>
-            <a:r>
-              <a:t>• Insurance per service</a:t>
-            </a:r>
-          </a:p>
-          <a:p>
-            <a:pPr>
-              <a:spcAft>
-                <a:spcPts val="400"/>
-              </a:spcAft>
-              <a:defRPr sz="1100">
-                <a:solidFill>
-                  <a:srgbClr val="323232"/>
-                </a:solidFill>
-              </a:defRPr>
-            </a:pPr>
-          </a:p>
-          <a:p>
-            <a:pPr>
-              <a:spcAft>
-                <a:spcPts val="400"/>
-              </a:spcAft>
-              <a:defRPr sz="1100">
-                <a:solidFill>
-                  <a:srgbClr val="323232"/>
-                </a:solidFill>
-              </a:defRPr>
-            </a:pPr>
-            <a:r>
-              <a:t>FIXED COSTS:</a:t>
-            </a:r>
-          </a:p>
-          <a:p>
-            <a:pPr>
-              <a:spcAft>
-                <a:spcPts val="400"/>
-              </a:spcAft>
-              <a:defRPr sz="1100">
-                <a:solidFill>
-                  <a:srgbClr val="323232"/>
-                </a:solidFill>
-              </a:defRPr>
-            </a:pPr>
-            <a:r>
-              <a:t>• Platform development &amp; maintenance: $15-20K/month</a:t>
-            </a:r>
-          </a:p>
-          <a:p>
-            <a:pPr>
-              <a:spcAft>
-                <a:spcPts val="400"/>
-              </a:spcAft>
-              <a:defRPr sz="1100">
-                <a:solidFill>
-                  <a:srgbClr val="323232"/>
-                </a:solidFill>
-              </a:defRPr>
-            </a:pPr>
-            <a:r>
-              <a:t>• Core team salaries: $40-60K/month</a:t>
-            </a:r>
-          </a:p>
-          <a:p>
-            <a:pPr>
-              <a:spcAft>
-                <a:spcPts val="400"/>
-              </a:spcAft>
-              <a:defRPr sz="1100">
-                <a:solidFill>
-                  <a:srgbClr val="323232"/>
-                </a:solidFill>
-              </a:defRPr>
-            </a:pPr>
-            <a:r>
-              <a:t>• Marketing &amp; sales: $10-15K/month</a:t>
-            </a:r>
-          </a:p>
-          <a:p>
-            <a:pPr>
-              <a:spcAft>
-                <a:spcPts val="400"/>
-              </a:spcAft>
-              <a:defRPr sz="1100">
-                <a:solidFill>
-                  <a:srgbClr val="323232"/>
-                </a:solidFill>
-              </a:defRPr>
-            </a:pPr>
-            <a:r>
-              <a:t>• Insurance (business): $2-5K/month</a:t>
-            </a:r>
-          </a:p>
-          <a:p>
-            <a:pPr>
-              <a:spcAft>
-                <a:spcPts val="400"/>
-              </a:spcAft>
-              <a:defRPr sz="1100">
-                <a:solidFill>
-                  <a:srgbClr val="323232"/>
-                </a:solidFill>
-              </a:defRPr>
-            </a:pPr>
-            <a:r>
-              <a:t>• Legal &amp; compliance: $3-5K/month</a:t>
-            </a:r>
-          </a:p>
-          <a:p>
-            <a:pPr>
-              <a:spcAft>
-                <a:spcPts val="400"/>
-              </a:spcAft>
-              <a:defRPr sz="1100">
-                <a:solidFill>
-                  <a:srgbClr val="323232"/>
-                </a:solidFill>
-              </a:defRPr>
-            </a:pPr>
-          </a:p>
-          <a:p>
-            <a:pPr>
-              <a:spcAft>
-                <a:spcPts val="400"/>
-              </a:spcAft>
-              <a:defRPr sz="1100">
-                <a:solidFill>
-                  <a:srgbClr val="323232"/>
-                </a:solidFill>
-              </a:defRPr>
-            </a:pPr>
-            <a:r>
-              <a:t>STARTUP COSTS:</a:t>
-            </a:r>
-          </a:p>
-          <a:p>
-            <a:pPr>
-              <a:spcAft>
-                <a:spcPts val="400"/>
-              </a:spcAft>
-              <a:defRPr sz="1100">
-                <a:solidFill>
-                  <a:srgbClr val="323232"/>
-                </a:solidFill>
-              </a:defRPr>
-            </a:pPr>
-            <a:r>
-              <a:t>• MVP development: $100-150K</a:t>
-            </a:r>
-          </a:p>
-          <a:p>
-            <a:pPr>
-              <a:spcAft>
-                <a:spcPts val="400"/>
-              </a:spcAft>
-              <a:defRPr sz="1100">
-                <a:solidFill>
-                  <a:srgbClr val="323232"/>
-                </a:solidFill>
-              </a:defRPr>
-            </a:pPr>
-            <a:r>
-              <a:t>• Initial market launch: $50K</a:t>
-            </a:r>
-          </a:p>
-          <a:p>
-            <a:pPr>
-              <a:spcAft>
-                <a:spcPts val="400"/>
-              </a:spcAft>
-              <a:defRPr sz="1100">
-                <a:solidFill>
-                  <a:srgbClr val="323232"/>
-                </a:solidFill>
-              </a:defRPr>
-            </a:pPr>
-            <a:r>
-              <a:t>• Working capital: $100K</a:t>
-            </a:r>
-          </a:p>
-          <a:p>
-            <a:pPr>
-              <a:spcAft>
-                <a:spcPts val="400"/>
-              </a:spcAft>
-              <a:defRPr sz="1100">
-                <a:solidFill>
-                  <a:srgbClr val="323232"/>
-                </a:solidFill>
-              </a:defRPr>
-            </a:pPr>
-          </a:p>
-          <a:p>
-            <a:pPr>
-              <a:spcAft>
-                <a:spcPts val="400"/>
-              </a:spcAft>
-              <a:defRPr sz="1100">
-                <a:solidFill>
-                  <a:srgbClr val="323232"/>
-                </a:solidFill>
-              </a:defRPr>
-            </a:pPr>
-            <a:r>
-              <a:t>TOTAL SEED NEED: $1.5M for 18-month runway</a:t>
+              <a:t>AV ECOSYSTEM:</a:t>
+            </a:r>
+          </a:p>
+          <a:p>
+            <a:pPr>
+              <a:spcAft>
+                <a:spcPts val="400"/>
+              </a:spcAft>
+              <a:defRPr sz="1100">
+                <a:solidFill>
+                  <a:srgbClr val="323232"/>
+                </a:solidFill>
+              </a:defRPr>
+            </a:pPr>
+            <a:r>
+              <a:t>• Waymo, Cruise, Zoox, Tesla (customers)</a:t>
+            </a:r>
+          </a:p>
+          <a:p>
+            <a:pPr>
+              <a:spcAft>
+                <a:spcPts val="400"/>
+              </a:spcAft>
+              <a:defRPr sz="1100">
+                <a:solidFill>
+                  <a:srgbClr val="323232"/>
+                </a:solidFill>
+              </a:defRPr>
+            </a:pPr>
+            <a:r>
+              <a:t>• Fleet management software providers</a:t>
+            </a:r>
+          </a:p>
+          <a:p>
+            <a:pPr>
+              <a:spcAft>
+                <a:spcPts val="400"/>
+              </a:spcAft>
+              <a:defRPr sz="1100">
+                <a:solidFill>
+                  <a:srgbClr val="323232"/>
+                </a:solidFill>
+              </a:defRPr>
+            </a:pPr>
+          </a:p>
+          <a:p>
+            <a:pPr>
+              <a:spcAft>
+                <a:spcPts val="400"/>
+              </a:spcAft>
+              <a:defRPr sz="1100">
+                <a:solidFill>
+                  <a:srgbClr val="323232"/>
+                </a:solidFill>
+              </a:defRPr>
+            </a:pPr>
+            <a:r>
+              <a:t>GIG ECONOMY:</a:t>
+            </a:r>
+          </a:p>
+          <a:p>
+            <a:pPr>
+              <a:spcAft>
+                <a:spcPts val="400"/>
+              </a:spcAft>
+              <a:defRPr sz="1100">
+                <a:solidFill>
+                  <a:srgbClr val="323232"/>
+                </a:solidFill>
+              </a:defRPr>
+            </a:pPr>
+            <a:r>
+              <a:t>• Existing gig platforms (recruitment channel)</a:t>
+            </a:r>
+          </a:p>
+          <a:p>
+            <a:pPr>
+              <a:spcAft>
+                <a:spcPts val="400"/>
+              </a:spcAft>
+              <a:defRPr sz="1100">
+                <a:solidFill>
+                  <a:srgbClr val="323232"/>
+                </a:solidFill>
+              </a:defRPr>
+            </a:pPr>
+            <a:r>
+              <a:t>• Detailing/cleaning training providers</a:t>
+            </a:r>
+          </a:p>
+          <a:p>
+            <a:pPr>
+              <a:spcAft>
+                <a:spcPts val="400"/>
+              </a:spcAft>
+              <a:defRPr sz="1100">
+                <a:solidFill>
+                  <a:srgbClr val="323232"/>
+                </a:solidFill>
+              </a:defRPr>
+            </a:pPr>
+            <a:r>
+              <a:t>• Equipment suppliers</a:t>
+            </a:r>
+          </a:p>
+          <a:p>
+            <a:pPr>
+              <a:spcAft>
+                <a:spcPts val="400"/>
+              </a:spcAft>
+              <a:defRPr sz="1100">
+                <a:solidFill>
+                  <a:srgbClr val="323232"/>
+                </a:solidFill>
+              </a:defRPr>
+            </a:pPr>
+          </a:p>
+          <a:p>
+            <a:pPr>
+              <a:spcAft>
+                <a:spcPts val="400"/>
+              </a:spcAft>
+              <a:defRPr sz="1100">
+                <a:solidFill>
+                  <a:srgbClr val="323232"/>
+                </a:solidFill>
+              </a:defRPr>
+            </a:pPr>
+            <a:r>
+              <a:t>SUPPORTING:</a:t>
+            </a:r>
+          </a:p>
+          <a:p>
+            <a:pPr>
+              <a:spcAft>
+                <a:spcPts val="400"/>
+              </a:spcAft>
+              <a:defRPr sz="1100">
+                <a:solidFill>
+                  <a:srgbClr val="323232"/>
+                </a:solidFill>
+              </a:defRPr>
+            </a:pPr>
+            <a:r>
+              <a:t>• Insurance providers (commercial auto, liability)</a:t>
+            </a:r>
+          </a:p>
+          <a:p>
+            <a:pPr>
+              <a:spcAft>
+                <a:spcPts val="400"/>
+              </a:spcAft>
+              <a:defRPr sz="1100">
+                <a:solidFill>
+                  <a:srgbClr val="323232"/>
+                </a:solidFill>
+              </a:defRPr>
+            </a:pPr>
+            <a:r>
+              <a:t>• Background check services</a:t>
+            </a:r>
+          </a:p>
+          <a:p>
+            <a:pPr>
+              <a:spcAft>
+                <a:spcPts val="400"/>
+              </a:spcAft>
+              <a:defRPr sz="1100">
+                <a:solidFill>
+                  <a:srgbClr val="323232"/>
+                </a:solidFill>
+              </a:defRPr>
+            </a:pPr>
+            <a:r>
+              <a:t>• Payment processing (Stripe, etc.)</a:t>
             </a:r>
           </a:p>
         </p:txBody>
@@ -7567,7 +7364,7 @@
               </a:defRPr>
             </a:pPr>
             <a:r>
-              <a:t>Financial Projections</a:t>
+              <a:t>Cost Structure</a:t>
             </a:r>
           </a:p>
         </p:txBody>
@@ -7605,268 +7402,223 @@
               </a:defRPr>
             </a:pPr>
             <a:r>
-              <a:t>YEAR 1:</a:t>
-            </a:r>
-          </a:p>
-          <a:p>
-            <a:pPr>
-              <a:spcAft>
-                <a:spcPts val="400"/>
-              </a:spcAft>
-              <a:defRPr sz="1100">
-                <a:solidFill>
-                  <a:srgbClr val="323232"/>
-                </a:solidFill>
-              </a:defRPr>
-            </a:pPr>
-            <a:r>
-              <a:t>• Markets: 1 (Phoenix or SF)</a:t>
-            </a:r>
-          </a:p>
-          <a:p>
-            <a:pPr>
-              <a:spcAft>
-                <a:spcPts val="400"/>
-              </a:spcAft>
-              <a:defRPr sz="1100">
-                <a:solidFill>
-                  <a:srgbClr val="323232"/>
-                </a:solidFill>
-              </a:defRPr>
-            </a:pPr>
-            <a:r>
-              <a:t>• Vehicles served: 500</a:t>
-            </a:r>
-          </a:p>
-          <a:p>
-            <a:pPr>
-              <a:spcAft>
-                <a:spcPts val="400"/>
-              </a:spcAft>
-              <a:defRPr sz="1100">
-                <a:solidFill>
-                  <a:srgbClr val="323232"/>
-                </a:solidFill>
-              </a:defRPr>
-            </a:pPr>
-            <a:r>
-              <a:t>• Revenue: $1.2M</a:t>
-            </a:r>
-          </a:p>
-          <a:p>
-            <a:pPr>
-              <a:spcAft>
-                <a:spcPts val="400"/>
-              </a:spcAft>
-              <a:defRPr sz="1100">
-                <a:solidFill>
-                  <a:srgbClr val="323232"/>
-                </a:solidFill>
-              </a:defRPr>
-            </a:pPr>
-            <a:r>
-              <a:t>• Net: -$300K (investment phase)</a:t>
-            </a:r>
-          </a:p>
-          <a:p>
-            <a:pPr>
-              <a:spcAft>
-                <a:spcPts val="400"/>
-              </a:spcAft>
-              <a:defRPr sz="1100">
-                <a:solidFill>
-                  <a:srgbClr val="323232"/>
-                </a:solidFill>
-              </a:defRPr>
-            </a:pPr>
-          </a:p>
-          <a:p>
-            <a:pPr>
-              <a:spcAft>
-                <a:spcPts val="400"/>
-              </a:spcAft>
-              <a:defRPr sz="1100">
-                <a:solidFill>
-                  <a:srgbClr val="323232"/>
-                </a:solidFill>
-              </a:defRPr>
-            </a:pPr>
-            <a:r>
-              <a:t>YEAR 2:</a:t>
-            </a:r>
-          </a:p>
-          <a:p>
-            <a:pPr>
-              <a:spcAft>
-                <a:spcPts val="400"/>
-              </a:spcAft>
-              <a:defRPr sz="1100">
-                <a:solidFill>
-                  <a:srgbClr val="323232"/>
-                </a:solidFill>
-              </a:defRPr>
-            </a:pPr>
-            <a:r>
-              <a:t>• Markets: 3</a:t>
-            </a:r>
-          </a:p>
-          <a:p>
-            <a:pPr>
-              <a:spcAft>
-                <a:spcPts val="400"/>
-              </a:spcAft>
-              <a:defRPr sz="1100">
-                <a:solidFill>
-                  <a:srgbClr val="323232"/>
-                </a:solidFill>
-              </a:defRPr>
-            </a:pPr>
-            <a:r>
-              <a:t>• Vehicles served: 3,000</a:t>
-            </a:r>
-          </a:p>
-          <a:p>
-            <a:pPr>
-              <a:spcAft>
-                <a:spcPts val="400"/>
-              </a:spcAft>
-              <a:defRPr sz="1100">
-                <a:solidFill>
-                  <a:srgbClr val="323232"/>
-                </a:solidFill>
-              </a:defRPr>
-            </a:pPr>
-            <a:r>
-              <a:t>• Revenue: $5.5M</a:t>
-            </a:r>
-          </a:p>
-          <a:p>
-            <a:pPr>
-              <a:spcAft>
-                <a:spcPts val="400"/>
-              </a:spcAft>
-              <a:defRPr sz="1100">
-                <a:solidFill>
-                  <a:srgbClr val="323232"/>
-                </a:solidFill>
-              </a:defRPr>
-            </a:pPr>
-            <a:r>
-              <a:t>• Net: +$800K</a:t>
-            </a:r>
-          </a:p>
-          <a:p>
-            <a:pPr>
-              <a:spcAft>
-                <a:spcPts val="400"/>
-              </a:spcAft>
-              <a:defRPr sz="1100">
-                <a:solidFill>
-                  <a:srgbClr val="323232"/>
-                </a:solidFill>
-              </a:defRPr>
-            </a:pPr>
-          </a:p>
-          <a:p>
-            <a:pPr>
-              <a:spcAft>
-                <a:spcPts val="400"/>
-              </a:spcAft>
-              <a:defRPr sz="1100">
-                <a:solidFill>
-                  <a:srgbClr val="323232"/>
-                </a:solidFill>
-              </a:defRPr>
-            </a:pPr>
-            <a:r>
-              <a:t>YEAR 3:</a:t>
-            </a:r>
-          </a:p>
-          <a:p>
-            <a:pPr>
-              <a:spcAft>
-                <a:spcPts val="400"/>
-              </a:spcAft>
-              <a:defRPr sz="1100">
-                <a:solidFill>
-                  <a:srgbClr val="323232"/>
-                </a:solidFill>
-              </a:defRPr>
-            </a:pPr>
-            <a:r>
-              <a:t>• Markets: 7</a:t>
-            </a:r>
-          </a:p>
-          <a:p>
-            <a:pPr>
-              <a:spcAft>
-                <a:spcPts val="400"/>
-              </a:spcAft>
-              <a:defRPr sz="1100">
-                <a:solidFill>
-                  <a:srgbClr val="323232"/>
-                </a:solidFill>
-              </a:defRPr>
-            </a:pPr>
-            <a:r>
-              <a:t>• Vehicles served: 10,000</a:t>
-            </a:r>
-          </a:p>
-          <a:p>
-            <a:pPr>
-              <a:spcAft>
-                <a:spcPts val="400"/>
-              </a:spcAft>
-              <a:defRPr sz="1100">
-                <a:solidFill>
-                  <a:srgbClr val="323232"/>
-                </a:solidFill>
-              </a:defRPr>
-            </a:pPr>
-            <a:r>
-              <a:t>• Revenue: $15M</a:t>
-            </a:r>
-          </a:p>
-          <a:p>
-            <a:pPr>
-              <a:spcAft>
-                <a:spcPts val="400"/>
-              </a:spcAft>
-              <a:defRPr sz="1100">
-                <a:solidFill>
-                  <a:srgbClr val="323232"/>
-                </a:solidFill>
-              </a:defRPr>
-            </a:pPr>
-            <a:r>
-              <a:t>• Net: +$3.5M</a:t>
-            </a:r>
-          </a:p>
-          <a:p>
-            <a:pPr>
-              <a:spcAft>
-                <a:spcPts val="400"/>
-              </a:spcAft>
-              <a:defRPr sz="1100">
-                <a:solidFill>
-                  <a:srgbClr val="323232"/>
-                </a:solidFill>
-              </a:defRPr>
-            </a:pPr>
-          </a:p>
-          <a:p>
-            <a:pPr>
-              <a:spcAft>
-                <a:spcPts val="400"/>
-              </a:spcAft>
-              <a:defRPr sz="1100">
-                <a:solidFill>
-                  <a:srgbClr val="323232"/>
-                </a:solidFill>
-              </a:defRPr>
-            </a:pPr>
-            <a:r>
-              <a:t>PATH TO $10M ARR: 36 months</a:t>
+              <a:t>VARIABLE COSTS (scale with volume):</a:t>
+            </a:r>
+          </a:p>
+          <a:p>
+            <a:pPr>
+              <a:spcAft>
+                <a:spcPts val="400"/>
+              </a:spcAft>
+              <a:defRPr sz="1100">
+                <a:solidFill>
+                  <a:srgbClr val="323232"/>
+                </a:solidFill>
+              </a:defRPr>
+            </a:pPr>
+            <a:r>
+              <a:t>• Technician payouts: 65-70% of service revenue</a:t>
+            </a:r>
+          </a:p>
+          <a:p>
+            <a:pPr>
+              <a:spcAft>
+                <a:spcPts val="400"/>
+              </a:spcAft>
+              <a:defRPr sz="1100">
+                <a:solidFill>
+                  <a:srgbClr val="323232"/>
+                </a:solidFill>
+              </a:defRPr>
+            </a:pPr>
+            <a:r>
+              <a:t>• Payment processing: 2-3%</a:t>
+            </a:r>
+          </a:p>
+          <a:p>
+            <a:pPr>
+              <a:spcAft>
+                <a:spcPts val="400"/>
+              </a:spcAft>
+              <a:defRPr sz="1100">
+                <a:solidFill>
+                  <a:srgbClr val="323232"/>
+                </a:solidFill>
+              </a:defRPr>
+            </a:pPr>
+          </a:p>
+          <a:p>
+            <a:pPr>
+              <a:spcAft>
+                <a:spcPts val="400"/>
+              </a:spcAft>
+              <a:defRPr sz="1100">
+                <a:solidFill>
+                  <a:srgbClr val="323232"/>
+                </a:solidFill>
+              </a:defRPr>
+            </a:pPr>
+            <a:r>
+              <a:t>FIXED COSTS:</a:t>
+            </a:r>
+          </a:p>
+          <a:p>
+            <a:pPr>
+              <a:spcAft>
+                <a:spcPts val="400"/>
+              </a:spcAft>
+              <a:defRPr sz="1100">
+                <a:solidFill>
+                  <a:srgbClr val="323232"/>
+                </a:solidFill>
+              </a:defRPr>
+            </a:pPr>
+            <a:r>
+              <a:t>• Platform development &amp; maintenance: $15-20K/month</a:t>
+            </a:r>
+          </a:p>
+          <a:p>
+            <a:pPr>
+              <a:spcAft>
+                <a:spcPts val="400"/>
+              </a:spcAft>
+              <a:defRPr sz="1100">
+                <a:solidFill>
+                  <a:srgbClr val="323232"/>
+                </a:solidFill>
+              </a:defRPr>
+            </a:pPr>
+            <a:r>
+              <a:t>• Core team salaries: $40-60K/month</a:t>
+            </a:r>
+          </a:p>
+          <a:p>
+            <a:pPr>
+              <a:spcAft>
+                <a:spcPts val="400"/>
+              </a:spcAft>
+              <a:defRPr sz="1100">
+                <a:solidFill>
+                  <a:srgbClr val="323232"/>
+                </a:solidFill>
+              </a:defRPr>
+            </a:pPr>
+            <a:r>
+              <a:t>• Marketing &amp; sales: $10-15K/month</a:t>
+            </a:r>
+          </a:p>
+          <a:p>
+            <a:pPr>
+              <a:spcAft>
+                <a:spcPts val="400"/>
+              </a:spcAft>
+              <a:defRPr sz="1100">
+                <a:solidFill>
+                  <a:srgbClr val="323232"/>
+                </a:solidFill>
+              </a:defRPr>
+            </a:pPr>
+            <a:r>
+              <a:t>• Insurance &amp; legal: $5-10K/month</a:t>
+            </a:r>
+          </a:p>
+          <a:p>
+            <a:pPr>
+              <a:spcAft>
+                <a:spcPts val="400"/>
+              </a:spcAft>
+              <a:defRPr sz="1100">
+                <a:solidFill>
+                  <a:srgbClr val="323232"/>
+                </a:solidFill>
+              </a:defRPr>
+            </a:pPr>
+          </a:p>
+          <a:p>
+            <a:pPr>
+              <a:spcAft>
+                <a:spcPts val="400"/>
+              </a:spcAft>
+              <a:defRPr sz="1100">
+                <a:solidFill>
+                  <a:srgbClr val="323232"/>
+                </a:solidFill>
+              </a:defRPr>
+            </a:pPr>
+            <a:r>
+              <a:t>STARTUP COSTS:</a:t>
+            </a:r>
+          </a:p>
+          <a:p>
+            <a:pPr>
+              <a:spcAft>
+                <a:spcPts val="400"/>
+              </a:spcAft>
+              <a:defRPr sz="1100">
+                <a:solidFill>
+                  <a:srgbClr val="323232"/>
+                </a:solidFill>
+              </a:defRPr>
+            </a:pPr>
+            <a:r>
+              <a:t>• MVP development: $100-150K</a:t>
+            </a:r>
+          </a:p>
+          <a:p>
+            <a:pPr>
+              <a:spcAft>
+                <a:spcPts val="400"/>
+              </a:spcAft>
+              <a:defRPr sz="1100">
+                <a:solidFill>
+                  <a:srgbClr val="323232"/>
+                </a:solidFill>
+              </a:defRPr>
+            </a:pPr>
+            <a:r>
+              <a:t>• Initial market launch: $50K</a:t>
+            </a:r>
+          </a:p>
+          <a:p>
+            <a:pPr>
+              <a:spcAft>
+                <a:spcPts val="400"/>
+              </a:spcAft>
+              <a:defRPr sz="1100">
+                <a:solidFill>
+                  <a:srgbClr val="323232"/>
+                </a:solidFill>
+              </a:defRPr>
+            </a:pPr>
+            <a:r>
+              <a:t>• Working capital: $100K</a:t>
+            </a:r>
+          </a:p>
+          <a:p>
+            <a:pPr>
+              <a:spcAft>
+                <a:spcPts val="400"/>
+              </a:spcAft>
+              <a:defRPr sz="1100">
+                <a:solidFill>
+                  <a:srgbClr val="323232"/>
+                </a:solidFill>
+              </a:defRPr>
+            </a:pPr>
+          </a:p>
+          <a:p>
+            <a:pPr>
+              <a:spcAft>
+                <a:spcPts val="400"/>
+              </a:spcAft>
+              <a:defRPr sz="1100">
+                <a:solidFill>
+                  <a:srgbClr val="323232"/>
+                </a:solidFill>
+              </a:defRPr>
+            </a:pPr>
+            <a:r>
+              <a:t>TOTAL SEED NEED: $1.5M for 18-month runway</a:t>
             </a:r>
           </a:p>
         </p:txBody>
@@ -7997,7 +7749,7 @@
               </a:defRPr>
             </a:pPr>
             <a:r>
-              <a:t>The Ask</a:t>
+              <a:t>Financial Projections</a:t>
             </a:r>
           </a:p>
         </p:txBody>
@@ -8035,208 +7787,223 @@
               </a:defRPr>
             </a:pPr>
             <a:r>
-              <a:t>RAISING: $1.5M Seed Round</a:t>
-            </a:r>
-          </a:p>
-          <a:p>
-            <a:pPr>
-              <a:spcAft>
-                <a:spcPts val="400"/>
-              </a:spcAft>
-              <a:defRPr sz="1100">
-                <a:solidFill>
-                  <a:srgbClr val="323232"/>
-                </a:solidFill>
-              </a:defRPr>
-            </a:pPr>
-          </a:p>
-          <a:p>
-            <a:pPr>
-              <a:spcAft>
-                <a:spcPts val="400"/>
-              </a:spcAft>
-              <a:defRPr sz="1100">
-                <a:solidFill>
-                  <a:srgbClr val="323232"/>
-                </a:solidFill>
-              </a:defRPr>
-            </a:pPr>
-            <a:r>
-              <a:t>USE OF FUNDS:</a:t>
-            </a:r>
-          </a:p>
-          <a:p>
-            <a:pPr>
-              <a:spcAft>
-                <a:spcPts val="400"/>
-              </a:spcAft>
-              <a:defRPr sz="1100">
-                <a:solidFill>
-                  <a:srgbClr val="323232"/>
-                </a:solidFill>
-              </a:defRPr>
-            </a:pPr>
-            <a:r>
-              <a:t>• Product Development (40%): Platform, apps, API integrations</a:t>
-            </a:r>
-          </a:p>
-          <a:p>
-            <a:pPr>
-              <a:spcAft>
-                <a:spcPts val="400"/>
-              </a:spcAft>
-              <a:defRPr sz="1100">
-                <a:solidFill>
-                  <a:srgbClr val="323232"/>
-                </a:solidFill>
-              </a:defRPr>
-            </a:pPr>
-            <a:r>
-              <a:t>• Operations (30%): Tech recruitment, training, equipment</a:t>
-            </a:r>
-          </a:p>
-          <a:p>
-            <a:pPr>
-              <a:spcAft>
-                <a:spcPts val="400"/>
-              </a:spcAft>
-              <a:defRPr sz="1100">
-                <a:solidFill>
-                  <a:srgbClr val="323232"/>
-                </a:solidFill>
-              </a:defRPr>
-            </a:pPr>
-            <a:r>
-              <a:t>• Sales (20%): Enterprise BD, pilot programs</a:t>
-            </a:r>
-          </a:p>
-          <a:p>
-            <a:pPr>
-              <a:spcAft>
-                <a:spcPts val="400"/>
-              </a:spcAft>
-              <a:defRPr sz="1100">
-                <a:solidFill>
-                  <a:srgbClr val="323232"/>
-                </a:solidFill>
-              </a:defRPr>
-            </a:pPr>
-            <a:r>
-              <a:t>• G&amp;A (10%): Legal, insurance, admin</a:t>
-            </a:r>
-          </a:p>
-          <a:p>
-            <a:pPr>
-              <a:spcAft>
-                <a:spcPts val="400"/>
-              </a:spcAft>
-              <a:defRPr sz="1100">
-                <a:solidFill>
-                  <a:srgbClr val="323232"/>
-                </a:solidFill>
-              </a:defRPr>
-            </a:pPr>
-          </a:p>
-          <a:p>
-            <a:pPr>
-              <a:spcAft>
-                <a:spcPts val="400"/>
-              </a:spcAft>
-              <a:defRPr sz="1100">
-                <a:solidFill>
-                  <a:srgbClr val="323232"/>
-                </a:solidFill>
-              </a:defRPr>
-            </a:pPr>
-            <a:r>
-              <a:t>MILESTONES TO SERIES A:</a:t>
-            </a:r>
-          </a:p>
-          <a:p>
-            <a:pPr>
-              <a:spcAft>
-                <a:spcPts val="400"/>
-              </a:spcAft>
-              <a:defRPr sz="1100">
-                <a:solidFill>
-                  <a:srgbClr val="323232"/>
-                </a:solidFill>
-              </a:defRPr>
-            </a:pPr>
-            <a:r>
-              <a:t>• 1 enterprise contract with major AV operator</a:t>
-            </a:r>
-          </a:p>
-          <a:p>
-            <a:pPr>
-              <a:spcAft>
-                <a:spcPts val="400"/>
-              </a:spcAft>
-              <a:defRPr sz="1100">
-                <a:solidFill>
-                  <a:srgbClr val="323232"/>
-                </a:solidFill>
-              </a:defRPr>
-            </a:pPr>
-            <a:r>
-              <a:t>• 1,000+ services/month</a:t>
-            </a:r>
-          </a:p>
-          <a:p>
-            <a:pPr>
-              <a:spcAft>
-                <a:spcPts val="400"/>
-              </a:spcAft>
-              <a:defRPr sz="1100">
-                <a:solidFill>
-                  <a:srgbClr val="323232"/>
-                </a:solidFill>
-              </a:defRPr>
-            </a:pPr>
-            <a:r>
-              <a:t>• Positive unit economics proven</a:t>
-            </a:r>
-          </a:p>
-          <a:p>
-            <a:pPr>
-              <a:spcAft>
-                <a:spcPts val="400"/>
-              </a:spcAft>
-              <a:defRPr sz="1100">
-                <a:solidFill>
-                  <a:srgbClr val="323232"/>
-                </a:solidFill>
-              </a:defRPr>
-            </a:pPr>
-            <a:r>
-              <a:t>• Expansion to 2nd market</a:t>
-            </a:r>
-          </a:p>
-          <a:p>
-            <a:pPr>
-              <a:spcAft>
-                <a:spcPts val="400"/>
-              </a:spcAft>
-              <a:defRPr sz="1100">
-                <a:solidFill>
-                  <a:srgbClr val="323232"/>
-                </a:solidFill>
-              </a:defRPr>
-            </a:pPr>
-          </a:p>
-          <a:p>
-            <a:pPr>
-              <a:spcAft>
-                <a:spcPts val="400"/>
-              </a:spcAft>
-              <a:defRPr sz="1100">
-                <a:solidFill>
-                  <a:srgbClr val="323232"/>
-                </a:solidFill>
-              </a:defRPr>
-            </a:pPr>
-            <a:r>
-              <a:t>RUNWAY: 18 months to Series A metrics</a:t>
+              <a:t>YEAR 1:</a:t>
+            </a:r>
+          </a:p>
+          <a:p>
+            <a:pPr>
+              <a:spcAft>
+                <a:spcPts val="400"/>
+              </a:spcAft>
+              <a:defRPr sz="1100">
+                <a:solidFill>
+                  <a:srgbClr val="323232"/>
+                </a:solidFill>
+              </a:defRPr>
+            </a:pPr>
+            <a:r>
+              <a:t>• Markets: 1 (Phoenix or SF)</a:t>
+            </a:r>
+          </a:p>
+          <a:p>
+            <a:pPr>
+              <a:spcAft>
+                <a:spcPts val="400"/>
+              </a:spcAft>
+              <a:defRPr sz="1100">
+                <a:solidFill>
+                  <a:srgbClr val="323232"/>
+                </a:solidFill>
+              </a:defRPr>
+            </a:pPr>
+            <a:r>
+              <a:t>• Vehicles served: 500</a:t>
+            </a:r>
+          </a:p>
+          <a:p>
+            <a:pPr>
+              <a:spcAft>
+                <a:spcPts val="400"/>
+              </a:spcAft>
+              <a:defRPr sz="1100">
+                <a:solidFill>
+                  <a:srgbClr val="323232"/>
+                </a:solidFill>
+              </a:defRPr>
+            </a:pPr>
+            <a:r>
+              <a:t>• Revenue: $1.2M | Net: -$300K (investment phase)</a:t>
+            </a:r>
+          </a:p>
+          <a:p>
+            <a:pPr>
+              <a:spcAft>
+                <a:spcPts val="400"/>
+              </a:spcAft>
+              <a:defRPr sz="1100">
+                <a:solidFill>
+                  <a:srgbClr val="323232"/>
+                </a:solidFill>
+              </a:defRPr>
+            </a:pPr>
+          </a:p>
+          <a:p>
+            <a:pPr>
+              <a:spcAft>
+                <a:spcPts val="400"/>
+              </a:spcAft>
+              <a:defRPr sz="1100">
+                <a:solidFill>
+                  <a:srgbClr val="323232"/>
+                </a:solidFill>
+              </a:defRPr>
+            </a:pPr>
+            <a:r>
+              <a:t>YEAR 2:</a:t>
+            </a:r>
+          </a:p>
+          <a:p>
+            <a:pPr>
+              <a:spcAft>
+                <a:spcPts val="400"/>
+              </a:spcAft>
+              <a:defRPr sz="1100">
+                <a:solidFill>
+                  <a:srgbClr val="323232"/>
+                </a:solidFill>
+              </a:defRPr>
+            </a:pPr>
+            <a:r>
+              <a:t>• Markets: 3</a:t>
+            </a:r>
+          </a:p>
+          <a:p>
+            <a:pPr>
+              <a:spcAft>
+                <a:spcPts val="400"/>
+              </a:spcAft>
+              <a:defRPr sz="1100">
+                <a:solidFill>
+                  <a:srgbClr val="323232"/>
+                </a:solidFill>
+              </a:defRPr>
+            </a:pPr>
+            <a:r>
+              <a:t>• Vehicles served: 3,000</a:t>
+            </a:r>
+          </a:p>
+          <a:p>
+            <a:pPr>
+              <a:spcAft>
+                <a:spcPts val="400"/>
+              </a:spcAft>
+              <a:defRPr sz="1100">
+                <a:solidFill>
+                  <a:srgbClr val="323232"/>
+                </a:solidFill>
+              </a:defRPr>
+            </a:pPr>
+            <a:r>
+              <a:t>• Revenue: $5.5M | Net: +$800K</a:t>
+            </a:r>
+          </a:p>
+          <a:p>
+            <a:pPr>
+              <a:spcAft>
+                <a:spcPts val="400"/>
+              </a:spcAft>
+              <a:defRPr sz="1100">
+                <a:solidFill>
+                  <a:srgbClr val="323232"/>
+                </a:solidFill>
+              </a:defRPr>
+            </a:pPr>
+          </a:p>
+          <a:p>
+            <a:pPr>
+              <a:spcAft>
+                <a:spcPts val="400"/>
+              </a:spcAft>
+              <a:defRPr sz="1100">
+                <a:solidFill>
+                  <a:srgbClr val="323232"/>
+                </a:solidFill>
+              </a:defRPr>
+            </a:pPr>
+            <a:r>
+              <a:t>YEAR 3:</a:t>
+            </a:r>
+          </a:p>
+          <a:p>
+            <a:pPr>
+              <a:spcAft>
+                <a:spcPts val="400"/>
+              </a:spcAft>
+              <a:defRPr sz="1100">
+                <a:solidFill>
+                  <a:srgbClr val="323232"/>
+                </a:solidFill>
+              </a:defRPr>
+            </a:pPr>
+            <a:r>
+              <a:t>• Markets: 7</a:t>
+            </a:r>
+          </a:p>
+          <a:p>
+            <a:pPr>
+              <a:spcAft>
+                <a:spcPts val="400"/>
+              </a:spcAft>
+              <a:defRPr sz="1100">
+                <a:solidFill>
+                  <a:srgbClr val="323232"/>
+                </a:solidFill>
+              </a:defRPr>
+            </a:pPr>
+            <a:r>
+              <a:t>• Vehicles served: 10,000</a:t>
+            </a:r>
+          </a:p>
+          <a:p>
+            <a:pPr>
+              <a:spcAft>
+                <a:spcPts val="400"/>
+              </a:spcAft>
+              <a:defRPr sz="1100">
+                <a:solidFill>
+                  <a:srgbClr val="323232"/>
+                </a:solidFill>
+              </a:defRPr>
+            </a:pPr>
+            <a:r>
+              <a:t>• Revenue: $15M | Net: +$3.5M</a:t>
+            </a:r>
+          </a:p>
+          <a:p>
+            <a:pPr>
+              <a:spcAft>
+                <a:spcPts val="400"/>
+              </a:spcAft>
+              <a:defRPr sz="1100">
+                <a:solidFill>
+                  <a:srgbClr val="323232"/>
+                </a:solidFill>
+              </a:defRPr>
+            </a:pPr>
+          </a:p>
+          <a:p>
+            <a:pPr>
+              <a:spcAft>
+                <a:spcPts val="400"/>
+              </a:spcAft>
+              <a:defRPr sz="1100">
+                <a:solidFill>
+                  <a:srgbClr val="323232"/>
+                </a:solidFill>
+              </a:defRPr>
+            </a:pPr>
+            <a:r>
+              <a:t>PATH TO $10M ARR: 36 months</a:t>
             </a:r>
           </a:p>
         </p:txBody>
@@ -8250,6 +8017,361 @@
 </file>
 
 <file path=ppt/slides/slide22.xml><?xml version="1.0" encoding="utf-8"?>
+<p:sld xmlns:a="http://schemas.openxmlformats.org/drawingml/2006/main" xmlns:p="http://schemas.openxmlformats.org/presentationml/2006/main" xmlns:r="http://schemas.openxmlformats.org/officeDocument/2006/relationships">
+  <p:cSld>
+    <p:spTree>
+      <p:nvGrpSpPr>
+        <p:cNvPr id="1" name=""/>
+        <p:cNvGrpSpPr/>
+        <p:nvPr/>
+      </p:nvGrpSpPr>
+      <p:grpSpPr/>
+      <p:sp>
+        <p:nvSpPr>
+          <p:cNvPr id="2" name="Rectangle 1"/>
+          <p:cNvSpPr/>
+          <p:nvPr/>
+        </p:nvSpPr>
+        <p:spPr>
+          <a:xfrm>
+            <a:off x="0" y="0"/>
+            <a:ext cx="9144000" cy="548640"/>
+          </a:xfrm>
+          <a:prstGeom prst="rect">
+            <a:avLst/>
+          </a:prstGeom>
+          <a:solidFill>
+            <a:srgbClr val="003366"/>
+          </a:solidFill>
+          <a:ln>
+            <a:noFill/>
+          </a:ln>
+        </p:spPr>
+        <p:style>
+          <a:lnRef idx="1">
+            <a:schemeClr val="accent1"/>
+          </a:lnRef>
+          <a:fillRef idx="3">
+            <a:schemeClr val="accent1"/>
+          </a:fillRef>
+          <a:effectRef idx="2">
+            <a:schemeClr val="accent1"/>
+          </a:effectRef>
+          <a:fontRef idx="minor">
+            <a:schemeClr val="lt1"/>
+          </a:fontRef>
+        </p:style>
+        <p:txBody>
+          <a:bodyPr rtlCol="0" anchor="ctr"/>
+          <a:lstStyle/>
+          <a:p>
+            <a:pPr algn="ctr"/>
+          </a:p>
+        </p:txBody>
+      </p:sp>
+      <p:sp>
+        <p:nvSpPr>
+          <p:cNvPr id="3" name="TextBox 2"/>
+          <p:cNvSpPr txBox="1"/>
+          <p:nvPr/>
+        </p:nvSpPr>
+        <p:spPr>
+          <a:xfrm>
+            <a:off x="182880" y="109728"/>
+            <a:ext cx="365760" cy="320040"/>
+          </a:xfrm>
+          <a:prstGeom prst="rect">
+            <a:avLst/>
+          </a:prstGeom>
+          <a:noFill/>
+        </p:spPr>
+        <p:txBody>
+          <a:bodyPr wrap="none">
+            <a:spAutoFit/>
+          </a:bodyPr>
+          <a:lstStyle/>
+          <a:p>
+            <a:pPr>
+              <a:defRPr sz="1400" b="1">
+                <a:solidFill>
+                  <a:srgbClr val="FFFFFF"/>
+                </a:solidFill>
+              </a:defRPr>
+            </a:pPr>
+            <a:r>
+              <a:t>21</a:t>
+            </a:r>
+          </a:p>
+        </p:txBody>
+      </p:sp>
+      <p:sp>
+        <p:nvSpPr>
+          <p:cNvPr id="4" name="TextBox 3"/>
+          <p:cNvSpPr txBox="1"/>
+          <p:nvPr/>
+        </p:nvSpPr>
+        <p:spPr>
+          <a:xfrm>
+            <a:off x="548640" y="109728"/>
+            <a:ext cx="7772400" cy="365760"/>
+          </a:xfrm>
+          <a:prstGeom prst="rect">
+            <a:avLst/>
+          </a:prstGeom>
+          <a:noFill/>
+        </p:spPr>
+        <p:txBody>
+          <a:bodyPr wrap="none">
+            <a:spAutoFit/>
+          </a:bodyPr>
+          <a:lstStyle/>
+          <a:p>
+            <a:pPr>
+              <a:defRPr sz="2000" b="1">
+                <a:solidFill>
+                  <a:srgbClr val="FFFFFF"/>
+                </a:solidFill>
+              </a:defRPr>
+            </a:pPr>
+            <a:r>
+              <a:t>The Ask</a:t>
+            </a:r>
+          </a:p>
+        </p:txBody>
+      </p:sp>
+      <p:sp>
+        <p:nvSpPr>
+          <p:cNvPr id="5" name="TextBox 4"/>
+          <p:cNvSpPr txBox="1"/>
+          <p:nvPr/>
+        </p:nvSpPr>
+        <p:spPr>
+          <a:xfrm>
+            <a:off x="365760" y="685800"/>
+            <a:ext cx="8412480" cy="4297680"/>
+          </a:xfrm>
+          <a:prstGeom prst="rect">
+            <a:avLst/>
+          </a:prstGeom>
+          <a:noFill/>
+        </p:spPr>
+        <p:txBody>
+          <a:bodyPr wrap="square">
+            <a:spAutoFit/>
+          </a:bodyPr>
+          <a:lstStyle/>
+          <a:p>
+            <a:pPr>
+              <a:spcAft>
+                <a:spcPts val="400"/>
+              </a:spcAft>
+              <a:defRPr sz="1100">
+                <a:solidFill>
+                  <a:srgbClr val="323232"/>
+                </a:solidFill>
+              </a:defRPr>
+            </a:pPr>
+            <a:r>
+              <a:t>RAISING: $1.5M Seed Round</a:t>
+            </a:r>
+          </a:p>
+          <a:p>
+            <a:pPr>
+              <a:spcAft>
+                <a:spcPts val="400"/>
+              </a:spcAft>
+              <a:defRPr sz="1100">
+                <a:solidFill>
+                  <a:srgbClr val="323232"/>
+                </a:solidFill>
+              </a:defRPr>
+            </a:pPr>
+          </a:p>
+          <a:p>
+            <a:pPr>
+              <a:spcAft>
+                <a:spcPts val="400"/>
+              </a:spcAft>
+              <a:defRPr sz="1100">
+                <a:solidFill>
+                  <a:srgbClr val="323232"/>
+                </a:solidFill>
+              </a:defRPr>
+            </a:pPr>
+            <a:r>
+              <a:t>USE OF FUNDS:</a:t>
+            </a:r>
+          </a:p>
+          <a:p>
+            <a:pPr>
+              <a:spcAft>
+                <a:spcPts val="400"/>
+              </a:spcAft>
+              <a:defRPr sz="1100">
+                <a:solidFill>
+                  <a:srgbClr val="323232"/>
+                </a:solidFill>
+              </a:defRPr>
+            </a:pPr>
+            <a:r>
+              <a:t>• Product Development (40%): Platform, apps, API integrations</a:t>
+            </a:r>
+          </a:p>
+          <a:p>
+            <a:pPr>
+              <a:spcAft>
+                <a:spcPts val="400"/>
+              </a:spcAft>
+              <a:defRPr sz="1100">
+                <a:solidFill>
+                  <a:srgbClr val="323232"/>
+                </a:solidFill>
+              </a:defRPr>
+            </a:pPr>
+            <a:r>
+              <a:t>• Operations (30%): Tech recruitment, training, equipment</a:t>
+            </a:r>
+          </a:p>
+          <a:p>
+            <a:pPr>
+              <a:spcAft>
+                <a:spcPts val="400"/>
+              </a:spcAft>
+              <a:defRPr sz="1100">
+                <a:solidFill>
+                  <a:srgbClr val="323232"/>
+                </a:solidFill>
+              </a:defRPr>
+            </a:pPr>
+            <a:r>
+              <a:t>• Sales (20%): Enterprise BD, pilot programs</a:t>
+            </a:r>
+          </a:p>
+          <a:p>
+            <a:pPr>
+              <a:spcAft>
+                <a:spcPts val="400"/>
+              </a:spcAft>
+              <a:defRPr sz="1100">
+                <a:solidFill>
+                  <a:srgbClr val="323232"/>
+                </a:solidFill>
+              </a:defRPr>
+            </a:pPr>
+            <a:r>
+              <a:t>• G&amp;A (10%): Legal, insurance, admin</a:t>
+            </a:r>
+          </a:p>
+          <a:p>
+            <a:pPr>
+              <a:spcAft>
+                <a:spcPts val="400"/>
+              </a:spcAft>
+              <a:defRPr sz="1100">
+                <a:solidFill>
+                  <a:srgbClr val="323232"/>
+                </a:solidFill>
+              </a:defRPr>
+            </a:pPr>
+          </a:p>
+          <a:p>
+            <a:pPr>
+              <a:spcAft>
+                <a:spcPts val="400"/>
+              </a:spcAft>
+              <a:defRPr sz="1100">
+                <a:solidFill>
+                  <a:srgbClr val="323232"/>
+                </a:solidFill>
+              </a:defRPr>
+            </a:pPr>
+            <a:r>
+              <a:t>MILESTONES TO SERIES A:</a:t>
+            </a:r>
+          </a:p>
+          <a:p>
+            <a:pPr>
+              <a:spcAft>
+                <a:spcPts val="400"/>
+              </a:spcAft>
+              <a:defRPr sz="1100">
+                <a:solidFill>
+                  <a:srgbClr val="323232"/>
+                </a:solidFill>
+              </a:defRPr>
+            </a:pPr>
+            <a:r>
+              <a:t>• 1 enterprise contract with major AV operator</a:t>
+            </a:r>
+          </a:p>
+          <a:p>
+            <a:pPr>
+              <a:spcAft>
+                <a:spcPts val="400"/>
+              </a:spcAft>
+              <a:defRPr sz="1100">
+                <a:solidFill>
+                  <a:srgbClr val="323232"/>
+                </a:solidFill>
+              </a:defRPr>
+            </a:pPr>
+            <a:r>
+              <a:t>• 1,000+ services/month</a:t>
+            </a:r>
+          </a:p>
+          <a:p>
+            <a:pPr>
+              <a:spcAft>
+                <a:spcPts val="400"/>
+              </a:spcAft>
+              <a:defRPr sz="1100">
+                <a:solidFill>
+                  <a:srgbClr val="323232"/>
+                </a:solidFill>
+              </a:defRPr>
+            </a:pPr>
+            <a:r>
+              <a:t>• Positive unit economics proven</a:t>
+            </a:r>
+          </a:p>
+          <a:p>
+            <a:pPr>
+              <a:spcAft>
+                <a:spcPts val="400"/>
+              </a:spcAft>
+              <a:defRPr sz="1100">
+                <a:solidFill>
+                  <a:srgbClr val="323232"/>
+                </a:solidFill>
+              </a:defRPr>
+            </a:pPr>
+          </a:p>
+          <a:p>
+            <a:pPr>
+              <a:spcAft>
+                <a:spcPts val="400"/>
+              </a:spcAft>
+              <a:defRPr sz="1100">
+                <a:solidFill>
+                  <a:srgbClr val="323232"/>
+                </a:solidFill>
+              </a:defRPr>
+            </a:pPr>
+            <a:r>
+              <a:t>RUNWAY: 18 months to Series A metrics</a:t>
+            </a:r>
+          </a:p>
+        </p:txBody>
+      </p:sp>
+    </p:spTree>
+  </p:cSld>
+  <p:clrMapOvr>
+    <a:masterClrMapping/>
+  </p:clrMapOvr>
+</p:sld>
+</file>
+
+<file path=ppt/slides/slide23.xml><?xml version="1.0" encoding="utf-8"?>
 <p:sld xmlns:a="http://schemas.openxmlformats.org/drawingml/2006/main" xmlns:p="http://schemas.openxmlformats.org/presentationml/2006/main" xmlns:r="http://schemas.openxmlformats.org/officeDocument/2006/relationships">
   <p:cSld>
     <p:spTree>

</xml_diff>

<commit_message>
Add visual Business Model Canvas to both PPTX files
</commit_message>
<xml_diff>
--- a/pitch/MOTRA-Business-Plan.pptx
+++ b/pitch/MOTRA-Business-Plan.pptx
@@ -28,6 +28,7 @@
     <p:sldId id="276" r:id="rId27"/>
     <p:sldId id="277" r:id="rId28"/>
     <p:sldId id="278" r:id="rId29"/>
+    <p:sldId id="279" r:id="rId30"/>
   </p:sldIdLst>
   <p:sldSz cx="9144000" cy="5143500" type="screen4x3"/>
   <p:notesSz cx="6858000" cy="9144000"/>
@@ -8499,6 +8500,2120 @@
             <a:br/>
             <a:r>
               <a:t>tidytails.github.io/motra-landing</a:t>
+            </a:r>
+          </a:p>
+        </p:txBody>
+      </p:sp>
+    </p:spTree>
+  </p:cSld>
+  <p:clrMapOvr>
+    <a:masterClrMapping/>
+  </p:clrMapOvr>
+</p:sld>
+</file>
+
+<file path=ppt/slides/slide24.xml><?xml version="1.0" encoding="utf-8"?>
+<p:sld xmlns:a="http://schemas.openxmlformats.org/drawingml/2006/main" xmlns:p="http://schemas.openxmlformats.org/presentationml/2006/main" xmlns:r="http://schemas.openxmlformats.org/officeDocument/2006/relationships">
+  <p:cSld>
+    <p:spTree>
+      <p:nvGrpSpPr>
+        <p:cNvPr id="1" name=""/>
+        <p:cNvGrpSpPr/>
+        <p:nvPr/>
+      </p:nvGrpSpPr>
+      <p:grpSpPr/>
+      <p:sp>
+        <p:nvSpPr>
+          <p:cNvPr id="2" name="Rectangle 1"/>
+          <p:cNvSpPr/>
+          <p:nvPr/>
+        </p:nvSpPr>
+        <p:spPr>
+          <a:xfrm>
+            <a:off x="0" y="0"/>
+            <a:ext cx="9144000" cy="457200"/>
+          </a:xfrm>
+          <a:prstGeom prst="rect">
+            <a:avLst/>
+          </a:prstGeom>
+          <a:solidFill>
+            <a:srgbClr val="003366"/>
+          </a:solidFill>
+          <a:ln>
+            <a:noFill/>
+          </a:ln>
+        </p:spPr>
+        <p:style>
+          <a:lnRef idx="1">
+            <a:schemeClr val="accent1"/>
+          </a:lnRef>
+          <a:fillRef idx="3">
+            <a:schemeClr val="accent1"/>
+          </a:fillRef>
+          <a:effectRef idx="2">
+            <a:schemeClr val="accent1"/>
+          </a:effectRef>
+          <a:fontRef idx="minor">
+            <a:schemeClr val="lt1"/>
+          </a:fontRef>
+        </p:style>
+        <p:txBody>
+          <a:bodyPr rtlCol="0" anchor="ctr"/>
+          <a:lstStyle/>
+          <a:p>
+            <a:pPr algn="ctr"/>
+          </a:p>
+        </p:txBody>
+      </p:sp>
+      <p:sp>
+        <p:nvSpPr>
+          <p:cNvPr id="3" name="TextBox 2"/>
+          <p:cNvSpPr txBox="1"/>
+          <p:nvPr/>
+        </p:nvSpPr>
+        <p:spPr>
+          <a:xfrm>
+            <a:off x="137160" y="91440"/>
+            <a:ext cx="365760" cy="274320"/>
+          </a:xfrm>
+          <a:prstGeom prst="rect">
+            <a:avLst/>
+          </a:prstGeom>
+          <a:noFill/>
+        </p:spPr>
+        <p:txBody>
+          <a:bodyPr wrap="none">
+            <a:spAutoFit/>
+          </a:bodyPr>
+          <a:lstStyle/>
+          <a:p>
+            <a:pPr>
+              <a:defRPr sz="1200" b="1">
+                <a:solidFill>
+                  <a:srgbClr val="FFFFFF"/>
+                </a:solidFill>
+              </a:defRPr>
+            </a:pPr>
+            <a:r>
+              <a:t>11</a:t>
+            </a:r>
+          </a:p>
+        </p:txBody>
+      </p:sp>
+      <p:sp>
+        <p:nvSpPr>
+          <p:cNvPr id="4" name="TextBox 3"/>
+          <p:cNvSpPr txBox="1"/>
+          <p:nvPr/>
+        </p:nvSpPr>
+        <p:spPr>
+          <a:xfrm>
+            <a:off x="457200" y="91440"/>
+            <a:ext cx="7315200" cy="274320"/>
+          </a:xfrm>
+          <a:prstGeom prst="rect">
+            <a:avLst/>
+          </a:prstGeom>
+          <a:noFill/>
+        </p:spPr>
+        <p:txBody>
+          <a:bodyPr wrap="none">
+            <a:spAutoFit/>
+          </a:bodyPr>
+          <a:lstStyle/>
+          <a:p>
+            <a:pPr>
+              <a:defRPr sz="1800" b="1">
+                <a:solidFill>
+                  <a:srgbClr val="FFFFFF"/>
+                </a:solidFill>
+              </a:defRPr>
+            </a:pPr>
+            <a:r>
+              <a:t>BUSINESS MODEL CANVAS</a:t>
+            </a:r>
+          </a:p>
+        </p:txBody>
+      </p:sp>
+      <p:sp>
+        <p:nvSpPr>
+          <p:cNvPr id="5" name="Rounded Rectangle 4"/>
+          <p:cNvSpPr/>
+          <p:nvPr/>
+        </p:nvSpPr>
+        <p:spPr>
+          <a:xfrm>
+            <a:off x="137160" y="502920"/>
+            <a:ext cx="1719072" cy="2788920"/>
+          </a:xfrm>
+          <a:prstGeom prst="roundRect">
+            <a:avLst/>
+          </a:prstGeom>
+          <a:solidFill>
+            <a:srgbClr val="E8E4F0"/>
+          </a:solidFill>
+          <a:ln w="6350">
+            <a:solidFill>
+              <a:srgbClr val="C8C8C8"/>
+            </a:solidFill>
+          </a:ln>
+        </p:spPr>
+        <p:style>
+          <a:lnRef idx="1">
+            <a:schemeClr val="accent1"/>
+          </a:lnRef>
+          <a:fillRef idx="3">
+            <a:schemeClr val="accent1"/>
+          </a:fillRef>
+          <a:effectRef idx="2">
+            <a:schemeClr val="accent1"/>
+          </a:effectRef>
+          <a:fontRef idx="minor">
+            <a:schemeClr val="lt1"/>
+          </a:fontRef>
+        </p:style>
+        <p:txBody>
+          <a:bodyPr rtlCol="0" anchor="ctr"/>
+          <a:lstStyle/>
+          <a:p>
+            <a:pPr algn="ctr"/>
+          </a:p>
+        </p:txBody>
+      </p:sp>
+      <p:sp>
+        <p:nvSpPr>
+          <p:cNvPr id="6" name="TextBox 5"/>
+          <p:cNvSpPr txBox="1"/>
+          <p:nvPr/>
+        </p:nvSpPr>
+        <p:spPr>
+          <a:xfrm>
+            <a:off x="210312" y="548640"/>
+            <a:ext cx="1581912" cy="228600"/>
+          </a:xfrm>
+          <a:prstGeom prst="rect">
+            <a:avLst/>
+          </a:prstGeom>
+          <a:noFill/>
+        </p:spPr>
+        <p:txBody>
+          <a:bodyPr wrap="square">
+            <a:spAutoFit/>
+          </a:bodyPr>
+          <a:lstStyle/>
+          <a:p>
+            <a:pPr>
+              <a:defRPr sz="800" b="1">
+                <a:solidFill>
+                  <a:srgbClr val="003366"/>
+                </a:solidFill>
+              </a:defRPr>
+            </a:pPr>
+            <a:r>
+              <a:t>KEY PARTNERS</a:t>
+            </a:r>
+          </a:p>
+        </p:txBody>
+      </p:sp>
+      <p:sp>
+        <p:nvSpPr>
+          <p:cNvPr id="7" name="TextBox 6"/>
+          <p:cNvSpPr txBox="1"/>
+          <p:nvPr/>
+        </p:nvSpPr>
+        <p:spPr>
+          <a:xfrm>
+            <a:off x="210312" y="758952"/>
+            <a:ext cx="1581912" cy="2468880"/>
+          </a:xfrm>
+          <a:prstGeom prst="rect">
+            <a:avLst/>
+          </a:prstGeom>
+          <a:noFill/>
+        </p:spPr>
+        <p:txBody>
+          <a:bodyPr wrap="square">
+            <a:spAutoFit/>
+          </a:bodyPr>
+          <a:lstStyle/>
+          <a:p>
+            <a:pPr>
+              <a:spcAft>
+                <a:spcPts val="100"/>
+              </a:spcAft>
+              <a:defRPr sz="600">
+                <a:solidFill>
+                  <a:srgbClr val="323232"/>
+                </a:solidFill>
+              </a:defRPr>
+            </a:pPr>
+            <a:r>
+              <a:t>AV Ecosystem:</a:t>
+            </a:r>
+          </a:p>
+          <a:p>
+            <a:pPr>
+              <a:spcAft>
+                <a:spcPts val="100"/>
+              </a:spcAft>
+              <a:defRPr sz="600">
+                <a:solidFill>
+                  <a:srgbClr val="323232"/>
+                </a:solidFill>
+              </a:defRPr>
+            </a:pPr>
+            <a:r>
+              <a:t>• Waymo, Cruise, Zoox, Tesla</a:t>
+            </a:r>
+          </a:p>
+          <a:p>
+            <a:pPr>
+              <a:spcAft>
+                <a:spcPts val="100"/>
+              </a:spcAft>
+              <a:defRPr sz="600">
+                <a:solidFill>
+                  <a:srgbClr val="323232"/>
+                </a:solidFill>
+              </a:defRPr>
+            </a:pPr>
+            <a:r>
+              <a:t>• Fleet mgmt software</a:t>
+            </a:r>
+          </a:p>
+          <a:p>
+            <a:pPr>
+              <a:spcAft>
+                <a:spcPts val="100"/>
+              </a:spcAft>
+              <a:defRPr sz="600">
+                <a:solidFill>
+                  <a:srgbClr val="323232"/>
+                </a:solidFill>
+              </a:defRPr>
+            </a:pPr>
+          </a:p>
+          <a:p>
+            <a:pPr>
+              <a:spcAft>
+                <a:spcPts val="100"/>
+              </a:spcAft>
+              <a:defRPr sz="600">
+                <a:solidFill>
+                  <a:srgbClr val="323232"/>
+                </a:solidFill>
+              </a:defRPr>
+            </a:pPr>
+            <a:r>
+              <a:t>Gig Economy:</a:t>
+            </a:r>
+          </a:p>
+          <a:p>
+            <a:pPr>
+              <a:spcAft>
+                <a:spcPts val="100"/>
+              </a:spcAft>
+              <a:defRPr sz="600">
+                <a:solidFill>
+                  <a:srgbClr val="323232"/>
+                </a:solidFill>
+              </a:defRPr>
+            </a:pPr>
+            <a:r>
+              <a:t>• Existing gig platforms</a:t>
+            </a:r>
+          </a:p>
+          <a:p>
+            <a:pPr>
+              <a:spcAft>
+                <a:spcPts val="100"/>
+              </a:spcAft>
+              <a:defRPr sz="600">
+                <a:solidFill>
+                  <a:srgbClr val="323232"/>
+                </a:solidFill>
+              </a:defRPr>
+            </a:pPr>
+            <a:r>
+              <a:t>• Training providers</a:t>
+            </a:r>
+          </a:p>
+          <a:p>
+            <a:pPr>
+              <a:spcAft>
+                <a:spcPts val="100"/>
+              </a:spcAft>
+              <a:defRPr sz="600">
+                <a:solidFill>
+                  <a:srgbClr val="323232"/>
+                </a:solidFill>
+              </a:defRPr>
+            </a:pPr>
+            <a:r>
+              <a:t>• Equipment suppliers</a:t>
+            </a:r>
+          </a:p>
+          <a:p>
+            <a:pPr>
+              <a:spcAft>
+                <a:spcPts val="100"/>
+              </a:spcAft>
+              <a:defRPr sz="600">
+                <a:solidFill>
+                  <a:srgbClr val="323232"/>
+                </a:solidFill>
+              </a:defRPr>
+            </a:pPr>
+          </a:p>
+          <a:p>
+            <a:pPr>
+              <a:spcAft>
+                <a:spcPts val="100"/>
+              </a:spcAft>
+              <a:defRPr sz="600">
+                <a:solidFill>
+                  <a:srgbClr val="323232"/>
+                </a:solidFill>
+              </a:defRPr>
+            </a:pPr>
+            <a:r>
+              <a:t>Supporting:</a:t>
+            </a:r>
+          </a:p>
+          <a:p>
+            <a:pPr>
+              <a:spcAft>
+                <a:spcPts val="100"/>
+              </a:spcAft>
+              <a:defRPr sz="600">
+                <a:solidFill>
+                  <a:srgbClr val="323232"/>
+                </a:solidFill>
+              </a:defRPr>
+            </a:pPr>
+            <a:r>
+              <a:t>• Insurance providers</a:t>
+            </a:r>
+          </a:p>
+          <a:p>
+            <a:pPr>
+              <a:spcAft>
+                <a:spcPts val="100"/>
+              </a:spcAft>
+              <a:defRPr sz="600">
+                <a:solidFill>
+                  <a:srgbClr val="323232"/>
+                </a:solidFill>
+              </a:defRPr>
+            </a:pPr>
+            <a:r>
+              <a:t>• Background checks</a:t>
+            </a:r>
+          </a:p>
+          <a:p>
+            <a:pPr>
+              <a:spcAft>
+                <a:spcPts val="100"/>
+              </a:spcAft>
+              <a:defRPr sz="600">
+                <a:solidFill>
+                  <a:srgbClr val="323232"/>
+                </a:solidFill>
+              </a:defRPr>
+            </a:pPr>
+            <a:r>
+              <a:t>• Payment processing</a:t>
+            </a:r>
+          </a:p>
+        </p:txBody>
+      </p:sp>
+      <p:sp>
+        <p:nvSpPr>
+          <p:cNvPr id="8" name="Rounded Rectangle 7"/>
+          <p:cNvSpPr/>
+          <p:nvPr/>
+        </p:nvSpPr>
+        <p:spPr>
+          <a:xfrm>
+            <a:off x="1901952" y="502920"/>
+            <a:ext cx="1719072" cy="1371600"/>
+          </a:xfrm>
+          <a:prstGeom prst="roundRect">
+            <a:avLst/>
+          </a:prstGeom>
+          <a:solidFill>
+            <a:srgbClr val="E8E4F0"/>
+          </a:solidFill>
+          <a:ln w="6350">
+            <a:solidFill>
+              <a:srgbClr val="C8C8C8"/>
+            </a:solidFill>
+          </a:ln>
+        </p:spPr>
+        <p:style>
+          <a:lnRef idx="1">
+            <a:schemeClr val="accent1"/>
+          </a:lnRef>
+          <a:fillRef idx="3">
+            <a:schemeClr val="accent1"/>
+          </a:fillRef>
+          <a:effectRef idx="2">
+            <a:schemeClr val="accent1"/>
+          </a:effectRef>
+          <a:fontRef idx="minor">
+            <a:schemeClr val="lt1"/>
+          </a:fontRef>
+        </p:style>
+        <p:txBody>
+          <a:bodyPr rtlCol="0" anchor="ctr"/>
+          <a:lstStyle/>
+          <a:p>
+            <a:pPr algn="ctr"/>
+          </a:p>
+        </p:txBody>
+      </p:sp>
+      <p:sp>
+        <p:nvSpPr>
+          <p:cNvPr id="9" name="TextBox 8"/>
+          <p:cNvSpPr txBox="1"/>
+          <p:nvPr/>
+        </p:nvSpPr>
+        <p:spPr>
+          <a:xfrm>
+            <a:off x="1975104" y="548640"/>
+            <a:ext cx="1581912" cy="228600"/>
+          </a:xfrm>
+          <a:prstGeom prst="rect">
+            <a:avLst/>
+          </a:prstGeom>
+          <a:noFill/>
+        </p:spPr>
+        <p:txBody>
+          <a:bodyPr wrap="square">
+            <a:spAutoFit/>
+          </a:bodyPr>
+          <a:lstStyle/>
+          <a:p>
+            <a:pPr>
+              <a:defRPr sz="800" b="1">
+                <a:solidFill>
+                  <a:srgbClr val="003366"/>
+                </a:solidFill>
+              </a:defRPr>
+            </a:pPr>
+            <a:r>
+              <a:t>KEY ACTIVITIES</a:t>
+            </a:r>
+          </a:p>
+        </p:txBody>
+      </p:sp>
+      <p:sp>
+        <p:nvSpPr>
+          <p:cNvPr id="10" name="TextBox 9"/>
+          <p:cNvSpPr txBox="1"/>
+          <p:nvPr/>
+        </p:nvSpPr>
+        <p:spPr>
+          <a:xfrm>
+            <a:off x="1975104" y="758952"/>
+            <a:ext cx="1581912" cy="1051560"/>
+          </a:xfrm>
+          <a:prstGeom prst="rect">
+            <a:avLst/>
+          </a:prstGeom>
+          <a:noFill/>
+        </p:spPr>
+        <p:txBody>
+          <a:bodyPr wrap="square">
+            <a:spAutoFit/>
+          </a:bodyPr>
+          <a:lstStyle/>
+          <a:p>
+            <a:pPr>
+              <a:spcAft>
+                <a:spcPts val="100"/>
+              </a:spcAft>
+              <a:defRPr sz="600">
+                <a:solidFill>
+                  <a:srgbClr val="323232"/>
+                </a:solidFill>
+              </a:defRPr>
+            </a:pPr>
+            <a:r>
+              <a:t>• Platform development</a:t>
+            </a:r>
+          </a:p>
+          <a:p>
+            <a:pPr>
+              <a:spcAft>
+                <a:spcPts val="100"/>
+              </a:spcAft>
+              <a:defRPr sz="600">
+                <a:solidFill>
+                  <a:srgbClr val="323232"/>
+                </a:solidFill>
+              </a:defRPr>
+            </a:pPr>
+            <a:r>
+              <a:t>• Tech recruitment</a:t>
+            </a:r>
+          </a:p>
+          <a:p>
+            <a:pPr>
+              <a:spcAft>
+                <a:spcPts val="100"/>
+              </a:spcAft>
+              <a:defRPr sz="600">
+                <a:solidFill>
+                  <a:srgbClr val="323232"/>
+                </a:solidFill>
+              </a:defRPr>
+            </a:pPr>
+            <a:r>
+              <a:t>• AV-specific training</a:t>
+            </a:r>
+          </a:p>
+          <a:p>
+            <a:pPr>
+              <a:spcAft>
+                <a:spcPts val="100"/>
+              </a:spcAft>
+              <a:defRPr sz="600">
+                <a:solidFill>
+                  <a:srgbClr val="323232"/>
+                </a:solidFill>
+              </a:defRPr>
+            </a:pPr>
+            <a:r>
+              <a:t>• Quality assurance</a:t>
+            </a:r>
+          </a:p>
+          <a:p>
+            <a:pPr>
+              <a:spcAft>
+                <a:spcPts val="100"/>
+              </a:spcAft>
+              <a:defRPr sz="600">
+                <a:solidFill>
+                  <a:srgbClr val="323232"/>
+                </a:solidFill>
+              </a:defRPr>
+            </a:pPr>
+            <a:r>
+              <a:t>• Enterprise sales</a:t>
+            </a:r>
+          </a:p>
+        </p:txBody>
+      </p:sp>
+      <p:sp>
+        <p:nvSpPr>
+          <p:cNvPr id="11" name="Rounded Rectangle 10"/>
+          <p:cNvSpPr/>
+          <p:nvPr/>
+        </p:nvSpPr>
+        <p:spPr>
+          <a:xfrm>
+            <a:off x="1901952" y="1920240"/>
+            <a:ext cx="1719072" cy="1371600"/>
+          </a:xfrm>
+          <a:prstGeom prst="roundRect">
+            <a:avLst/>
+          </a:prstGeom>
+          <a:solidFill>
+            <a:srgbClr val="E8E4F0"/>
+          </a:solidFill>
+          <a:ln w="6350">
+            <a:solidFill>
+              <a:srgbClr val="C8C8C8"/>
+            </a:solidFill>
+          </a:ln>
+        </p:spPr>
+        <p:style>
+          <a:lnRef idx="1">
+            <a:schemeClr val="accent1"/>
+          </a:lnRef>
+          <a:fillRef idx="3">
+            <a:schemeClr val="accent1"/>
+          </a:fillRef>
+          <a:effectRef idx="2">
+            <a:schemeClr val="accent1"/>
+          </a:effectRef>
+          <a:fontRef idx="minor">
+            <a:schemeClr val="lt1"/>
+          </a:fontRef>
+        </p:style>
+        <p:txBody>
+          <a:bodyPr rtlCol="0" anchor="ctr"/>
+          <a:lstStyle/>
+          <a:p>
+            <a:pPr algn="ctr"/>
+          </a:p>
+        </p:txBody>
+      </p:sp>
+      <p:sp>
+        <p:nvSpPr>
+          <p:cNvPr id="12" name="TextBox 11"/>
+          <p:cNvSpPr txBox="1"/>
+          <p:nvPr/>
+        </p:nvSpPr>
+        <p:spPr>
+          <a:xfrm>
+            <a:off x="1975104" y="1965960"/>
+            <a:ext cx="1581912" cy="228600"/>
+          </a:xfrm>
+          <a:prstGeom prst="rect">
+            <a:avLst/>
+          </a:prstGeom>
+          <a:noFill/>
+        </p:spPr>
+        <p:txBody>
+          <a:bodyPr wrap="square">
+            <a:spAutoFit/>
+          </a:bodyPr>
+          <a:lstStyle/>
+          <a:p>
+            <a:pPr>
+              <a:defRPr sz="800" b="1">
+                <a:solidFill>
+                  <a:srgbClr val="003366"/>
+                </a:solidFill>
+              </a:defRPr>
+            </a:pPr>
+            <a:r>
+              <a:t>KEY RESOURCES</a:t>
+            </a:r>
+          </a:p>
+        </p:txBody>
+      </p:sp>
+      <p:sp>
+        <p:nvSpPr>
+          <p:cNvPr id="13" name="TextBox 12"/>
+          <p:cNvSpPr txBox="1"/>
+          <p:nvPr/>
+        </p:nvSpPr>
+        <p:spPr>
+          <a:xfrm>
+            <a:off x="1975104" y="2176272"/>
+            <a:ext cx="1581912" cy="1051560"/>
+          </a:xfrm>
+          <a:prstGeom prst="rect">
+            <a:avLst/>
+          </a:prstGeom>
+          <a:noFill/>
+        </p:spPr>
+        <p:txBody>
+          <a:bodyPr wrap="square">
+            <a:spAutoFit/>
+          </a:bodyPr>
+          <a:lstStyle/>
+          <a:p>
+            <a:pPr>
+              <a:spcAft>
+                <a:spcPts val="100"/>
+              </a:spcAft>
+              <a:defRPr sz="600">
+                <a:solidFill>
+                  <a:srgbClr val="323232"/>
+                </a:solidFill>
+              </a:defRPr>
+            </a:pPr>
+            <a:r>
+              <a:t>Technology:</a:t>
+            </a:r>
+          </a:p>
+          <a:p>
+            <a:pPr>
+              <a:spcAft>
+                <a:spcPts val="100"/>
+              </a:spcAft>
+              <a:defRPr sz="600">
+                <a:solidFill>
+                  <a:srgbClr val="323232"/>
+                </a:solidFill>
+              </a:defRPr>
+            </a:pPr>
+            <a:r>
+              <a:t>• Dispatch platform</a:t>
+            </a:r>
+          </a:p>
+          <a:p>
+            <a:pPr>
+              <a:spcAft>
+                <a:spcPts val="100"/>
+              </a:spcAft>
+              <a:defRPr sz="600">
+                <a:solidFill>
+                  <a:srgbClr val="323232"/>
+                </a:solidFill>
+              </a:defRPr>
+            </a:pPr>
+            <a:r>
+              <a:t>• Fleet dashboard</a:t>
+            </a:r>
+          </a:p>
+          <a:p>
+            <a:pPr>
+              <a:spcAft>
+                <a:spcPts val="100"/>
+              </a:spcAft>
+              <a:defRPr sz="600">
+                <a:solidFill>
+                  <a:srgbClr val="323232"/>
+                </a:solidFill>
+              </a:defRPr>
+            </a:pPr>
+            <a:r>
+              <a:t>• Technician app</a:t>
+            </a:r>
+          </a:p>
+          <a:p>
+            <a:pPr>
+              <a:spcAft>
+                <a:spcPts val="100"/>
+              </a:spcAft>
+              <a:defRPr sz="600">
+                <a:solidFill>
+                  <a:srgbClr val="323232"/>
+                </a:solidFill>
+              </a:defRPr>
+            </a:pPr>
+          </a:p>
+          <a:p>
+            <a:pPr>
+              <a:spcAft>
+                <a:spcPts val="100"/>
+              </a:spcAft>
+              <a:defRPr sz="600">
+                <a:solidFill>
+                  <a:srgbClr val="323232"/>
+                </a:solidFill>
+              </a:defRPr>
+            </a:pPr>
+            <a:r>
+              <a:t>Human:</a:t>
+            </a:r>
+          </a:p>
+          <a:p>
+            <a:pPr>
+              <a:spcAft>
+                <a:spcPts val="100"/>
+              </a:spcAft>
+              <a:defRPr sz="600">
+                <a:solidFill>
+                  <a:srgbClr val="323232"/>
+                </a:solidFill>
+              </a:defRPr>
+            </a:pPr>
+            <a:r>
+              <a:t>• Engineering team</a:t>
+            </a:r>
+          </a:p>
+          <a:p>
+            <a:pPr>
+              <a:spcAft>
+                <a:spcPts val="100"/>
+              </a:spcAft>
+              <a:defRPr sz="600">
+                <a:solidFill>
+                  <a:srgbClr val="323232"/>
+                </a:solidFill>
+              </a:defRPr>
+            </a:pPr>
+            <a:r>
+              <a:t>• Trained tech network</a:t>
+            </a:r>
+          </a:p>
+        </p:txBody>
+      </p:sp>
+      <p:sp>
+        <p:nvSpPr>
+          <p:cNvPr id="14" name="Rounded Rectangle 13"/>
+          <p:cNvSpPr/>
+          <p:nvPr/>
+        </p:nvSpPr>
+        <p:spPr>
+          <a:xfrm>
+            <a:off x="3666744" y="502920"/>
+            <a:ext cx="1719072" cy="2788920"/>
+          </a:xfrm>
+          <a:prstGeom prst="roundRect">
+            <a:avLst/>
+          </a:prstGeom>
+          <a:solidFill>
+            <a:srgbClr val="FCE4D6"/>
+          </a:solidFill>
+          <a:ln w="6350">
+            <a:solidFill>
+              <a:srgbClr val="C8C8C8"/>
+            </a:solidFill>
+          </a:ln>
+        </p:spPr>
+        <p:style>
+          <a:lnRef idx="1">
+            <a:schemeClr val="accent1"/>
+          </a:lnRef>
+          <a:fillRef idx="3">
+            <a:schemeClr val="accent1"/>
+          </a:fillRef>
+          <a:effectRef idx="2">
+            <a:schemeClr val="accent1"/>
+          </a:effectRef>
+          <a:fontRef idx="minor">
+            <a:schemeClr val="lt1"/>
+          </a:fontRef>
+        </p:style>
+        <p:txBody>
+          <a:bodyPr rtlCol="0" anchor="ctr"/>
+          <a:lstStyle/>
+          <a:p>
+            <a:pPr algn="ctr"/>
+          </a:p>
+        </p:txBody>
+      </p:sp>
+      <p:sp>
+        <p:nvSpPr>
+          <p:cNvPr id="15" name="TextBox 14"/>
+          <p:cNvSpPr txBox="1"/>
+          <p:nvPr/>
+        </p:nvSpPr>
+        <p:spPr>
+          <a:xfrm>
+            <a:off x="3739896" y="548640"/>
+            <a:ext cx="1581912" cy="228600"/>
+          </a:xfrm>
+          <a:prstGeom prst="rect">
+            <a:avLst/>
+          </a:prstGeom>
+          <a:noFill/>
+        </p:spPr>
+        <p:txBody>
+          <a:bodyPr wrap="square">
+            <a:spAutoFit/>
+          </a:bodyPr>
+          <a:lstStyle/>
+          <a:p>
+            <a:pPr>
+              <a:defRPr sz="800" b="1">
+                <a:solidFill>
+                  <a:srgbClr val="003366"/>
+                </a:solidFill>
+              </a:defRPr>
+            </a:pPr>
+            <a:r>
+              <a:t>VALUE PROPOSITIONS</a:t>
+            </a:r>
+          </a:p>
+        </p:txBody>
+      </p:sp>
+      <p:sp>
+        <p:nvSpPr>
+          <p:cNvPr id="16" name="TextBox 15"/>
+          <p:cNvSpPr txBox="1"/>
+          <p:nvPr/>
+        </p:nvSpPr>
+        <p:spPr>
+          <a:xfrm>
+            <a:off x="3739896" y="758952"/>
+            <a:ext cx="1581912" cy="2468880"/>
+          </a:xfrm>
+          <a:prstGeom prst="rect">
+            <a:avLst/>
+          </a:prstGeom>
+          <a:noFill/>
+        </p:spPr>
+        <p:txBody>
+          <a:bodyPr wrap="square">
+            <a:spAutoFit/>
+          </a:bodyPr>
+          <a:lstStyle/>
+          <a:p>
+            <a:pPr>
+              <a:spcAft>
+                <a:spcPts val="100"/>
+              </a:spcAft>
+              <a:defRPr sz="600">
+                <a:solidFill>
+                  <a:srgbClr val="323232"/>
+                </a:solidFill>
+              </a:defRPr>
+            </a:pPr>
+            <a:r>
+              <a:t>For Fleet Operators:</a:t>
+            </a:r>
+          </a:p>
+          <a:p>
+            <a:pPr>
+              <a:spcAft>
+                <a:spcPts val="100"/>
+              </a:spcAft>
+              <a:defRPr sz="600">
+                <a:solidFill>
+                  <a:srgbClr val="323232"/>
+                </a:solidFill>
+              </a:defRPr>
+            </a:pPr>
+            <a:r>
+              <a:t>• Reduce downtime</a:t>
+            </a:r>
+          </a:p>
+          <a:p>
+            <a:pPr>
+              <a:spcAft>
+                <a:spcPts val="100"/>
+              </a:spcAft>
+              <a:defRPr sz="600">
+                <a:solidFill>
+                  <a:srgbClr val="323232"/>
+                </a:solidFill>
+              </a:defRPr>
+            </a:pPr>
+            <a:r>
+              <a:t>• Variable cost model</a:t>
+            </a:r>
+          </a:p>
+          <a:p>
+            <a:pPr>
+              <a:spcAft>
+                <a:spcPts val="100"/>
+              </a:spcAft>
+              <a:defRPr sz="600">
+                <a:solidFill>
+                  <a:srgbClr val="323232"/>
+                </a:solidFill>
+              </a:defRPr>
+            </a:pPr>
+            <a:r>
+              <a:t>• Scale instantly</a:t>
+            </a:r>
+          </a:p>
+          <a:p>
+            <a:pPr>
+              <a:spcAft>
+                <a:spcPts val="100"/>
+              </a:spcAft>
+              <a:defRPr sz="600">
+                <a:solidFill>
+                  <a:srgbClr val="323232"/>
+                </a:solidFill>
+              </a:defRPr>
+            </a:pPr>
+            <a:r>
+              <a:t>• 24/7 availability</a:t>
+            </a:r>
+          </a:p>
+          <a:p>
+            <a:pPr>
+              <a:spcAft>
+                <a:spcPts val="100"/>
+              </a:spcAft>
+              <a:defRPr sz="600">
+                <a:solidFill>
+                  <a:srgbClr val="323232"/>
+                </a:solidFill>
+              </a:defRPr>
+            </a:pPr>
+            <a:r>
+              <a:t>• API integration</a:t>
+            </a:r>
+          </a:p>
+          <a:p>
+            <a:pPr>
+              <a:spcAft>
+                <a:spcPts val="100"/>
+              </a:spcAft>
+              <a:defRPr sz="600">
+                <a:solidFill>
+                  <a:srgbClr val="323232"/>
+                </a:solidFill>
+              </a:defRPr>
+            </a:pPr>
+          </a:p>
+          <a:p>
+            <a:pPr>
+              <a:spcAft>
+                <a:spcPts val="100"/>
+              </a:spcAft>
+              <a:defRPr sz="600">
+                <a:solidFill>
+                  <a:srgbClr val="323232"/>
+                </a:solidFill>
+              </a:defRPr>
+            </a:pPr>
+            <a:r>
+              <a:t>vs. In-House:</a:t>
+            </a:r>
+          </a:p>
+          <a:p>
+            <a:pPr>
+              <a:spcAft>
+                <a:spcPts val="100"/>
+              </a:spcAft>
+              <a:defRPr sz="600">
+                <a:solidFill>
+                  <a:srgbClr val="323232"/>
+                </a:solidFill>
+              </a:defRPr>
+            </a:pPr>
+            <a:r>
+              <a:t>• 50% cost reduction</a:t>
+            </a:r>
+          </a:p>
+          <a:p>
+            <a:pPr>
+              <a:spcAft>
+                <a:spcPts val="100"/>
+              </a:spcAft>
+              <a:defRPr sz="600">
+                <a:solidFill>
+                  <a:srgbClr val="323232"/>
+                </a:solidFill>
+              </a:defRPr>
+            </a:pPr>
+            <a:r>
+              <a:t>• 30% more uptime</a:t>
+            </a:r>
+          </a:p>
+          <a:p>
+            <a:pPr>
+              <a:spcAft>
+                <a:spcPts val="100"/>
+              </a:spcAft>
+              <a:defRPr sz="600">
+                <a:solidFill>
+                  <a:srgbClr val="323232"/>
+                </a:solidFill>
+              </a:defRPr>
+            </a:pPr>
+          </a:p>
+          <a:p>
+            <a:pPr>
+              <a:spcAft>
+                <a:spcPts val="100"/>
+              </a:spcAft>
+              <a:defRPr sz="600">
+                <a:solidFill>
+                  <a:srgbClr val="323232"/>
+                </a:solidFill>
+              </a:defRPr>
+            </a:pPr>
+            <a:r>
+              <a:t>For Technicians:</a:t>
+            </a:r>
+          </a:p>
+          <a:p>
+            <a:pPr>
+              <a:spcAft>
+                <a:spcPts val="100"/>
+              </a:spcAft>
+              <a:defRPr sz="600">
+                <a:solidFill>
+                  <a:srgbClr val="323232"/>
+                </a:solidFill>
+              </a:defRPr>
+            </a:pPr>
+            <a:r>
+              <a:t>• Flexible gig work</a:t>
+            </a:r>
+          </a:p>
+          <a:p>
+            <a:pPr>
+              <a:spcAft>
+                <a:spcPts val="100"/>
+              </a:spcAft>
+              <a:defRPr sz="600">
+                <a:solidFill>
+                  <a:srgbClr val="323232"/>
+                </a:solidFill>
+              </a:defRPr>
+            </a:pPr>
+            <a:r>
+              <a:t>• $15-20/hour</a:t>
+            </a:r>
+          </a:p>
+        </p:txBody>
+      </p:sp>
+      <p:sp>
+        <p:nvSpPr>
+          <p:cNvPr id="17" name="Rounded Rectangle 16"/>
+          <p:cNvSpPr/>
+          <p:nvPr/>
+        </p:nvSpPr>
+        <p:spPr>
+          <a:xfrm>
+            <a:off x="5431536" y="502920"/>
+            <a:ext cx="1719072" cy="1371600"/>
+          </a:xfrm>
+          <a:prstGeom prst="roundRect">
+            <a:avLst/>
+          </a:prstGeom>
+          <a:solidFill>
+            <a:srgbClr val="FFF9E6"/>
+          </a:solidFill>
+          <a:ln w="6350">
+            <a:solidFill>
+              <a:srgbClr val="C8C8C8"/>
+            </a:solidFill>
+          </a:ln>
+        </p:spPr>
+        <p:style>
+          <a:lnRef idx="1">
+            <a:schemeClr val="accent1"/>
+          </a:lnRef>
+          <a:fillRef idx="3">
+            <a:schemeClr val="accent1"/>
+          </a:fillRef>
+          <a:effectRef idx="2">
+            <a:schemeClr val="accent1"/>
+          </a:effectRef>
+          <a:fontRef idx="minor">
+            <a:schemeClr val="lt1"/>
+          </a:fontRef>
+        </p:style>
+        <p:txBody>
+          <a:bodyPr rtlCol="0" anchor="ctr"/>
+          <a:lstStyle/>
+          <a:p>
+            <a:pPr algn="ctr"/>
+          </a:p>
+        </p:txBody>
+      </p:sp>
+      <p:sp>
+        <p:nvSpPr>
+          <p:cNvPr id="18" name="TextBox 17"/>
+          <p:cNvSpPr txBox="1"/>
+          <p:nvPr/>
+        </p:nvSpPr>
+        <p:spPr>
+          <a:xfrm>
+            <a:off x="5504688" y="548640"/>
+            <a:ext cx="1581912" cy="228600"/>
+          </a:xfrm>
+          <a:prstGeom prst="rect">
+            <a:avLst/>
+          </a:prstGeom>
+          <a:noFill/>
+        </p:spPr>
+        <p:txBody>
+          <a:bodyPr wrap="square">
+            <a:spAutoFit/>
+          </a:bodyPr>
+          <a:lstStyle/>
+          <a:p>
+            <a:pPr>
+              <a:defRPr sz="800" b="1">
+                <a:solidFill>
+                  <a:srgbClr val="003366"/>
+                </a:solidFill>
+              </a:defRPr>
+            </a:pPr>
+            <a:r>
+              <a:t>CUSTOMER RELATIONSHIPS</a:t>
+            </a:r>
+          </a:p>
+        </p:txBody>
+      </p:sp>
+      <p:sp>
+        <p:nvSpPr>
+          <p:cNvPr id="19" name="TextBox 18"/>
+          <p:cNvSpPr txBox="1"/>
+          <p:nvPr/>
+        </p:nvSpPr>
+        <p:spPr>
+          <a:xfrm>
+            <a:off x="5504688" y="758952"/>
+            <a:ext cx="1581912" cy="1051560"/>
+          </a:xfrm>
+          <a:prstGeom prst="rect">
+            <a:avLst/>
+          </a:prstGeom>
+          <a:noFill/>
+        </p:spPr>
+        <p:txBody>
+          <a:bodyPr wrap="square">
+            <a:spAutoFit/>
+          </a:bodyPr>
+          <a:lstStyle/>
+          <a:p>
+            <a:pPr>
+              <a:spcAft>
+                <a:spcPts val="100"/>
+              </a:spcAft>
+              <a:defRPr sz="600">
+                <a:solidFill>
+                  <a:srgbClr val="323232"/>
+                </a:solidFill>
+              </a:defRPr>
+            </a:pPr>
+            <a:r>
+              <a:t>• Dedicated account mgrs</a:t>
+            </a:r>
+          </a:p>
+          <a:p>
+            <a:pPr>
+              <a:spcAft>
+                <a:spcPts val="100"/>
+              </a:spcAft>
+              <a:defRPr sz="600">
+                <a:solidFill>
+                  <a:srgbClr val="323232"/>
+                </a:solidFill>
+              </a:defRPr>
+            </a:pPr>
+            <a:r>
+              <a:t>• API integration support</a:t>
+            </a:r>
+          </a:p>
+          <a:p>
+            <a:pPr>
+              <a:spcAft>
+                <a:spcPts val="100"/>
+              </a:spcAft>
+              <a:defRPr sz="600">
+                <a:solidFill>
+                  <a:srgbClr val="323232"/>
+                </a:solidFill>
+              </a:defRPr>
+            </a:pPr>
+            <a:r>
+              <a:t>• Performance dashboards</a:t>
+            </a:r>
+          </a:p>
+          <a:p>
+            <a:pPr>
+              <a:spcAft>
+                <a:spcPts val="100"/>
+              </a:spcAft>
+              <a:defRPr sz="600">
+                <a:solidFill>
+                  <a:srgbClr val="323232"/>
+                </a:solidFill>
+              </a:defRPr>
+            </a:pPr>
+            <a:r>
+              <a:t>• SLA guarantees</a:t>
+            </a:r>
+          </a:p>
+          <a:p>
+            <a:pPr>
+              <a:spcAft>
+                <a:spcPts val="100"/>
+              </a:spcAft>
+              <a:defRPr sz="600">
+                <a:solidFill>
+                  <a:srgbClr val="323232"/>
+                </a:solidFill>
+              </a:defRPr>
+            </a:pPr>
+            <a:r>
+              <a:t>• 24/7 support</a:t>
+            </a:r>
+          </a:p>
+        </p:txBody>
+      </p:sp>
+      <p:sp>
+        <p:nvSpPr>
+          <p:cNvPr id="20" name="Rounded Rectangle 19"/>
+          <p:cNvSpPr/>
+          <p:nvPr/>
+        </p:nvSpPr>
+        <p:spPr>
+          <a:xfrm>
+            <a:off x="5431536" y="1920240"/>
+            <a:ext cx="1719072" cy="1371600"/>
+          </a:xfrm>
+          <a:prstGeom prst="roundRect">
+            <a:avLst/>
+          </a:prstGeom>
+          <a:solidFill>
+            <a:srgbClr val="FFF9E6"/>
+          </a:solidFill>
+          <a:ln w="6350">
+            <a:solidFill>
+              <a:srgbClr val="C8C8C8"/>
+            </a:solidFill>
+          </a:ln>
+        </p:spPr>
+        <p:style>
+          <a:lnRef idx="1">
+            <a:schemeClr val="accent1"/>
+          </a:lnRef>
+          <a:fillRef idx="3">
+            <a:schemeClr val="accent1"/>
+          </a:fillRef>
+          <a:effectRef idx="2">
+            <a:schemeClr val="accent1"/>
+          </a:effectRef>
+          <a:fontRef idx="minor">
+            <a:schemeClr val="lt1"/>
+          </a:fontRef>
+        </p:style>
+        <p:txBody>
+          <a:bodyPr rtlCol="0" anchor="ctr"/>
+          <a:lstStyle/>
+          <a:p>
+            <a:pPr algn="ctr"/>
+          </a:p>
+        </p:txBody>
+      </p:sp>
+      <p:sp>
+        <p:nvSpPr>
+          <p:cNvPr id="21" name="TextBox 20"/>
+          <p:cNvSpPr txBox="1"/>
+          <p:nvPr/>
+        </p:nvSpPr>
+        <p:spPr>
+          <a:xfrm>
+            <a:off x="5504688" y="1965960"/>
+            <a:ext cx="1581912" cy="228600"/>
+          </a:xfrm>
+          <a:prstGeom prst="rect">
+            <a:avLst/>
+          </a:prstGeom>
+          <a:noFill/>
+        </p:spPr>
+        <p:txBody>
+          <a:bodyPr wrap="square">
+            <a:spAutoFit/>
+          </a:bodyPr>
+          <a:lstStyle/>
+          <a:p>
+            <a:pPr>
+              <a:defRPr sz="800" b="1">
+                <a:solidFill>
+                  <a:srgbClr val="003366"/>
+                </a:solidFill>
+              </a:defRPr>
+            </a:pPr>
+            <a:r>
+              <a:t>CHANNELS</a:t>
+            </a:r>
+          </a:p>
+        </p:txBody>
+      </p:sp>
+      <p:sp>
+        <p:nvSpPr>
+          <p:cNvPr id="22" name="TextBox 21"/>
+          <p:cNvSpPr txBox="1"/>
+          <p:nvPr/>
+        </p:nvSpPr>
+        <p:spPr>
+          <a:xfrm>
+            <a:off x="5504688" y="2176272"/>
+            <a:ext cx="1581912" cy="1051560"/>
+          </a:xfrm>
+          <a:prstGeom prst="rect">
+            <a:avLst/>
+          </a:prstGeom>
+          <a:noFill/>
+        </p:spPr>
+        <p:txBody>
+          <a:bodyPr wrap="square">
+            <a:spAutoFit/>
+          </a:bodyPr>
+          <a:lstStyle/>
+          <a:p>
+            <a:pPr>
+              <a:spcAft>
+                <a:spcPts val="100"/>
+              </a:spcAft>
+              <a:defRPr sz="600">
+                <a:solidFill>
+                  <a:srgbClr val="323232"/>
+                </a:solidFill>
+              </a:defRPr>
+            </a:pPr>
+            <a:r>
+              <a:t>Acquisition:</a:t>
+            </a:r>
+          </a:p>
+          <a:p>
+            <a:pPr>
+              <a:spcAft>
+                <a:spcPts val="100"/>
+              </a:spcAft>
+              <a:defRPr sz="600">
+                <a:solidFill>
+                  <a:srgbClr val="323232"/>
+                </a:solidFill>
+              </a:defRPr>
+            </a:pPr>
+            <a:r>
+              <a:t>• Direct enterprise sales</a:t>
+            </a:r>
+          </a:p>
+          <a:p>
+            <a:pPr>
+              <a:spcAft>
+                <a:spcPts val="100"/>
+              </a:spcAft>
+              <a:defRPr sz="600">
+                <a:solidFill>
+                  <a:srgbClr val="323232"/>
+                </a:solidFill>
+              </a:defRPr>
+            </a:pPr>
+            <a:r>
+              <a:t>• Industry conferences</a:t>
+            </a:r>
+          </a:p>
+          <a:p>
+            <a:pPr>
+              <a:spcAft>
+                <a:spcPts val="100"/>
+              </a:spcAft>
+              <a:defRPr sz="600">
+                <a:solidFill>
+                  <a:srgbClr val="323232"/>
+                </a:solidFill>
+              </a:defRPr>
+            </a:pPr>
+          </a:p>
+          <a:p>
+            <a:pPr>
+              <a:spcAft>
+                <a:spcPts val="100"/>
+              </a:spcAft>
+              <a:defRPr sz="600">
+                <a:solidFill>
+                  <a:srgbClr val="323232"/>
+                </a:solidFill>
+              </a:defRPr>
+            </a:pPr>
+            <a:r>
+              <a:t>Delivery:</a:t>
+            </a:r>
+          </a:p>
+          <a:p>
+            <a:pPr>
+              <a:spcAft>
+                <a:spcPts val="100"/>
+              </a:spcAft>
+              <a:defRPr sz="600">
+                <a:solidFill>
+                  <a:srgbClr val="323232"/>
+                </a:solidFill>
+              </a:defRPr>
+            </a:pPr>
+            <a:r>
+              <a:t>• Fleet dashboard</a:t>
+            </a:r>
+          </a:p>
+          <a:p>
+            <a:pPr>
+              <a:spcAft>
+                <a:spcPts val="100"/>
+              </a:spcAft>
+              <a:defRPr sz="600">
+                <a:solidFill>
+                  <a:srgbClr val="323232"/>
+                </a:solidFill>
+              </a:defRPr>
+            </a:pPr>
+            <a:r>
+              <a:t>• API integration</a:t>
+            </a:r>
+          </a:p>
+          <a:p>
+            <a:pPr>
+              <a:spcAft>
+                <a:spcPts val="100"/>
+              </a:spcAft>
+              <a:defRPr sz="600">
+                <a:solidFill>
+                  <a:srgbClr val="323232"/>
+                </a:solidFill>
+              </a:defRPr>
+            </a:pPr>
+            <a:r>
+              <a:t>• Mobile dispatch</a:t>
+            </a:r>
+          </a:p>
+        </p:txBody>
+      </p:sp>
+      <p:sp>
+        <p:nvSpPr>
+          <p:cNvPr id="23" name="Rounded Rectangle 22"/>
+          <p:cNvSpPr/>
+          <p:nvPr/>
+        </p:nvSpPr>
+        <p:spPr>
+          <a:xfrm>
+            <a:off x="7196328" y="502920"/>
+            <a:ext cx="1719072" cy="2788920"/>
+          </a:xfrm>
+          <a:prstGeom prst="roundRect">
+            <a:avLst/>
+          </a:prstGeom>
+          <a:solidFill>
+            <a:srgbClr val="FFF9E6"/>
+          </a:solidFill>
+          <a:ln w="6350">
+            <a:solidFill>
+              <a:srgbClr val="C8C8C8"/>
+            </a:solidFill>
+          </a:ln>
+        </p:spPr>
+        <p:style>
+          <a:lnRef idx="1">
+            <a:schemeClr val="accent1"/>
+          </a:lnRef>
+          <a:fillRef idx="3">
+            <a:schemeClr val="accent1"/>
+          </a:fillRef>
+          <a:effectRef idx="2">
+            <a:schemeClr val="accent1"/>
+          </a:effectRef>
+          <a:fontRef idx="minor">
+            <a:schemeClr val="lt1"/>
+          </a:fontRef>
+        </p:style>
+        <p:txBody>
+          <a:bodyPr rtlCol="0" anchor="ctr"/>
+          <a:lstStyle/>
+          <a:p>
+            <a:pPr algn="ctr"/>
+          </a:p>
+        </p:txBody>
+      </p:sp>
+      <p:sp>
+        <p:nvSpPr>
+          <p:cNvPr id="24" name="TextBox 23"/>
+          <p:cNvSpPr txBox="1"/>
+          <p:nvPr/>
+        </p:nvSpPr>
+        <p:spPr>
+          <a:xfrm>
+            <a:off x="7269480" y="548640"/>
+            <a:ext cx="1581912" cy="228600"/>
+          </a:xfrm>
+          <a:prstGeom prst="rect">
+            <a:avLst/>
+          </a:prstGeom>
+          <a:noFill/>
+        </p:spPr>
+        <p:txBody>
+          <a:bodyPr wrap="square">
+            <a:spAutoFit/>
+          </a:bodyPr>
+          <a:lstStyle/>
+          <a:p>
+            <a:pPr>
+              <a:defRPr sz="800" b="1">
+                <a:solidFill>
+                  <a:srgbClr val="003366"/>
+                </a:solidFill>
+              </a:defRPr>
+            </a:pPr>
+            <a:r>
+              <a:t>CUSTOMER SEGMENTS</a:t>
+            </a:r>
+          </a:p>
+        </p:txBody>
+      </p:sp>
+      <p:sp>
+        <p:nvSpPr>
+          <p:cNvPr id="25" name="TextBox 24"/>
+          <p:cNvSpPr txBox="1"/>
+          <p:nvPr/>
+        </p:nvSpPr>
+        <p:spPr>
+          <a:xfrm>
+            <a:off x="7269480" y="758952"/>
+            <a:ext cx="1581912" cy="2468880"/>
+          </a:xfrm>
+          <a:prstGeom prst="rect">
+            <a:avLst/>
+          </a:prstGeom>
+          <a:noFill/>
+        </p:spPr>
+        <p:txBody>
+          <a:bodyPr wrap="square">
+            <a:spAutoFit/>
+          </a:bodyPr>
+          <a:lstStyle/>
+          <a:p>
+            <a:pPr>
+              <a:spcAft>
+                <a:spcPts val="100"/>
+              </a:spcAft>
+              <a:defRPr sz="600">
+                <a:solidFill>
+                  <a:srgbClr val="323232"/>
+                </a:solidFill>
+              </a:defRPr>
+            </a:pPr>
+            <a:r>
+              <a:t>Primary:</a:t>
+            </a:r>
+          </a:p>
+          <a:p>
+            <a:pPr>
+              <a:spcAft>
+                <a:spcPts val="100"/>
+              </a:spcAft>
+              <a:defRPr sz="600">
+                <a:solidFill>
+                  <a:srgbClr val="323232"/>
+                </a:solidFill>
+              </a:defRPr>
+            </a:pPr>
+            <a:r>
+              <a:t>• Waymo (2,500+ vehicles)</a:t>
+            </a:r>
+          </a:p>
+          <a:p>
+            <a:pPr>
+              <a:spcAft>
+                <a:spcPts val="100"/>
+              </a:spcAft>
+              <a:defRPr sz="600">
+                <a:solidFill>
+                  <a:srgbClr val="323232"/>
+                </a:solidFill>
+              </a:defRPr>
+            </a:pPr>
+            <a:r>
+              <a:t>• Cruise (rebuilding)</a:t>
+            </a:r>
+          </a:p>
+          <a:p>
+            <a:pPr>
+              <a:spcAft>
+                <a:spcPts val="100"/>
+              </a:spcAft>
+              <a:defRPr sz="600">
+                <a:solidFill>
+                  <a:srgbClr val="323232"/>
+                </a:solidFill>
+              </a:defRPr>
+            </a:pPr>
+            <a:r>
+              <a:t>• Zoox (Amazon)</a:t>
+            </a:r>
+          </a:p>
+          <a:p>
+            <a:pPr>
+              <a:spcAft>
+                <a:spcPts val="100"/>
+              </a:spcAft>
+              <a:defRPr sz="600">
+                <a:solidFill>
+                  <a:srgbClr val="323232"/>
+                </a:solidFill>
+              </a:defRPr>
+            </a:pPr>
+            <a:r>
+              <a:t>• Tesla Robotaxi</a:t>
+            </a:r>
+          </a:p>
+          <a:p>
+            <a:pPr>
+              <a:spcAft>
+                <a:spcPts val="100"/>
+              </a:spcAft>
+              <a:defRPr sz="600">
+                <a:solidFill>
+                  <a:srgbClr val="323232"/>
+                </a:solidFill>
+              </a:defRPr>
+            </a:pPr>
+          </a:p>
+          <a:p>
+            <a:pPr>
+              <a:spcAft>
+                <a:spcPts val="100"/>
+              </a:spcAft>
+              <a:defRPr sz="600">
+                <a:solidFill>
+                  <a:srgbClr val="323232"/>
+                </a:solidFill>
+              </a:defRPr>
+            </a:pPr>
+            <a:r>
+              <a:t>Secondary:</a:t>
+            </a:r>
+          </a:p>
+          <a:p>
+            <a:pPr>
+              <a:spcAft>
+                <a:spcPts val="100"/>
+              </a:spcAft>
+              <a:defRPr sz="600">
+                <a:solidFill>
+                  <a:srgbClr val="323232"/>
+                </a:solidFill>
+              </a:defRPr>
+            </a:pPr>
+            <a:r>
+              <a:t>• Amazon Delivery EVs</a:t>
+            </a:r>
+          </a:p>
+          <a:p>
+            <a:pPr>
+              <a:spcAft>
+                <a:spcPts val="100"/>
+              </a:spcAft>
+              <a:defRPr sz="600">
+                <a:solidFill>
+                  <a:srgbClr val="323232"/>
+                </a:solidFill>
+              </a:defRPr>
+            </a:pPr>
+            <a:r>
+              <a:t>• FedEx/UPS electric</a:t>
+            </a:r>
+          </a:p>
+          <a:p>
+            <a:pPr>
+              <a:spcAft>
+                <a:spcPts val="100"/>
+              </a:spcAft>
+              <a:defRPr sz="600">
+                <a:solidFill>
+                  <a:srgbClr val="323232"/>
+                </a:solidFill>
+              </a:defRPr>
+            </a:pPr>
+          </a:p>
+          <a:p>
+            <a:pPr>
+              <a:spcAft>
+                <a:spcPts val="100"/>
+              </a:spcAft>
+              <a:defRPr sz="600">
+                <a:solidFill>
+                  <a:srgbClr val="323232"/>
+                </a:solidFill>
+              </a:defRPr>
+            </a:pPr>
+            <a:r>
+              <a:t>Buyers:</a:t>
+            </a:r>
+          </a:p>
+          <a:p>
+            <a:pPr>
+              <a:spcAft>
+                <a:spcPts val="100"/>
+              </a:spcAft>
+              <a:defRPr sz="600">
+                <a:solidFill>
+                  <a:srgbClr val="323232"/>
+                </a:solidFill>
+              </a:defRPr>
+            </a:pPr>
+            <a:r>
+              <a:t>• VP of Operations</a:t>
+            </a:r>
+          </a:p>
+          <a:p>
+            <a:pPr>
+              <a:spcAft>
+                <a:spcPts val="100"/>
+              </a:spcAft>
+              <a:defRPr sz="600">
+                <a:solidFill>
+                  <a:srgbClr val="323232"/>
+                </a:solidFill>
+              </a:defRPr>
+            </a:pPr>
+            <a:r>
+              <a:t>• Fleet Ops Manager</a:t>
+            </a:r>
+          </a:p>
+        </p:txBody>
+      </p:sp>
+      <p:sp>
+        <p:nvSpPr>
+          <p:cNvPr id="26" name="Rounded Rectangle 25"/>
+          <p:cNvSpPr/>
+          <p:nvPr/>
+        </p:nvSpPr>
+        <p:spPr>
+          <a:xfrm>
+            <a:off x="137160" y="3337560"/>
+            <a:ext cx="3483864" cy="914400"/>
+          </a:xfrm>
+          <a:prstGeom prst="roundRect">
+            <a:avLst/>
+          </a:prstGeom>
+          <a:solidFill>
+            <a:srgbClr val="F0F0F0"/>
+          </a:solidFill>
+          <a:ln w="6350">
+            <a:solidFill>
+              <a:srgbClr val="C8C8C8"/>
+            </a:solidFill>
+          </a:ln>
+        </p:spPr>
+        <p:style>
+          <a:lnRef idx="1">
+            <a:schemeClr val="accent1"/>
+          </a:lnRef>
+          <a:fillRef idx="3">
+            <a:schemeClr val="accent1"/>
+          </a:fillRef>
+          <a:effectRef idx="2">
+            <a:schemeClr val="accent1"/>
+          </a:effectRef>
+          <a:fontRef idx="minor">
+            <a:schemeClr val="lt1"/>
+          </a:fontRef>
+        </p:style>
+        <p:txBody>
+          <a:bodyPr rtlCol="0" anchor="ctr"/>
+          <a:lstStyle/>
+          <a:p>
+            <a:pPr algn="ctr"/>
+          </a:p>
+        </p:txBody>
+      </p:sp>
+      <p:sp>
+        <p:nvSpPr>
+          <p:cNvPr id="27" name="TextBox 26"/>
+          <p:cNvSpPr txBox="1"/>
+          <p:nvPr/>
+        </p:nvSpPr>
+        <p:spPr>
+          <a:xfrm>
+            <a:off x="210312" y="3383280"/>
+            <a:ext cx="3346704" cy="228600"/>
+          </a:xfrm>
+          <a:prstGeom prst="rect">
+            <a:avLst/>
+          </a:prstGeom>
+          <a:noFill/>
+        </p:spPr>
+        <p:txBody>
+          <a:bodyPr wrap="square">
+            <a:spAutoFit/>
+          </a:bodyPr>
+          <a:lstStyle/>
+          <a:p>
+            <a:pPr>
+              <a:defRPr sz="800" b="1">
+                <a:solidFill>
+                  <a:srgbClr val="003366"/>
+                </a:solidFill>
+              </a:defRPr>
+            </a:pPr>
+            <a:r>
+              <a:t>COST STRUCTURE</a:t>
+            </a:r>
+          </a:p>
+        </p:txBody>
+      </p:sp>
+      <p:sp>
+        <p:nvSpPr>
+          <p:cNvPr id="28" name="TextBox 27"/>
+          <p:cNvSpPr txBox="1"/>
+          <p:nvPr/>
+        </p:nvSpPr>
+        <p:spPr>
+          <a:xfrm>
+            <a:off x="210312" y="3593592"/>
+            <a:ext cx="3346704" cy="594360"/>
+          </a:xfrm>
+          <a:prstGeom prst="rect">
+            <a:avLst/>
+          </a:prstGeom>
+          <a:noFill/>
+        </p:spPr>
+        <p:txBody>
+          <a:bodyPr wrap="square">
+            <a:spAutoFit/>
+          </a:bodyPr>
+          <a:lstStyle/>
+          <a:p>
+            <a:pPr>
+              <a:spcAft>
+                <a:spcPts val="100"/>
+              </a:spcAft>
+              <a:defRPr sz="600">
+                <a:solidFill>
+                  <a:srgbClr val="323232"/>
+                </a:solidFill>
+              </a:defRPr>
+            </a:pPr>
+            <a:r>
+              <a:t>Variable: Tech payouts (65-70%), Payment processing (2-3%)</a:t>
+            </a:r>
+          </a:p>
+          <a:p>
+            <a:pPr>
+              <a:spcAft>
+                <a:spcPts val="100"/>
+              </a:spcAft>
+              <a:defRPr sz="600">
+                <a:solidFill>
+                  <a:srgbClr val="323232"/>
+                </a:solidFill>
+              </a:defRPr>
+            </a:pPr>
+            <a:r>
+              <a:t>Fixed: Platform ($15-20K/mo), Team ($40-60K/mo), Marketing ($10-15K/mo)</a:t>
+            </a:r>
+          </a:p>
+          <a:p>
+            <a:pPr>
+              <a:spcAft>
+                <a:spcPts val="100"/>
+              </a:spcAft>
+              <a:defRPr sz="600">
+                <a:solidFill>
+                  <a:srgbClr val="323232"/>
+                </a:solidFill>
+              </a:defRPr>
+            </a:pPr>
+            <a:r>
+              <a:t>Seed: $1.5M total</a:t>
+            </a:r>
+          </a:p>
+        </p:txBody>
+      </p:sp>
+      <p:sp>
+        <p:nvSpPr>
+          <p:cNvPr id="29" name="Rounded Rectangle 28"/>
+          <p:cNvSpPr/>
+          <p:nvPr/>
+        </p:nvSpPr>
+        <p:spPr>
+          <a:xfrm>
+            <a:off x="3666744" y="3337560"/>
+            <a:ext cx="5248656" cy="914400"/>
+          </a:xfrm>
+          <a:prstGeom prst="roundRect">
+            <a:avLst/>
+          </a:prstGeom>
+          <a:solidFill>
+            <a:srgbClr val="DBEAFE"/>
+          </a:solidFill>
+          <a:ln w="6350">
+            <a:solidFill>
+              <a:srgbClr val="C8C8C8"/>
+            </a:solidFill>
+          </a:ln>
+        </p:spPr>
+        <p:style>
+          <a:lnRef idx="1">
+            <a:schemeClr val="accent1"/>
+          </a:lnRef>
+          <a:fillRef idx="3">
+            <a:schemeClr val="accent1"/>
+          </a:fillRef>
+          <a:effectRef idx="2">
+            <a:schemeClr val="accent1"/>
+          </a:effectRef>
+          <a:fontRef idx="minor">
+            <a:schemeClr val="lt1"/>
+          </a:fontRef>
+        </p:style>
+        <p:txBody>
+          <a:bodyPr rtlCol="0" anchor="ctr"/>
+          <a:lstStyle/>
+          <a:p>
+            <a:pPr algn="ctr"/>
+          </a:p>
+        </p:txBody>
+      </p:sp>
+      <p:sp>
+        <p:nvSpPr>
+          <p:cNvPr id="30" name="TextBox 29"/>
+          <p:cNvSpPr txBox="1"/>
+          <p:nvPr/>
+        </p:nvSpPr>
+        <p:spPr>
+          <a:xfrm>
+            <a:off x="3739896" y="3383280"/>
+            <a:ext cx="5111496" cy="228600"/>
+          </a:xfrm>
+          <a:prstGeom prst="rect">
+            <a:avLst/>
+          </a:prstGeom>
+          <a:noFill/>
+        </p:spPr>
+        <p:txBody>
+          <a:bodyPr wrap="square">
+            <a:spAutoFit/>
+          </a:bodyPr>
+          <a:lstStyle/>
+          <a:p>
+            <a:pPr>
+              <a:defRPr sz="800" b="1">
+                <a:solidFill>
+                  <a:srgbClr val="003366"/>
+                </a:solidFill>
+              </a:defRPr>
+            </a:pPr>
+            <a:r>
+              <a:t>REVENUE STREAMS</a:t>
+            </a:r>
+          </a:p>
+        </p:txBody>
+      </p:sp>
+      <p:sp>
+        <p:nvSpPr>
+          <p:cNvPr id="31" name="TextBox 30"/>
+          <p:cNvSpPr txBox="1"/>
+          <p:nvPr/>
+        </p:nvSpPr>
+        <p:spPr>
+          <a:xfrm>
+            <a:off x="3739896" y="3593592"/>
+            <a:ext cx="5111496" cy="594360"/>
+          </a:xfrm>
+          <a:prstGeom prst="rect">
+            <a:avLst/>
+          </a:prstGeom>
+          <a:noFill/>
+        </p:spPr>
+        <p:txBody>
+          <a:bodyPr wrap="square">
+            <a:spAutoFit/>
+          </a:bodyPr>
+          <a:lstStyle/>
+          <a:p>
+            <a:pPr>
+              <a:spcAft>
+                <a:spcPts val="100"/>
+              </a:spcAft>
+              <a:defRPr sz="600">
+                <a:solidFill>
+                  <a:srgbClr val="323232"/>
+                </a:solidFill>
+              </a:defRPr>
+            </a:pPr>
+            <a:r>
+              <a:t>Services: Quick ($12-18) | Deep ($45-75) | Emergency ($75-150)</a:t>
+            </a:r>
+          </a:p>
+          <a:p>
+            <a:pPr>
+              <a:spcAft>
+                <a:spcPts val="100"/>
+              </a:spcAft>
+              <a:defRPr sz="600">
+                <a:solidFill>
+                  <a:srgbClr val="323232"/>
+                </a:solidFill>
+              </a:defRPr>
+            </a:pPr>
+            <a:r>
+              <a:t>Unit Economics: Avg $15/service, 30% margin ($4-5), Target 10K/day</a:t>
+            </a:r>
+          </a:p>
+          <a:p>
+            <a:pPr>
+              <a:spcAft>
+                <a:spcPts val="100"/>
+              </a:spcAft>
+              <a:defRPr sz="600">
+                <a:solidFill>
+                  <a:srgbClr val="323232"/>
+                </a:solidFill>
+              </a:defRPr>
+            </a:pPr>
+            <a:r>
+              <a:t>Projections: Y1 $1.2M → Y2 $5.5M → Y3 $15M | TAM 2032: $5.5B</a:t>
             </a:r>
           </a:p>
         </p:txBody>

</xml_diff>

<commit_message>
Fix: replace text canvas slide 11 with visual canvas, remove duplicate
</commit_message>
<xml_diff>
--- a/pitch/MOTRA-Business-Plan.pptx
+++ b/pitch/MOTRA-Business-Plan.pptx
@@ -28,7 +28,6 @@
     <p:sldId id="276" r:id="rId27"/>
     <p:sldId id="277" r:id="rId28"/>
     <p:sldId id="278" r:id="rId29"/>
-    <p:sldId id="279" r:id="rId30"/>
   </p:sldIdLst>
   <p:sldSz cx="9144000" cy="5143500" type="screen4x3"/>
   <p:notesSz cx="6858000" cy="9144000"/>
@@ -3951,7 +3950,7 @@
         <p:spPr>
           <a:xfrm>
             <a:off x="0" y="0"/>
-            <a:ext cx="9144000" cy="548640"/>
+            <a:ext cx="9144000" cy="457200"/>
           </a:xfrm>
           <a:prstGeom prst="rect">
             <a:avLst/>
@@ -3993,8 +3992,8 @@
         </p:nvSpPr>
         <p:spPr>
           <a:xfrm>
-            <a:off x="182880" y="109728"/>
-            <a:ext cx="365760" cy="320040"/>
+            <a:off x="137160" y="91440"/>
+            <a:ext cx="365760" cy="274320"/>
           </a:xfrm>
           <a:prstGeom prst="rect">
             <a:avLst/>
@@ -4008,7 +4007,7 @@
           <a:lstStyle/>
           <a:p>
             <a:pPr>
-              <a:defRPr sz="1400" b="1">
+              <a:defRPr sz="1200" b="1">
                 <a:solidFill>
                   <a:srgbClr val="FFFFFF"/>
                 </a:solidFill>
@@ -4028,8 +4027,8 @@
         </p:nvSpPr>
         <p:spPr>
           <a:xfrm>
-            <a:off x="548640" y="109728"/>
-            <a:ext cx="7772400" cy="365760"/>
+            <a:off x="457200" y="91440"/>
+            <a:ext cx="7315200" cy="274320"/>
           </a:xfrm>
           <a:prstGeom prst="rect">
             <a:avLst/>
@@ -4043,28 +4042,73 @@
           <a:lstStyle/>
           <a:p>
             <a:pPr>
-              <a:defRPr sz="2000" b="1">
+              <a:defRPr sz="1800" b="1">
                 <a:solidFill>
                   <a:srgbClr val="FFFFFF"/>
                 </a:solidFill>
               </a:defRPr>
             </a:pPr>
             <a:r>
-              <a:t>Business Model Canvas</a:t>
-            </a:r>
-          </a:p>
-        </p:txBody>
-      </p:sp>
-      <p:sp>
-        <p:nvSpPr>
-          <p:cNvPr id="5" name="TextBox 4"/>
+              <a:t>BUSINESS MODEL CANVAS</a:t>
+            </a:r>
+          </a:p>
+        </p:txBody>
+      </p:sp>
+      <p:sp>
+        <p:nvSpPr>
+          <p:cNvPr id="5" name="Rounded Rectangle 4"/>
+          <p:cNvSpPr/>
+          <p:nvPr/>
+        </p:nvSpPr>
+        <p:spPr>
+          <a:xfrm>
+            <a:off x="137160" y="502920"/>
+            <a:ext cx="1719072" cy="2788920"/>
+          </a:xfrm>
+          <a:prstGeom prst="roundRect">
+            <a:avLst/>
+          </a:prstGeom>
+          <a:solidFill>
+            <a:srgbClr val="E8E4F0"/>
+          </a:solidFill>
+          <a:ln w="6350">
+            <a:solidFill>
+              <a:srgbClr val="C8C8C8"/>
+            </a:solidFill>
+          </a:ln>
+        </p:spPr>
+        <p:style>
+          <a:lnRef idx="1">
+            <a:schemeClr val="accent1"/>
+          </a:lnRef>
+          <a:fillRef idx="3">
+            <a:schemeClr val="accent1"/>
+          </a:fillRef>
+          <a:effectRef idx="2">
+            <a:schemeClr val="accent1"/>
+          </a:effectRef>
+          <a:fontRef idx="minor">
+            <a:schemeClr val="lt1"/>
+          </a:fontRef>
+        </p:style>
+        <p:txBody>
+          <a:bodyPr rtlCol="0" anchor="ctr"/>
+          <a:lstStyle/>
+          <a:p>
+            <a:pPr algn="ctr"/>
+          </a:p>
+        </p:txBody>
+      </p:sp>
+      <p:sp>
+        <p:nvSpPr>
+          <p:cNvPr id="6" name="TextBox 5"/>
           <p:cNvSpPr txBox="1"/>
           <p:nvPr/>
         </p:nvSpPr>
         <p:spPr>
           <a:xfrm>
-            <a:off x="365760" y="685800"/>
-            <a:ext cx="8412480" cy="4297680"/>
+            <a:off x="210312" y="548640"/>
+            <a:ext cx="1581912" cy="228600"/>
           </a:xfrm>
           <a:prstGeom prst="rect">
             <a:avLst/>
@@ -4078,236 +4122,1917 @@
           <a:lstStyle/>
           <a:p>
             <a:pPr>
-              <a:spcAft>
-                <a:spcPts val="400"/>
-              </a:spcAft>
-              <a:defRPr sz="1100">
-                <a:solidFill>
-                  <a:srgbClr val="323232"/>
-                </a:solidFill>
-              </a:defRPr>
-            </a:pPr>
-            <a:r>
-              <a:t>KEY PARTNERS                          KEY ACTIVITIES                    VALUE PROPOSITION</a:t>
-            </a:r>
-          </a:p>
-          <a:p>
-            <a:pPr>
-              <a:spcAft>
-                <a:spcPts val="400"/>
-              </a:spcAft>
-              <a:defRPr sz="1100">
-                <a:solidFill>
-                  <a:srgbClr val="323232"/>
-                </a:solidFill>
-              </a:defRPr>
-            </a:pPr>
-            <a:r>
-              <a:t>• AV manufacturers                    • Platform development            • Reduce fleet downtime</a:t>
-            </a:r>
-          </a:p>
-          <a:p>
-            <a:pPr>
-              <a:spcAft>
-                <a:spcPts val="400"/>
-              </a:spcAft>
-              <a:defRPr sz="1100">
-                <a:solidFill>
-                  <a:srgbClr val="323232"/>
-                </a:solidFill>
-              </a:defRPr>
-            </a:pPr>
-            <a:r>
-              <a:t>• Fleet management systems            • Tech recruitment/training       • Variable cost model</a:t>
-            </a:r>
-          </a:p>
-          <a:p>
-            <a:pPr>
-              <a:spcAft>
-                <a:spcPts val="400"/>
-              </a:spcAft>
-              <a:defRPr sz="1100">
-                <a:solidFill>
-                  <a:srgbClr val="323232"/>
-                </a:solidFill>
-              </a:defRPr>
-            </a:pPr>
-            <a:r>
-              <a:t>• Gig worker platforms                • Quality assurance               • 24/7 availability</a:t>
-            </a:r>
-          </a:p>
-          <a:p>
-            <a:pPr>
-              <a:spcAft>
-                <a:spcPts val="400"/>
-              </a:spcAft>
-              <a:defRPr sz="1100">
-                <a:solidFill>
-                  <a:srgbClr val="323232"/>
-                </a:solidFill>
-              </a:defRPr>
-            </a:pPr>
-            <a:r>
-              <a:t>• Insurance providers                 • Enterprise sales                • AV-specialized service</a:t>
-            </a:r>
-          </a:p>
-          <a:p>
-            <a:pPr>
-              <a:spcAft>
-                <a:spcPts val="400"/>
-              </a:spcAft>
-              <a:defRPr sz="1100">
-                <a:solidFill>
-                  <a:srgbClr val="323232"/>
-                </a:solidFill>
-              </a:defRPr>
-            </a:pPr>
-          </a:p>
-          <a:p>
-            <a:pPr>
-              <a:spcAft>
-                <a:spcPts val="400"/>
-              </a:spcAft>
-              <a:defRPr sz="1100">
-                <a:solidFill>
-                  <a:srgbClr val="323232"/>
-                </a:solidFill>
-              </a:defRPr>
-            </a:pPr>
-            <a:r>
-              <a:t>KEY RESOURCES                         CUSTOMER RELATIONSHIPS            CHANNELS</a:t>
-            </a:r>
-          </a:p>
-          <a:p>
-            <a:pPr>
-              <a:spcAft>
-                <a:spcPts val="400"/>
-              </a:spcAft>
-              <a:defRPr sz="1100">
-                <a:solidFill>
-                  <a:srgbClr val="323232"/>
-                </a:solidFill>
-              </a:defRPr>
-            </a:pPr>
-            <a:r>
-              <a:t>• Tech platform                       • Dedicated account managers      • Direct enterprise sales</a:t>
-            </a:r>
-          </a:p>
-          <a:p>
-            <a:pPr>
-              <a:spcAft>
-                <a:spcPts val="400"/>
-              </a:spcAft>
-              <a:defRPr sz="1100">
-                <a:solidFill>
-                  <a:srgbClr val="323232"/>
-                </a:solidFill>
-              </a:defRPr>
-            </a:pPr>
-            <a:r>
-              <a:t>• Trained technician network          • API integration support         • Industry conferences</a:t>
-            </a:r>
-          </a:p>
-          <a:p>
-            <a:pPr>
-              <a:spcAft>
-                <a:spcPts val="400"/>
-              </a:spcAft>
-              <a:defRPr sz="1100">
-                <a:solidFill>
-                  <a:srgbClr val="323232"/>
-                </a:solidFill>
-              </a:defRPr>
-            </a:pPr>
-            <a:r>
-              <a:t>• AV-specific training program        • Performance dashboards          • Partnerships</a:t>
-            </a:r>
-          </a:p>
-          <a:p>
-            <a:pPr>
-              <a:spcAft>
-                <a:spcPts val="400"/>
-              </a:spcAft>
-              <a:defRPr sz="1100">
-                <a:solidFill>
-                  <a:srgbClr val="323232"/>
-                </a:solidFill>
-              </a:defRPr>
-            </a:pPr>
-          </a:p>
-          <a:p>
-            <a:pPr>
-              <a:spcAft>
-                <a:spcPts val="400"/>
-              </a:spcAft>
-              <a:defRPr sz="1100">
-                <a:solidFill>
-                  <a:srgbClr val="323232"/>
-                </a:solidFill>
-              </a:defRPr>
-            </a:pPr>
-            <a:r>
-              <a:t>COST STRUCTURE                                    REVENUE STREAMS</a:t>
-            </a:r>
-          </a:p>
-          <a:p>
-            <a:pPr>
-              <a:spcAft>
-                <a:spcPts val="400"/>
-              </a:spcAft>
-              <a:defRPr sz="1100">
-                <a:solidFill>
-                  <a:srgbClr val="323232"/>
-                </a:solidFill>
-              </a:defRPr>
-            </a:pPr>
-            <a:r>
-              <a:t>• Platform development &amp; maintenance              • Per-service fees ($12-75)</a:t>
-            </a:r>
-          </a:p>
-          <a:p>
-            <a:pPr>
-              <a:spcAft>
-                <a:spcPts val="400"/>
-              </a:spcAft>
-              <a:defRPr sz="1100">
-                <a:solidFill>
-                  <a:srgbClr val="323232"/>
-                </a:solidFill>
-              </a:defRPr>
-            </a:pPr>
-            <a:r>
-              <a:t>• Technician payouts (65-70% of service fee)      • Enterprise contracts</a:t>
-            </a:r>
-          </a:p>
-          <a:p>
-            <a:pPr>
-              <a:spcAft>
-                <a:spcPts val="400"/>
-              </a:spcAft>
-              <a:defRPr sz="1100">
-                <a:solidFill>
-                  <a:srgbClr val="323232"/>
-                </a:solidFill>
-              </a:defRPr>
-            </a:pPr>
-            <a:r>
-              <a:t>• Marketing &amp; sales                               • Premium/emergency services</a:t>
-            </a:r>
-          </a:p>
-          <a:p>
-            <a:pPr>
-              <a:spcAft>
-                <a:spcPts val="400"/>
-              </a:spcAft>
-              <a:defRPr sz="1100">
-                <a:solidFill>
-                  <a:srgbClr val="323232"/>
-                </a:solidFill>
-              </a:defRPr>
-            </a:pPr>
-            <a:r>
-              <a:t>• Insurance &amp; compliance                          • Data analytics (future)</a:t>
+              <a:defRPr sz="800" b="1">
+                <a:solidFill>
+                  <a:srgbClr val="003366"/>
+                </a:solidFill>
+              </a:defRPr>
+            </a:pPr>
+            <a:r>
+              <a:t>KEY PARTNERS</a:t>
+            </a:r>
+          </a:p>
+        </p:txBody>
+      </p:sp>
+      <p:sp>
+        <p:nvSpPr>
+          <p:cNvPr id="7" name="TextBox 6"/>
+          <p:cNvSpPr txBox="1"/>
+          <p:nvPr/>
+        </p:nvSpPr>
+        <p:spPr>
+          <a:xfrm>
+            <a:off x="210312" y="758952"/>
+            <a:ext cx="1581912" cy="2468880"/>
+          </a:xfrm>
+          <a:prstGeom prst="rect">
+            <a:avLst/>
+          </a:prstGeom>
+          <a:noFill/>
+        </p:spPr>
+        <p:txBody>
+          <a:bodyPr wrap="square">
+            <a:spAutoFit/>
+          </a:bodyPr>
+          <a:lstStyle/>
+          <a:p>
+            <a:pPr>
+              <a:spcAft>
+                <a:spcPts val="100"/>
+              </a:spcAft>
+              <a:defRPr sz="600">
+                <a:solidFill>
+                  <a:srgbClr val="323232"/>
+                </a:solidFill>
+              </a:defRPr>
+            </a:pPr>
+            <a:r>
+              <a:t>AV Ecosystem:</a:t>
+            </a:r>
+          </a:p>
+          <a:p>
+            <a:pPr>
+              <a:spcAft>
+                <a:spcPts val="100"/>
+              </a:spcAft>
+              <a:defRPr sz="600">
+                <a:solidFill>
+                  <a:srgbClr val="323232"/>
+                </a:solidFill>
+              </a:defRPr>
+            </a:pPr>
+            <a:r>
+              <a:t>• Waymo, Cruise, Zoox, Tesla</a:t>
+            </a:r>
+          </a:p>
+          <a:p>
+            <a:pPr>
+              <a:spcAft>
+                <a:spcPts val="100"/>
+              </a:spcAft>
+              <a:defRPr sz="600">
+                <a:solidFill>
+                  <a:srgbClr val="323232"/>
+                </a:solidFill>
+              </a:defRPr>
+            </a:pPr>
+            <a:r>
+              <a:t>• Fleet mgmt software</a:t>
+            </a:r>
+          </a:p>
+          <a:p>
+            <a:pPr>
+              <a:spcAft>
+                <a:spcPts val="100"/>
+              </a:spcAft>
+              <a:defRPr sz="600">
+                <a:solidFill>
+                  <a:srgbClr val="323232"/>
+                </a:solidFill>
+              </a:defRPr>
+            </a:pPr>
+          </a:p>
+          <a:p>
+            <a:pPr>
+              <a:spcAft>
+                <a:spcPts val="100"/>
+              </a:spcAft>
+              <a:defRPr sz="600">
+                <a:solidFill>
+                  <a:srgbClr val="323232"/>
+                </a:solidFill>
+              </a:defRPr>
+            </a:pPr>
+            <a:r>
+              <a:t>Gig Economy:</a:t>
+            </a:r>
+          </a:p>
+          <a:p>
+            <a:pPr>
+              <a:spcAft>
+                <a:spcPts val="100"/>
+              </a:spcAft>
+              <a:defRPr sz="600">
+                <a:solidFill>
+                  <a:srgbClr val="323232"/>
+                </a:solidFill>
+              </a:defRPr>
+            </a:pPr>
+            <a:r>
+              <a:t>• Existing gig platforms</a:t>
+            </a:r>
+          </a:p>
+          <a:p>
+            <a:pPr>
+              <a:spcAft>
+                <a:spcPts val="100"/>
+              </a:spcAft>
+              <a:defRPr sz="600">
+                <a:solidFill>
+                  <a:srgbClr val="323232"/>
+                </a:solidFill>
+              </a:defRPr>
+            </a:pPr>
+            <a:r>
+              <a:t>• Training providers</a:t>
+            </a:r>
+          </a:p>
+          <a:p>
+            <a:pPr>
+              <a:spcAft>
+                <a:spcPts val="100"/>
+              </a:spcAft>
+              <a:defRPr sz="600">
+                <a:solidFill>
+                  <a:srgbClr val="323232"/>
+                </a:solidFill>
+              </a:defRPr>
+            </a:pPr>
+            <a:r>
+              <a:t>• Equipment suppliers</a:t>
+            </a:r>
+          </a:p>
+          <a:p>
+            <a:pPr>
+              <a:spcAft>
+                <a:spcPts val="100"/>
+              </a:spcAft>
+              <a:defRPr sz="600">
+                <a:solidFill>
+                  <a:srgbClr val="323232"/>
+                </a:solidFill>
+              </a:defRPr>
+            </a:pPr>
+          </a:p>
+          <a:p>
+            <a:pPr>
+              <a:spcAft>
+                <a:spcPts val="100"/>
+              </a:spcAft>
+              <a:defRPr sz="600">
+                <a:solidFill>
+                  <a:srgbClr val="323232"/>
+                </a:solidFill>
+              </a:defRPr>
+            </a:pPr>
+            <a:r>
+              <a:t>Supporting:</a:t>
+            </a:r>
+          </a:p>
+          <a:p>
+            <a:pPr>
+              <a:spcAft>
+                <a:spcPts val="100"/>
+              </a:spcAft>
+              <a:defRPr sz="600">
+                <a:solidFill>
+                  <a:srgbClr val="323232"/>
+                </a:solidFill>
+              </a:defRPr>
+            </a:pPr>
+            <a:r>
+              <a:t>• Insurance providers</a:t>
+            </a:r>
+          </a:p>
+          <a:p>
+            <a:pPr>
+              <a:spcAft>
+                <a:spcPts val="100"/>
+              </a:spcAft>
+              <a:defRPr sz="600">
+                <a:solidFill>
+                  <a:srgbClr val="323232"/>
+                </a:solidFill>
+              </a:defRPr>
+            </a:pPr>
+            <a:r>
+              <a:t>• Background checks</a:t>
+            </a:r>
+          </a:p>
+          <a:p>
+            <a:pPr>
+              <a:spcAft>
+                <a:spcPts val="100"/>
+              </a:spcAft>
+              <a:defRPr sz="600">
+                <a:solidFill>
+                  <a:srgbClr val="323232"/>
+                </a:solidFill>
+              </a:defRPr>
+            </a:pPr>
+            <a:r>
+              <a:t>• Payment processing</a:t>
+            </a:r>
+          </a:p>
+        </p:txBody>
+      </p:sp>
+      <p:sp>
+        <p:nvSpPr>
+          <p:cNvPr id="8" name="Rounded Rectangle 7"/>
+          <p:cNvSpPr/>
+          <p:nvPr/>
+        </p:nvSpPr>
+        <p:spPr>
+          <a:xfrm>
+            <a:off x="1901952" y="502920"/>
+            <a:ext cx="1719072" cy="1371600"/>
+          </a:xfrm>
+          <a:prstGeom prst="roundRect">
+            <a:avLst/>
+          </a:prstGeom>
+          <a:solidFill>
+            <a:srgbClr val="E8E4F0"/>
+          </a:solidFill>
+          <a:ln w="6350">
+            <a:solidFill>
+              <a:srgbClr val="C8C8C8"/>
+            </a:solidFill>
+          </a:ln>
+        </p:spPr>
+        <p:style>
+          <a:lnRef idx="1">
+            <a:schemeClr val="accent1"/>
+          </a:lnRef>
+          <a:fillRef idx="3">
+            <a:schemeClr val="accent1"/>
+          </a:fillRef>
+          <a:effectRef idx="2">
+            <a:schemeClr val="accent1"/>
+          </a:effectRef>
+          <a:fontRef idx="minor">
+            <a:schemeClr val="lt1"/>
+          </a:fontRef>
+        </p:style>
+        <p:txBody>
+          <a:bodyPr rtlCol="0" anchor="ctr"/>
+          <a:lstStyle/>
+          <a:p>
+            <a:pPr algn="ctr"/>
+          </a:p>
+        </p:txBody>
+      </p:sp>
+      <p:sp>
+        <p:nvSpPr>
+          <p:cNvPr id="9" name="TextBox 8"/>
+          <p:cNvSpPr txBox="1"/>
+          <p:nvPr/>
+        </p:nvSpPr>
+        <p:spPr>
+          <a:xfrm>
+            <a:off x="1975104" y="548640"/>
+            <a:ext cx="1581912" cy="228600"/>
+          </a:xfrm>
+          <a:prstGeom prst="rect">
+            <a:avLst/>
+          </a:prstGeom>
+          <a:noFill/>
+        </p:spPr>
+        <p:txBody>
+          <a:bodyPr wrap="square">
+            <a:spAutoFit/>
+          </a:bodyPr>
+          <a:lstStyle/>
+          <a:p>
+            <a:pPr>
+              <a:defRPr sz="800" b="1">
+                <a:solidFill>
+                  <a:srgbClr val="003366"/>
+                </a:solidFill>
+              </a:defRPr>
+            </a:pPr>
+            <a:r>
+              <a:t>KEY ACTIVITIES</a:t>
+            </a:r>
+          </a:p>
+        </p:txBody>
+      </p:sp>
+      <p:sp>
+        <p:nvSpPr>
+          <p:cNvPr id="10" name="TextBox 9"/>
+          <p:cNvSpPr txBox="1"/>
+          <p:nvPr/>
+        </p:nvSpPr>
+        <p:spPr>
+          <a:xfrm>
+            <a:off x="1975104" y="758952"/>
+            <a:ext cx="1581912" cy="1051560"/>
+          </a:xfrm>
+          <a:prstGeom prst="rect">
+            <a:avLst/>
+          </a:prstGeom>
+          <a:noFill/>
+        </p:spPr>
+        <p:txBody>
+          <a:bodyPr wrap="square">
+            <a:spAutoFit/>
+          </a:bodyPr>
+          <a:lstStyle/>
+          <a:p>
+            <a:pPr>
+              <a:spcAft>
+                <a:spcPts val="100"/>
+              </a:spcAft>
+              <a:defRPr sz="600">
+                <a:solidFill>
+                  <a:srgbClr val="323232"/>
+                </a:solidFill>
+              </a:defRPr>
+            </a:pPr>
+            <a:r>
+              <a:t>• Platform development</a:t>
+            </a:r>
+          </a:p>
+          <a:p>
+            <a:pPr>
+              <a:spcAft>
+                <a:spcPts val="100"/>
+              </a:spcAft>
+              <a:defRPr sz="600">
+                <a:solidFill>
+                  <a:srgbClr val="323232"/>
+                </a:solidFill>
+              </a:defRPr>
+            </a:pPr>
+            <a:r>
+              <a:t>• Tech recruitment</a:t>
+            </a:r>
+          </a:p>
+          <a:p>
+            <a:pPr>
+              <a:spcAft>
+                <a:spcPts val="100"/>
+              </a:spcAft>
+              <a:defRPr sz="600">
+                <a:solidFill>
+                  <a:srgbClr val="323232"/>
+                </a:solidFill>
+              </a:defRPr>
+            </a:pPr>
+            <a:r>
+              <a:t>• AV-specific training</a:t>
+            </a:r>
+          </a:p>
+          <a:p>
+            <a:pPr>
+              <a:spcAft>
+                <a:spcPts val="100"/>
+              </a:spcAft>
+              <a:defRPr sz="600">
+                <a:solidFill>
+                  <a:srgbClr val="323232"/>
+                </a:solidFill>
+              </a:defRPr>
+            </a:pPr>
+            <a:r>
+              <a:t>• Quality assurance</a:t>
+            </a:r>
+          </a:p>
+          <a:p>
+            <a:pPr>
+              <a:spcAft>
+                <a:spcPts val="100"/>
+              </a:spcAft>
+              <a:defRPr sz="600">
+                <a:solidFill>
+                  <a:srgbClr val="323232"/>
+                </a:solidFill>
+              </a:defRPr>
+            </a:pPr>
+            <a:r>
+              <a:t>• Enterprise sales</a:t>
+            </a:r>
+          </a:p>
+        </p:txBody>
+      </p:sp>
+      <p:sp>
+        <p:nvSpPr>
+          <p:cNvPr id="11" name="Rounded Rectangle 10"/>
+          <p:cNvSpPr/>
+          <p:nvPr/>
+        </p:nvSpPr>
+        <p:spPr>
+          <a:xfrm>
+            <a:off x="1901952" y="1920240"/>
+            <a:ext cx="1719072" cy="1371600"/>
+          </a:xfrm>
+          <a:prstGeom prst="roundRect">
+            <a:avLst/>
+          </a:prstGeom>
+          <a:solidFill>
+            <a:srgbClr val="E8E4F0"/>
+          </a:solidFill>
+          <a:ln w="6350">
+            <a:solidFill>
+              <a:srgbClr val="C8C8C8"/>
+            </a:solidFill>
+          </a:ln>
+        </p:spPr>
+        <p:style>
+          <a:lnRef idx="1">
+            <a:schemeClr val="accent1"/>
+          </a:lnRef>
+          <a:fillRef idx="3">
+            <a:schemeClr val="accent1"/>
+          </a:fillRef>
+          <a:effectRef idx="2">
+            <a:schemeClr val="accent1"/>
+          </a:effectRef>
+          <a:fontRef idx="minor">
+            <a:schemeClr val="lt1"/>
+          </a:fontRef>
+        </p:style>
+        <p:txBody>
+          <a:bodyPr rtlCol="0" anchor="ctr"/>
+          <a:lstStyle/>
+          <a:p>
+            <a:pPr algn="ctr"/>
+          </a:p>
+        </p:txBody>
+      </p:sp>
+      <p:sp>
+        <p:nvSpPr>
+          <p:cNvPr id="12" name="TextBox 11"/>
+          <p:cNvSpPr txBox="1"/>
+          <p:nvPr/>
+        </p:nvSpPr>
+        <p:spPr>
+          <a:xfrm>
+            <a:off x="1975104" y="1965960"/>
+            <a:ext cx="1581912" cy="228600"/>
+          </a:xfrm>
+          <a:prstGeom prst="rect">
+            <a:avLst/>
+          </a:prstGeom>
+          <a:noFill/>
+        </p:spPr>
+        <p:txBody>
+          <a:bodyPr wrap="square">
+            <a:spAutoFit/>
+          </a:bodyPr>
+          <a:lstStyle/>
+          <a:p>
+            <a:pPr>
+              <a:defRPr sz="800" b="1">
+                <a:solidFill>
+                  <a:srgbClr val="003366"/>
+                </a:solidFill>
+              </a:defRPr>
+            </a:pPr>
+            <a:r>
+              <a:t>KEY RESOURCES</a:t>
+            </a:r>
+          </a:p>
+        </p:txBody>
+      </p:sp>
+      <p:sp>
+        <p:nvSpPr>
+          <p:cNvPr id="13" name="TextBox 12"/>
+          <p:cNvSpPr txBox="1"/>
+          <p:nvPr/>
+        </p:nvSpPr>
+        <p:spPr>
+          <a:xfrm>
+            <a:off x="1975104" y="2176272"/>
+            <a:ext cx="1581912" cy="1051560"/>
+          </a:xfrm>
+          <a:prstGeom prst="rect">
+            <a:avLst/>
+          </a:prstGeom>
+          <a:noFill/>
+        </p:spPr>
+        <p:txBody>
+          <a:bodyPr wrap="square">
+            <a:spAutoFit/>
+          </a:bodyPr>
+          <a:lstStyle/>
+          <a:p>
+            <a:pPr>
+              <a:spcAft>
+                <a:spcPts val="100"/>
+              </a:spcAft>
+              <a:defRPr sz="600">
+                <a:solidFill>
+                  <a:srgbClr val="323232"/>
+                </a:solidFill>
+              </a:defRPr>
+            </a:pPr>
+            <a:r>
+              <a:t>Technology:</a:t>
+            </a:r>
+          </a:p>
+          <a:p>
+            <a:pPr>
+              <a:spcAft>
+                <a:spcPts val="100"/>
+              </a:spcAft>
+              <a:defRPr sz="600">
+                <a:solidFill>
+                  <a:srgbClr val="323232"/>
+                </a:solidFill>
+              </a:defRPr>
+            </a:pPr>
+            <a:r>
+              <a:t>• Dispatch platform</a:t>
+            </a:r>
+          </a:p>
+          <a:p>
+            <a:pPr>
+              <a:spcAft>
+                <a:spcPts val="100"/>
+              </a:spcAft>
+              <a:defRPr sz="600">
+                <a:solidFill>
+                  <a:srgbClr val="323232"/>
+                </a:solidFill>
+              </a:defRPr>
+            </a:pPr>
+            <a:r>
+              <a:t>• Fleet dashboard</a:t>
+            </a:r>
+          </a:p>
+          <a:p>
+            <a:pPr>
+              <a:spcAft>
+                <a:spcPts val="100"/>
+              </a:spcAft>
+              <a:defRPr sz="600">
+                <a:solidFill>
+                  <a:srgbClr val="323232"/>
+                </a:solidFill>
+              </a:defRPr>
+            </a:pPr>
+            <a:r>
+              <a:t>• Technician app</a:t>
+            </a:r>
+          </a:p>
+          <a:p>
+            <a:pPr>
+              <a:spcAft>
+                <a:spcPts val="100"/>
+              </a:spcAft>
+              <a:defRPr sz="600">
+                <a:solidFill>
+                  <a:srgbClr val="323232"/>
+                </a:solidFill>
+              </a:defRPr>
+            </a:pPr>
+          </a:p>
+          <a:p>
+            <a:pPr>
+              <a:spcAft>
+                <a:spcPts val="100"/>
+              </a:spcAft>
+              <a:defRPr sz="600">
+                <a:solidFill>
+                  <a:srgbClr val="323232"/>
+                </a:solidFill>
+              </a:defRPr>
+            </a:pPr>
+            <a:r>
+              <a:t>Human:</a:t>
+            </a:r>
+          </a:p>
+          <a:p>
+            <a:pPr>
+              <a:spcAft>
+                <a:spcPts val="100"/>
+              </a:spcAft>
+              <a:defRPr sz="600">
+                <a:solidFill>
+                  <a:srgbClr val="323232"/>
+                </a:solidFill>
+              </a:defRPr>
+            </a:pPr>
+            <a:r>
+              <a:t>• Engineering team</a:t>
+            </a:r>
+          </a:p>
+          <a:p>
+            <a:pPr>
+              <a:spcAft>
+                <a:spcPts val="100"/>
+              </a:spcAft>
+              <a:defRPr sz="600">
+                <a:solidFill>
+                  <a:srgbClr val="323232"/>
+                </a:solidFill>
+              </a:defRPr>
+            </a:pPr>
+            <a:r>
+              <a:t>• Trained tech network</a:t>
+            </a:r>
+          </a:p>
+        </p:txBody>
+      </p:sp>
+      <p:sp>
+        <p:nvSpPr>
+          <p:cNvPr id="14" name="Rounded Rectangle 13"/>
+          <p:cNvSpPr/>
+          <p:nvPr/>
+        </p:nvSpPr>
+        <p:spPr>
+          <a:xfrm>
+            <a:off x="3666744" y="502920"/>
+            <a:ext cx="1719072" cy="2788920"/>
+          </a:xfrm>
+          <a:prstGeom prst="roundRect">
+            <a:avLst/>
+          </a:prstGeom>
+          <a:solidFill>
+            <a:srgbClr val="FCE4D6"/>
+          </a:solidFill>
+          <a:ln w="6350">
+            <a:solidFill>
+              <a:srgbClr val="C8C8C8"/>
+            </a:solidFill>
+          </a:ln>
+        </p:spPr>
+        <p:style>
+          <a:lnRef idx="1">
+            <a:schemeClr val="accent1"/>
+          </a:lnRef>
+          <a:fillRef idx="3">
+            <a:schemeClr val="accent1"/>
+          </a:fillRef>
+          <a:effectRef idx="2">
+            <a:schemeClr val="accent1"/>
+          </a:effectRef>
+          <a:fontRef idx="minor">
+            <a:schemeClr val="lt1"/>
+          </a:fontRef>
+        </p:style>
+        <p:txBody>
+          <a:bodyPr rtlCol="0" anchor="ctr"/>
+          <a:lstStyle/>
+          <a:p>
+            <a:pPr algn="ctr"/>
+          </a:p>
+        </p:txBody>
+      </p:sp>
+      <p:sp>
+        <p:nvSpPr>
+          <p:cNvPr id="15" name="TextBox 14"/>
+          <p:cNvSpPr txBox="1"/>
+          <p:nvPr/>
+        </p:nvSpPr>
+        <p:spPr>
+          <a:xfrm>
+            <a:off x="3739896" y="548640"/>
+            <a:ext cx="1581912" cy="228600"/>
+          </a:xfrm>
+          <a:prstGeom prst="rect">
+            <a:avLst/>
+          </a:prstGeom>
+          <a:noFill/>
+        </p:spPr>
+        <p:txBody>
+          <a:bodyPr wrap="square">
+            <a:spAutoFit/>
+          </a:bodyPr>
+          <a:lstStyle/>
+          <a:p>
+            <a:pPr>
+              <a:defRPr sz="800" b="1">
+                <a:solidFill>
+                  <a:srgbClr val="003366"/>
+                </a:solidFill>
+              </a:defRPr>
+            </a:pPr>
+            <a:r>
+              <a:t>VALUE PROPOSITIONS</a:t>
+            </a:r>
+          </a:p>
+        </p:txBody>
+      </p:sp>
+      <p:sp>
+        <p:nvSpPr>
+          <p:cNvPr id="16" name="TextBox 15"/>
+          <p:cNvSpPr txBox="1"/>
+          <p:nvPr/>
+        </p:nvSpPr>
+        <p:spPr>
+          <a:xfrm>
+            <a:off x="3739896" y="758952"/>
+            <a:ext cx="1581912" cy="2468880"/>
+          </a:xfrm>
+          <a:prstGeom prst="rect">
+            <a:avLst/>
+          </a:prstGeom>
+          <a:noFill/>
+        </p:spPr>
+        <p:txBody>
+          <a:bodyPr wrap="square">
+            <a:spAutoFit/>
+          </a:bodyPr>
+          <a:lstStyle/>
+          <a:p>
+            <a:pPr>
+              <a:spcAft>
+                <a:spcPts val="100"/>
+              </a:spcAft>
+              <a:defRPr sz="600">
+                <a:solidFill>
+                  <a:srgbClr val="323232"/>
+                </a:solidFill>
+              </a:defRPr>
+            </a:pPr>
+            <a:r>
+              <a:t>For Fleet Operators:</a:t>
+            </a:r>
+          </a:p>
+          <a:p>
+            <a:pPr>
+              <a:spcAft>
+                <a:spcPts val="100"/>
+              </a:spcAft>
+              <a:defRPr sz="600">
+                <a:solidFill>
+                  <a:srgbClr val="323232"/>
+                </a:solidFill>
+              </a:defRPr>
+            </a:pPr>
+            <a:r>
+              <a:t>• Reduce downtime</a:t>
+            </a:r>
+          </a:p>
+          <a:p>
+            <a:pPr>
+              <a:spcAft>
+                <a:spcPts val="100"/>
+              </a:spcAft>
+              <a:defRPr sz="600">
+                <a:solidFill>
+                  <a:srgbClr val="323232"/>
+                </a:solidFill>
+              </a:defRPr>
+            </a:pPr>
+            <a:r>
+              <a:t>• Variable cost model</a:t>
+            </a:r>
+          </a:p>
+          <a:p>
+            <a:pPr>
+              <a:spcAft>
+                <a:spcPts val="100"/>
+              </a:spcAft>
+              <a:defRPr sz="600">
+                <a:solidFill>
+                  <a:srgbClr val="323232"/>
+                </a:solidFill>
+              </a:defRPr>
+            </a:pPr>
+            <a:r>
+              <a:t>• Scale instantly</a:t>
+            </a:r>
+          </a:p>
+          <a:p>
+            <a:pPr>
+              <a:spcAft>
+                <a:spcPts val="100"/>
+              </a:spcAft>
+              <a:defRPr sz="600">
+                <a:solidFill>
+                  <a:srgbClr val="323232"/>
+                </a:solidFill>
+              </a:defRPr>
+            </a:pPr>
+            <a:r>
+              <a:t>• 24/7 availability</a:t>
+            </a:r>
+          </a:p>
+          <a:p>
+            <a:pPr>
+              <a:spcAft>
+                <a:spcPts val="100"/>
+              </a:spcAft>
+              <a:defRPr sz="600">
+                <a:solidFill>
+                  <a:srgbClr val="323232"/>
+                </a:solidFill>
+              </a:defRPr>
+            </a:pPr>
+            <a:r>
+              <a:t>• API integration</a:t>
+            </a:r>
+          </a:p>
+          <a:p>
+            <a:pPr>
+              <a:spcAft>
+                <a:spcPts val="100"/>
+              </a:spcAft>
+              <a:defRPr sz="600">
+                <a:solidFill>
+                  <a:srgbClr val="323232"/>
+                </a:solidFill>
+              </a:defRPr>
+            </a:pPr>
+          </a:p>
+          <a:p>
+            <a:pPr>
+              <a:spcAft>
+                <a:spcPts val="100"/>
+              </a:spcAft>
+              <a:defRPr sz="600">
+                <a:solidFill>
+                  <a:srgbClr val="323232"/>
+                </a:solidFill>
+              </a:defRPr>
+            </a:pPr>
+            <a:r>
+              <a:t>vs. In-House:</a:t>
+            </a:r>
+          </a:p>
+          <a:p>
+            <a:pPr>
+              <a:spcAft>
+                <a:spcPts val="100"/>
+              </a:spcAft>
+              <a:defRPr sz="600">
+                <a:solidFill>
+                  <a:srgbClr val="323232"/>
+                </a:solidFill>
+              </a:defRPr>
+            </a:pPr>
+            <a:r>
+              <a:t>• 50% cost reduction</a:t>
+            </a:r>
+          </a:p>
+          <a:p>
+            <a:pPr>
+              <a:spcAft>
+                <a:spcPts val="100"/>
+              </a:spcAft>
+              <a:defRPr sz="600">
+                <a:solidFill>
+                  <a:srgbClr val="323232"/>
+                </a:solidFill>
+              </a:defRPr>
+            </a:pPr>
+            <a:r>
+              <a:t>• 30% more uptime</a:t>
+            </a:r>
+          </a:p>
+          <a:p>
+            <a:pPr>
+              <a:spcAft>
+                <a:spcPts val="100"/>
+              </a:spcAft>
+              <a:defRPr sz="600">
+                <a:solidFill>
+                  <a:srgbClr val="323232"/>
+                </a:solidFill>
+              </a:defRPr>
+            </a:pPr>
+          </a:p>
+          <a:p>
+            <a:pPr>
+              <a:spcAft>
+                <a:spcPts val="100"/>
+              </a:spcAft>
+              <a:defRPr sz="600">
+                <a:solidFill>
+                  <a:srgbClr val="323232"/>
+                </a:solidFill>
+              </a:defRPr>
+            </a:pPr>
+            <a:r>
+              <a:t>For Technicians:</a:t>
+            </a:r>
+          </a:p>
+          <a:p>
+            <a:pPr>
+              <a:spcAft>
+                <a:spcPts val="100"/>
+              </a:spcAft>
+              <a:defRPr sz="600">
+                <a:solidFill>
+                  <a:srgbClr val="323232"/>
+                </a:solidFill>
+              </a:defRPr>
+            </a:pPr>
+            <a:r>
+              <a:t>• Flexible gig work</a:t>
+            </a:r>
+          </a:p>
+          <a:p>
+            <a:pPr>
+              <a:spcAft>
+                <a:spcPts val="100"/>
+              </a:spcAft>
+              <a:defRPr sz="600">
+                <a:solidFill>
+                  <a:srgbClr val="323232"/>
+                </a:solidFill>
+              </a:defRPr>
+            </a:pPr>
+            <a:r>
+              <a:t>• $15-20/hour</a:t>
+            </a:r>
+          </a:p>
+        </p:txBody>
+      </p:sp>
+      <p:sp>
+        <p:nvSpPr>
+          <p:cNvPr id="17" name="Rounded Rectangle 16"/>
+          <p:cNvSpPr/>
+          <p:nvPr/>
+        </p:nvSpPr>
+        <p:spPr>
+          <a:xfrm>
+            <a:off x="5431536" y="502920"/>
+            <a:ext cx="1719072" cy="1371600"/>
+          </a:xfrm>
+          <a:prstGeom prst="roundRect">
+            <a:avLst/>
+          </a:prstGeom>
+          <a:solidFill>
+            <a:srgbClr val="FFF9E6"/>
+          </a:solidFill>
+          <a:ln w="6350">
+            <a:solidFill>
+              <a:srgbClr val="C8C8C8"/>
+            </a:solidFill>
+          </a:ln>
+        </p:spPr>
+        <p:style>
+          <a:lnRef idx="1">
+            <a:schemeClr val="accent1"/>
+          </a:lnRef>
+          <a:fillRef idx="3">
+            <a:schemeClr val="accent1"/>
+          </a:fillRef>
+          <a:effectRef idx="2">
+            <a:schemeClr val="accent1"/>
+          </a:effectRef>
+          <a:fontRef idx="minor">
+            <a:schemeClr val="lt1"/>
+          </a:fontRef>
+        </p:style>
+        <p:txBody>
+          <a:bodyPr rtlCol="0" anchor="ctr"/>
+          <a:lstStyle/>
+          <a:p>
+            <a:pPr algn="ctr"/>
+          </a:p>
+        </p:txBody>
+      </p:sp>
+      <p:sp>
+        <p:nvSpPr>
+          <p:cNvPr id="18" name="TextBox 17"/>
+          <p:cNvSpPr txBox="1"/>
+          <p:nvPr/>
+        </p:nvSpPr>
+        <p:spPr>
+          <a:xfrm>
+            <a:off x="5504688" y="548640"/>
+            <a:ext cx="1581912" cy="228600"/>
+          </a:xfrm>
+          <a:prstGeom prst="rect">
+            <a:avLst/>
+          </a:prstGeom>
+          <a:noFill/>
+        </p:spPr>
+        <p:txBody>
+          <a:bodyPr wrap="square">
+            <a:spAutoFit/>
+          </a:bodyPr>
+          <a:lstStyle/>
+          <a:p>
+            <a:pPr>
+              <a:defRPr sz="800" b="1">
+                <a:solidFill>
+                  <a:srgbClr val="003366"/>
+                </a:solidFill>
+              </a:defRPr>
+            </a:pPr>
+            <a:r>
+              <a:t>CUSTOMER RELATIONSHIPS</a:t>
+            </a:r>
+          </a:p>
+        </p:txBody>
+      </p:sp>
+      <p:sp>
+        <p:nvSpPr>
+          <p:cNvPr id="19" name="TextBox 18"/>
+          <p:cNvSpPr txBox="1"/>
+          <p:nvPr/>
+        </p:nvSpPr>
+        <p:spPr>
+          <a:xfrm>
+            <a:off x="5504688" y="758952"/>
+            <a:ext cx="1581912" cy="1051560"/>
+          </a:xfrm>
+          <a:prstGeom prst="rect">
+            <a:avLst/>
+          </a:prstGeom>
+          <a:noFill/>
+        </p:spPr>
+        <p:txBody>
+          <a:bodyPr wrap="square">
+            <a:spAutoFit/>
+          </a:bodyPr>
+          <a:lstStyle/>
+          <a:p>
+            <a:pPr>
+              <a:spcAft>
+                <a:spcPts val="100"/>
+              </a:spcAft>
+              <a:defRPr sz="600">
+                <a:solidFill>
+                  <a:srgbClr val="323232"/>
+                </a:solidFill>
+              </a:defRPr>
+            </a:pPr>
+            <a:r>
+              <a:t>• Dedicated account mgrs</a:t>
+            </a:r>
+          </a:p>
+          <a:p>
+            <a:pPr>
+              <a:spcAft>
+                <a:spcPts val="100"/>
+              </a:spcAft>
+              <a:defRPr sz="600">
+                <a:solidFill>
+                  <a:srgbClr val="323232"/>
+                </a:solidFill>
+              </a:defRPr>
+            </a:pPr>
+            <a:r>
+              <a:t>• API integration support</a:t>
+            </a:r>
+          </a:p>
+          <a:p>
+            <a:pPr>
+              <a:spcAft>
+                <a:spcPts val="100"/>
+              </a:spcAft>
+              <a:defRPr sz="600">
+                <a:solidFill>
+                  <a:srgbClr val="323232"/>
+                </a:solidFill>
+              </a:defRPr>
+            </a:pPr>
+            <a:r>
+              <a:t>• Performance dashboards</a:t>
+            </a:r>
+          </a:p>
+          <a:p>
+            <a:pPr>
+              <a:spcAft>
+                <a:spcPts val="100"/>
+              </a:spcAft>
+              <a:defRPr sz="600">
+                <a:solidFill>
+                  <a:srgbClr val="323232"/>
+                </a:solidFill>
+              </a:defRPr>
+            </a:pPr>
+            <a:r>
+              <a:t>• SLA guarantees</a:t>
+            </a:r>
+          </a:p>
+          <a:p>
+            <a:pPr>
+              <a:spcAft>
+                <a:spcPts val="100"/>
+              </a:spcAft>
+              <a:defRPr sz="600">
+                <a:solidFill>
+                  <a:srgbClr val="323232"/>
+                </a:solidFill>
+              </a:defRPr>
+            </a:pPr>
+            <a:r>
+              <a:t>• 24/7 support</a:t>
+            </a:r>
+          </a:p>
+        </p:txBody>
+      </p:sp>
+      <p:sp>
+        <p:nvSpPr>
+          <p:cNvPr id="20" name="Rounded Rectangle 19"/>
+          <p:cNvSpPr/>
+          <p:nvPr/>
+        </p:nvSpPr>
+        <p:spPr>
+          <a:xfrm>
+            <a:off x="5431536" y="1920240"/>
+            <a:ext cx="1719072" cy="1371600"/>
+          </a:xfrm>
+          <a:prstGeom prst="roundRect">
+            <a:avLst/>
+          </a:prstGeom>
+          <a:solidFill>
+            <a:srgbClr val="FFF9E6"/>
+          </a:solidFill>
+          <a:ln w="6350">
+            <a:solidFill>
+              <a:srgbClr val="C8C8C8"/>
+            </a:solidFill>
+          </a:ln>
+        </p:spPr>
+        <p:style>
+          <a:lnRef idx="1">
+            <a:schemeClr val="accent1"/>
+          </a:lnRef>
+          <a:fillRef idx="3">
+            <a:schemeClr val="accent1"/>
+          </a:fillRef>
+          <a:effectRef idx="2">
+            <a:schemeClr val="accent1"/>
+          </a:effectRef>
+          <a:fontRef idx="minor">
+            <a:schemeClr val="lt1"/>
+          </a:fontRef>
+        </p:style>
+        <p:txBody>
+          <a:bodyPr rtlCol="0" anchor="ctr"/>
+          <a:lstStyle/>
+          <a:p>
+            <a:pPr algn="ctr"/>
+          </a:p>
+        </p:txBody>
+      </p:sp>
+      <p:sp>
+        <p:nvSpPr>
+          <p:cNvPr id="21" name="TextBox 20"/>
+          <p:cNvSpPr txBox="1"/>
+          <p:nvPr/>
+        </p:nvSpPr>
+        <p:spPr>
+          <a:xfrm>
+            <a:off x="5504688" y="1965960"/>
+            <a:ext cx="1581912" cy="228600"/>
+          </a:xfrm>
+          <a:prstGeom prst="rect">
+            <a:avLst/>
+          </a:prstGeom>
+          <a:noFill/>
+        </p:spPr>
+        <p:txBody>
+          <a:bodyPr wrap="square">
+            <a:spAutoFit/>
+          </a:bodyPr>
+          <a:lstStyle/>
+          <a:p>
+            <a:pPr>
+              <a:defRPr sz="800" b="1">
+                <a:solidFill>
+                  <a:srgbClr val="003366"/>
+                </a:solidFill>
+              </a:defRPr>
+            </a:pPr>
+            <a:r>
+              <a:t>CHANNELS</a:t>
+            </a:r>
+          </a:p>
+        </p:txBody>
+      </p:sp>
+      <p:sp>
+        <p:nvSpPr>
+          <p:cNvPr id="22" name="TextBox 21"/>
+          <p:cNvSpPr txBox="1"/>
+          <p:nvPr/>
+        </p:nvSpPr>
+        <p:spPr>
+          <a:xfrm>
+            <a:off x="5504688" y="2176272"/>
+            <a:ext cx="1581912" cy="1051560"/>
+          </a:xfrm>
+          <a:prstGeom prst="rect">
+            <a:avLst/>
+          </a:prstGeom>
+          <a:noFill/>
+        </p:spPr>
+        <p:txBody>
+          <a:bodyPr wrap="square">
+            <a:spAutoFit/>
+          </a:bodyPr>
+          <a:lstStyle/>
+          <a:p>
+            <a:pPr>
+              <a:spcAft>
+                <a:spcPts val="100"/>
+              </a:spcAft>
+              <a:defRPr sz="600">
+                <a:solidFill>
+                  <a:srgbClr val="323232"/>
+                </a:solidFill>
+              </a:defRPr>
+            </a:pPr>
+            <a:r>
+              <a:t>Acquisition:</a:t>
+            </a:r>
+          </a:p>
+          <a:p>
+            <a:pPr>
+              <a:spcAft>
+                <a:spcPts val="100"/>
+              </a:spcAft>
+              <a:defRPr sz="600">
+                <a:solidFill>
+                  <a:srgbClr val="323232"/>
+                </a:solidFill>
+              </a:defRPr>
+            </a:pPr>
+            <a:r>
+              <a:t>• Direct enterprise sales</a:t>
+            </a:r>
+          </a:p>
+          <a:p>
+            <a:pPr>
+              <a:spcAft>
+                <a:spcPts val="100"/>
+              </a:spcAft>
+              <a:defRPr sz="600">
+                <a:solidFill>
+                  <a:srgbClr val="323232"/>
+                </a:solidFill>
+              </a:defRPr>
+            </a:pPr>
+            <a:r>
+              <a:t>• Industry conferences</a:t>
+            </a:r>
+          </a:p>
+          <a:p>
+            <a:pPr>
+              <a:spcAft>
+                <a:spcPts val="100"/>
+              </a:spcAft>
+              <a:defRPr sz="600">
+                <a:solidFill>
+                  <a:srgbClr val="323232"/>
+                </a:solidFill>
+              </a:defRPr>
+            </a:pPr>
+          </a:p>
+          <a:p>
+            <a:pPr>
+              <a:spcAft>
+                <a:spcPts val="100"/>
+              </a:spcAft>
+              <a:defRPr sz="600">
+                <a:solidFill>
+                  <a:srgbClr val="323232"/>
+                </a:solidFill>
+              </a:defRPr>
+            </a:pPr>
+            <a:r>
+              <a:t>Delivery:</a:t>
+            </a:r>
+          </a:p>
+          <a:p>
+            <a:pPr>
+              <a:spcAft>
+                <a:spcPts val="100"/>
+              </a:spcAft>
+              <a:defRPr sz="600">
+                <a:solidFill>
+                  <a:srgbClr val="323232"/>
+                </a:solidFill>
+              </a:defRPr>
+            </a:pPr>
+            <a:r>
+              <a:t>• Fleet dashboard</a:t>
+            </a:r>
+          </a:p>
+          <a:p>
+            <a:pPr>
+              <a:spcAft>
+                <a:spcPts val="100"/>
+              </a:spcAft>
+              <a:defRPr sz="600">
+                <a:solidFill>
+                  <a:srgbClr val="323232"/>
+                </a:solidFill>
+              </a:defRPr>
+            </a:pPr>
+            <a:r>
+              <a:t>• API integration</a:t>
+            </a:r>
+          </a:p>
+          <a:p>
+            <a:pPr>
+              <a:spcAft>
+                <a:spcPts val="100"/>
+              </a:spcAft>
+              <a:defRPr sz="600">
+                <a:solidFill>
+                  <a:srgbClr val="323232"/>
+                </a:solidFill>
+              </a:defRPr>
+            </a:pPr>
+            <a:r>
+              <a:t>• Mobile dispatch</a:t>
+            </a:r>
+          </a:p>
+        </p:txBody>
+      </p:sp>
+      <p:sp>
+        <p:nvSpPr>
+          <p:cNvPr id="23" name="Rounded Rectangle 22"/>
+          <p:cNvSpPr/>
+          <p:nvPr/>
+        </p:nvSpPr>
+        <p:spPr>
+          <a:xfrm>
+            <a:off x="7196328" y="502920"/>
+            <a:ext cx="1719072" cy="2788920"/>
+          </a:xfrm>
+          <a:prstGeom prst="roundRect">
+            <a:avLst/>
+          </a:prstGeom>
+          <a:solidFill>
+            <a:srgbClr val="FFF9E6"/>
+          </a:solidFill>
+          <a:ln w="6350">
+            <a:solidFill>
+              <a:srgbClr val="C8C8C8"/>
+            </a:solidFill>
+          </a:ln>
+        </p:spPr>
+        <p:style>
+          <a:lnRef idx="1">
+            <a:schemeClr val="accent1"/>
+          </a:lnRef>
+          <a:fillRef idx="3">
+            <a:schemeClr val="accent1"/>
+          </a:fillRef>
+          <a:effectRef idx="2">
+            <a:schemeClr val="accent1"/>
+          </a:effectRef>
+          <a:fontRef idx="minor">
+            <a:schemeClr val="lt1"/>
+          </a:fontRef>
+        </p:style>
+        <p:txBody>
+          <a:bodyPr rtlCol="0" anchor="ctr"/>
+          <a:lstStyle/>
+          <a:p>
+            <a:pPr algn="ctr"/>
+          </a:p>
+        </p:txBody>
+      </p:sp>
+      <p:sp>
+        <p:nvSpPr>
+          <p:cNvPr id="24" name="TextBox 23"/>
+          <p:cNvSpPr txBox="1"/>
+          <p:nvPr/>
+        </p:nvSpPr>
+        <p:spPr>
+          <a:xfrm>
+            <a:off x="7269480" y="548640"/>
+            <a:ext cx="1581912" cy="228600"/>
+          </a:xfrm>
+          <a:prstGeom prst="rect">
+            <a:avLst/>
+          </a:prstGeom>
+          <a:noFill/>
+        </p:spPr>
+        <p:txBody>
+          <a:bodyPr wrap="square">
+            <a:spAutoFit/>
+          </a:bodyPr>
+          <a:lstStyle/>
+          <a:p>
+            <a:pPr>
+              <a:defRPr sz="800" b="1">
+                <a:solidFill>
+                  <a:srgbClr val="003366"/>
+                </a:solidFill>
+              </a:defRPr>
+            </a:pPr>
+            <a:r>
+              <a:t>CUSTOMER SEGMENTS</a:t>
+            </a:r>
+          </a:p>
+        </p:txBody>
+      </p:sp>
+      <p:sp>
+        <p:nvSpPr>
+          <p:cNvPr id="25" name="TextBox 24"/>
+          <p:cNvSpPr txBox="1"/>
+          <p:nvPr/>
+        </p:nvSpPr>
+        <p:spPr>
+          <a:xfrm>
+            <a:off x="7269480" y="758952"/>
+            <a:ext cx="1581912" cy="2468880"/>
+          </a:xfrm>
+          <a:prstGeom prst="rect">
+            <a:avLst/>
+          </a:prstGeom>
+          <a:noFill/>
+        </p:spPr>
+        <p:txBody>
+          <a:bodyPr wrap="square">
+            <a:spAutoFit/>
+          </a:bodyPr>
+          <a:lstStyle/>
+          <a:p>
+            <a:pPr>
+              <a:spcAft>
+                <a:spcPts val="100"/>
+              </a:spcAft>
+              <a:defRPr sz="600">
+                <a:solidFill>
+                  <a:srgbClr val="323232"/>
+                </a:solidFill>
+              </a:defRPr>
+            </a:pPr>
+            <a:r>
+              <a:t>Primary:</a:t>
+            </a:r>
+          </a:p>
+          <a:p>
+            <a:pPr>
+              <a:spcAft>
+                <a:spcPts val="100"/>
+              </a:spcAft>
+              <a:defRPr sz="600">
+                <a:solidFill>
+                  <a:srgbClr val="323232"/>
+                </a:solidFill>
+              </a:defRPr>
+            </a:pPr>
+            <a:r>
+              <a:t>• Waymo (2,500+ vehicles)</a:t>
+            </a:r>
+          </a:p>
+          <a:p>
+            <a:pPr>
+              <a:spcAft>
+                <a:spcPts val="100"/>
+              </a:spcAft>
+              <a:defRPr sz="600">
+                <a:solidFill>
+                  <a:srgbClr val="323232"/>
+                </a:solidFill>
+              </a:defRPr>
+            </a:pPr>
+            <a:r>
+              <a:t>• Cruise (rebuilding)</a:t>
+            </a:r>
+          </a:p>
+          <a:p>
+            <a:pPr>
+              <a:spcAft>
+                <a:spcPts val="100"/>
+              </a:spcAft>
+              <a:defRPr sz="600">
+                <a:solidFill>
+                  <a:srgbClr val="323232"/>
+                </a:solidFill>
+              </a:defRPr>
+            </a:pPr>
+            <a:r>
+              <a:t>• Zoox (Amazon)</a:t>
+            </a:r>
+          </a:p>
+          <a:p>
+            <a:pPr>
+              <a:spcAft>
+                <a:spcPts val="100"/>
+              </a:spcAft>
+              <a:defRPr sz="600">
+                <a:solidFill>
+                  <a:srgbClr val="323232"/>
+                </a:solidFill>
+              </a:defRPr>
+            </a:pPr>
+            <a:r>
+              <a:t>• Tesla Robotaxi</a:t>
+            </a:r>
+          </a:p>
+          <a:p>
+            <a:pPr>
+              <a:spcAft>
+                <a:spcPts val="100"/>
+              </a:spcAft>
+              <a:defRPr sz="600">
+                <a:solidFill>
+                  <a:srgbClr val="323232"/>
+                </a:solidFill>
+              </a:defRPr>
+            </a:pPr>
+          </a:p>
+          <a:p>
+            <a:pPr>
+              <a:spcAft>
+                <a:spcPts val="100"/>
+              </a:spcAft>
+              <a:defRPr sz="600">
+                <a:solidFill>
+                  <a:srgbClr val="323232"/>
+                </a:solidFill>
+              </a:defRPr>
+            </a:pPr>
+            <a:r>
+              <a:t>Secondary:</a:t>
+            </a:r>
+          </a:p>
+          <a:p>
+            <a:pPr>
+              <a:spcAft>
+                <a:spcPts val="100"/>
+              </a:spcAft>
+              <a:defRPr sz="600">
+                <a:solidFill>
+                  <a:srgbClr val="323232"/>
+                </a:solidFill>
+              </a:defRPr>
+            </a:pPr>
+            <a:r>
+              <a:t>• Amazon Delivery EVs</a:t>
+            </a:r>
+          </a:p>
+          <a:p>
+            <a:pPr>
+              <a:spcAft>
+                <a:spcPts val="100"/>
+              </a:spcAft>
+              <a:defRPr sz="600">
+                <a:solidFill>
+                  <a:srgbClr val="323232"/>
+                </a:solidFill>
+              </a:defRPr>
+            </a:pPr>
+            <a:r>
+              <a:t>• FedEx/UPS electric</a:t>
+            </a:r>
+          </a:p>
+          <a:p>
+            <a:pPr>
+              <a:spcAft>
+                <a:spcPts val="100"/>
+              </a:spcAft>
+              <a:defRPr sz="600">
+                <a:solidFill>
+                  <a:srgbClr val="323232"/>
+                </a:solidFill>
+              </a:defRPr>
+            </a:pPr>
+          </a:p>
+          <a:p>
+            <a:pPr>
+              <a:spcAft>
+                <a:spcPts val="100"/>
+              </a:spcAft>
+              <a:defRPr sz="600">
+                <a:solidFill>
+                  <a:srgbClr val="323232"/>
+                </a:solidFill>
+              </a:defRPr>
+            </a:pPr>
+            <a:r>
+              <a:t>Buyers:</a:t>
+            </a:r>
+          </a:p>
+          <a:p>
+            <a:pPr>
+              <a:spcAft>
+                <a:spcPts val="100"/>
+              </a:spcAft>
+              <a:defRPr sz="600">
+                <a:solidFill>
+                  <a:srgbClr val="323232"/>
+                </a:solidFill>
+              </a:defRPr>
+            </a:pPr>
+            <a:r>
+              <a:t>• VP of Operations</a:t>
+            </a:r>
+          </a:p>
+          <a:p>
+            <a:pPr>
+              <a:spcAft>
+                <a:spcPts val="100"/>
+              </a:spcAft>
+              <a:defRPr sz="600">
+                <a:solidFill>
+                  <a:srgbClr val="323232"/>
+                </a:solidFill>
+              </a:defRPr>
+            </a:pPr>
+            <a:r>
+              <a:t>• Fleet Ops Manager</a:t>
+            </a:r>
+          </a:p>
+        </p:txBody>
+      </p:sp>
+      <p:sp>
+        <p:nvSpPr>
+          <p:cNvPr id="26" name="Rounded Rectangle 25"/>
+          <p:cNvSpPr/>
+          <p:nvPr/>
+        </p:nvSpPr>
+        <p:spPr>
+          <a:xfrm>
+            <a:off x="137160" y="3337560"/>
+            <a:ext cx="3483864" cy="914400"/>
+          </a:xfrm>
+          <a:prstGeom prst="roundRect">
+            <a:avLst/>
+          </a:prstGeom>
+          <a:solidFill>
+            <a:srgbClr val="F0F0F0"/>
+          </a:solidFill>
+          <a:ln w="6350">
+            <a:solidFill>
+              <a:srgbClr val="C8C8C8"/>
+            </a:solidFill>
+          </a:ln>
+        </p:spPr>
+        <p:style>
+          <a:lnRef idx="1">
+            <a:schemeClr val="accent1"/>
+          </a:lnRef>
+          <a:fillRef idx="3">
+            <a:schemeClr val="accent1"/>
+          </a:fillRef>
+          <a:effectRef idx="2">
+            <a:schemeClr val="accent1"/>
+          </a:effectRef>
+          <a:fontRef idx="minor">
+            <a:schemeClr val="lt1"/>
+          </a:fontRef>
+        </p:style>
+        <p:txBody>
+          <a:bodyPr rtlCol="0" anchor="ctr"/>
+          <a:lstStyle/>
+          <a:p>
+            <a:pPr algn="ctr"/>
+          </a:p>
+        </p:txBody>
+      </p:sp>
+      <p:sp>
+        <p:nvSpPr>
+          <p:cNvPr id="27" name="TextBox 26"/>
+          <p:cNvSpPr txBox="1"/>
+          <p:nvPr/>
+        </p:nvSpPr>
+        <p:spPr>
+          <a:xfrm>
+            <a:off x="210312" y="3383280"/>
+            <a:ext cx="3346704" cy="228600"/>
+          </a:xfrm>
+          <a:prstGeom prst="rect">
+            <a:avLst/>
+          </a:prstGeom>
+          <a:noFill/>
+        </p:spPr>
+        <p:txBody>
+          <a:bodyPr wrap="square">
+            <a:spAutoFit/>
+          </a:bodyPr>
+          <a:lstStyle/>
+          <a:p>
+            <a:pPr>
+              <a:defRPr sz="800" b="1">
+                <a:solidFill>
+                  <a:srgbClr val="003366"/>
+                </a:solidFill>
+              </a:defRPr>
+            </a:pPr>
+            <a:r>
+              <a:t>COST STRUCTURE</a:t>
+            </a:r>
+          </a:p>
+        </p:txBody>
+      </p:sp>
+      <p:sp>
+        <p:nvSpPr>
+          <p:cNvPr id="28" name="TextBox 27"/>
+          <p:cNvSpPr txBox="1"/>
+          <p:nvPr/>
+        </p:nvSpPr>
+        <p:spPr>
+          <a:xfrm>
+            <a:off x="210312" y="3593592"/>
+            <a:ext cx="3346704" cy="594360"/>
+          </a:xfrm>
+          <a:prstGeom prst="rect">
+            <a:avLst/>
+          </a:prstGeom>
+          <a:noFill/>
+        </p:spPr>
+        <p:txBody>
+          <a:bodyPr wrap="square">
+            <a:spAutoFit/>
+          </a:bodyPr>
+          <a:lstStyle/>
+          <a:p>
+            <a:pPr>
+              <a:spcAft>
+                <a:spcPts val="100"/>
+              </a:spcAft>
+              <a:defRPr sz="600">
+                <a:solidFill>
+                  <a:srgbClr val="323232"/>
+                </a:solidFill>
+              </a:defRPr>
+            </a:pPr>
+            <a:r>
+              <a:t>Variable: Tech payouts (65-70%), Payment processing (2-3%)</a:t>
+            </a:r>
+          </a:p>
+          <a:p>
+            <a:pPr>
+              <a:spcAft>
+                <a:spcPts val="100"/>
+              </a:spcAft>
+              <a:defRPr sz="600">
+                <a:solidFill>
+                  <a:srgbClr val="323232"/>
+                </a:solidFill>
+              </a:defRPr>
+            </a:pPr>
+            <a:r>
+              <a:t>Fixed: Platform ($15-20K/mo), Team ($40-60K/mo), Marketing ($10-15K/mo)</a:t>
+            </a:r>
+          </a:p>
+          <a:p>
+            <a:pPr>
+              <a:spcAft>
+                <a:spcPts val="100"/>
+              </a:spcAft>
+              <a:defRPr sz="600">
+                <a:solidFill>
+                  <a:srgbClr val="323232"/>
+                </a:solidFill>
+              </a:defRPr>
+            </a:pPr>
+            <a:r>
+              <a:t>Seed: $1.5M total</a:t>
+            </a:r>
+          </a:p>
+        </p:txBody>
+      </p:sp>
+      <p:sp>
+        <p:nvSpPr>
+          <p:cNvPr id="29" name="Rounded Rectangle 28"/>
+          <p:cNvSpPr/>
+          <p:nvPr/>
+        </p:nvSpPr>
+        <p:spPr>
+          <a:xfrm>
+            <a:off x="3666744" y="3337560"/>
+            <a:ext cx="5248656" cy="914400"/>
+          </a:xfrm>
+          <a:prstGeom prst="roundRect">
+            <a:avLst/>
+          </a:prstGeom>
+          <a:solidFill>
+            <a:srgbClr val="DBEAFE"/>
+          </a:solidFill>
+          <a:ln w="6350">
+            <a:solidFill>
+              <a:srgbClr val="C8C8C8"/>
+            </a:solidFill>
+          </a:ln>
+        </p:spPr>
+        <p:style>
+          <a:lnRef idx="1">
+            <a:schemeClr val="accent1"/>
+          </a:lnRef>
+          <a:fillRef idx="3">
+            <a:schemeClr val="accent1"/>
+          </a:fillRef>
+          <a:effectRef idx="2">
+            <a:schemeClr val="accent1"/>
+          </a:effectRef>
+          <a:fontRef idx="minor">
+            <a:schemeClr val="lt1"/>
+          </a:fontRef>
+        </p:style>
+        <p:txBody>
+          <a:bodyPr rtlCol="0" anchor="ctr"/>
+          <a:lstStyle/>
+          <a:p>
+            <a:pPr algn="ctr"/>
+          </a:p>
+        </p:txBody>
+      </p:sp>
+      <p:sp>
+        <p:nvSpPr>
+          <p:cNvPr id="30" name="TextBox 29"/>
+          <p:cNvSpPr txBox="1"/>
+          <p:nvPr/>
+        </p:nvSpPr>
+        <p:spPr>
+          <a:xfrm>
+            <a:off x="3739896" y="3383280"/>
+            <a:ext cx="5111496" cy="228600"/>
+          </a:xfrm>
+          <a:prstGeom prst="rect">
+            <a:avLst/>
+          </a:prstGeom>
+          <a:noFill/>
+        </p:spPr>
+        <p:txBody>
+          <a:bodyPr wrap="square">
+            <a:spAutoFit/>
+          </a:bodyPr>
+          <a:lstStyle/>
+          <a:p>
+            <a:pPr>
+              <a:defRPr sz="800" b="1">
+                <a:solidFill>
+                  <a:srgbClr val="003366"/>
+                </a:solidFill>
+              </a:defRPr>
+            </a:pPr>
+            <a:r>
+              <a:t>REVENUE STREAMS</a:t>
+            </a:r>
+          </a:p>
+        </p:txBody>
+      </p:sp>
+      <p:sp>
+        <p:nvSpPr>
+          <p:cNvPr id="31" name="TextBox 30"/>
+          <p:cNvSpPr txBox="1"/>
+          <p:nvPr/>
+        </p:nvSpPr>
+        <p:spPr>
+          <a:xfrm>
+            <a:off x="3739896" y="3593592"/>
+            <a:ext cx="5111496" cy="594360"/>
+          </a:xfrm>
+          <a:prstGeom prst="rect">
+            <a:avLst/>
+          </a:prstGeom>
+          <a:noFill/>
+        </p:spPr>
+        <p:txBody>
+          <a:bodyPr wrap="square">
+            <a:spAutoFit/>
+          </a:bodyPr>
+          <a:lstStyle/>
+          <a:p>
+            <a:pPr>
+              <a:spcAft>
+                <a:spcPts val="100"/>
+              </a:spcAft>
+              <a:defRPr sz="600">
+                <a:solidFill>
+                  <a:srgbClr val="323232"/>
+                </a:solidFill>
+              </a:defRPr>
+            </a:pPr>
+            <a:r>
+              <a:t>Services: Quick ($12-18) | Deep ($45-75) | Emergency ($75-150)</a:t>
+            </a:r>
+          </a:p>
+          <a:p>
+            <a:pPr>
+              <a:spcAft>
+                <a:spcPts val="100"/>
+              </a:spcAft>
+              <a:defRPr sz="600">
+                <a:solidFill>
+                  <a:srgbClr val="323232"/>
+                </a:solidFill>
+              </a:defRPr>
+            </a:pPr>
+            <a:r>
+              <a:t>Unit Economics: Avg $15/service, 30% margin ($4-5), Target 10K/day</a:t>
+            </a:r>
+          </a:p>
+          <a:p>
+            <a:pPr>
+              <a:spcAft>
+                <a:spcPts val="100"/>
+              </a:spcAft>
+              <a:defRPr sz="600">
+                <a:solidFill>
+                  <a:srgbClr val="323232"/>
+                </a:solidFill>
+              </a:defRPr>
+            </a:pPr>
+            <a:r>
+              <a:t>Projections: Y1 $1.2M → Y2 $5.5M → Y3 $15M | TAM 2032: $5.5B</a:t>
             </a:r>
           </a:p>
         </p:txBody>
@@ -8500,2120 +10225,6 @@
             <a:br/>
             <a:r>
               <a:t>tidytails.github.io/motra-landing</a:t>
-            </a:r>
-          </a:p>
-        </p:txBody>
-      </p:sp>
-    </p:spTree>
-  </p:cSld>
-  <p:clrMapOvr>
-    <a:masterClrMapping/>
-  </p:clrMapOvr>
-</p:sld>
-</file>
-
-<file path=ppt/slides/slide24.xml><?xml version="1.0" encoding="utf-8"?>
-<p:sld xmlns:a="http://schemas.openxmlformats.org/drawingml/2006/main" xmlns:p="http://schemas.openxmlformats.org/presentationml/2006/main" xmlns:r="http://schemas.openxmlformats.org/officeDocument/2006/relationships">
-  <p:cSld>
-    <p:spTree>
-      <p:nvGrpSpPr>
-        <p:cNvPr id="1" name=""/>
-        <p:cNvGrpSpPr/>
-        <p:nvPr/>
-      </p:nvGrpSpPr>
-      <p:grpSpPr/>
-      <p:sp>
-        <p:nvSpPr>
-          <p:cNvPr id="2" name="Rectangle 1"/>
-          <p:cNvSpPr/>
-          <p:nvPr/>
-        </p:nvSpPr>
-        <p:spPr>
-          <a:xfrm>
-            <a:off x="0" y="0"/>
-            <a:ext cx="9144000" cy="457200"/>
-          </a:xfrm>
-          <a:prstGeom prst="rect">
-            <a:avLst/>
-          </a:prstGeom>
-          <a:solidFill>
-            <a:srgbClr val="003366"/>
-          </a:solidFill>
-          <a:ln>
-            <a:noFill/>
-          </a:ln>
-        </p:spPr>
-        <p:style>
-          <a:lnRef idx="1">
-            <a:schemeClr val="accent1"/>
-          </a:lnRef>
-          <a:fillRef idx="3">
-            <a:schemeClr val="accent1"/>
-          </a:fillRef>
-          <a:effectRef idx="2">
-            <a:schemeClr val="accent1"/>
-          </a:effectRef>
-          <a:fontRef idx="minor">
-            <a:schemeClr val="lt1"/>
-          </a:fontRef>
-        </p:style>
-        <p:txBody>
-          <a:bodyPr rtlCol="0" anchor="ctr"/>
-          <a:lstStyle/>
-          <a:p>
-            <a:pPr algn="ctr"/>
-          </a:p>
-        </p:txBody>
-      </p:sp>
-      <p:sp>
-        <p:nvSpPr>
-          <p:cNvPr id="3" name="TextBox 2"/>
-          <p:cNvSpPr txBox="1"/>
-          <p:nvPr/>
-        </p:nvSpPr>
-        <p:spPr>
-          <a:xfrm>
-            <a:off x="137160" y="91440"/>
-            <a:ext cx="365760" cy="274320"/>
-          </a:xfrm>
-          <a:prstGeom prst="rect">
-            <a:avLst/>
-          </a:prstGeom>
-          <a:noFill/>
-        </p:spPr>
-        <p:txBody>
-          <a:bodyPr wrap="none">
-            <a:spAutoFit/>
-          </a:bodyPr>
-          <a:lstStyle/>
-          <a:p>
-            <a:pPr>
-              <a:defRPr sz="1200" b="1">
-                <a:solidFill>
-                  <a:srgbClr val="FFFFFF"/>
-                </a:solidFill>
-              </a:defRPr>
-            </a:pPr>
-            <a:r>
-              <a:t>11</a:t>
-            </a:r>
-          </a:p>
-        </p:txBody>
-      </p:sp>
-      <p:sp>
-        <p:nvSpPr>
-          <p:cNvPr id="4" name="TextBox 3"/>
-          <p:cNvSpPr txBox="1"/>
-          <p:nvPr/>
-        </p:nvSpPr>
-        <p:spPr>
-          <a:xfrm>
-            <a:off x="457200" y="91440"/>
-            <a:ext cx="7315200" cy="274320"/>
-          </a:xfrm>
-          <a:prstGeom prst="rect">
-            <a:avLst/>
-          </a:prstGeom>
-          <a:noFill/>
-        </p:spPr>
-        <p:txBody>
-          <a:bodyPr wrap="none">
-            <a:spAutoFit/>
-          </a:bodyPr>
-          <a:lstStyle/>
-          <a:p>
-            <a:pPr>
-              <a:defRPr sz="1800" b="1">
-                <a:solidFill>
-                  <a:srgbClr val="FFFFFF"/>
-                </a:solidFill>
-              </a:defRPr>
-            </a:pPr>
-            <a:r>
-              <a:t>BUSINESS MODEL CANVAS</a:t>
-            </a:r>
-          </a:p>
-        </p:txBody>
-      </p:sp>
-      <p:sp>
-        <p:nvSpPr>
-          <p:cNvPr id="5" name="Rounded Rectangle 4"/>
-          <p:cNvSpPr/>
-          <p:nvPr/>
-        </p:nvSpPr>
-        <p:spPr>
-          <a:xfrm>
-            <a:off x="137160" y="502920"/>
-            <a:ext cx="1719072" cy="2788920"/>
-          </a:xfrm>
-          <a:prstGeom prst="roundRect">
-            <a:avLst/>
-          </a:prstGeom>
-          <a:solidFill>
-            <a:srgbClr val="E8E4F0"/>
-          </a:solidFill>
-          <a:ln w="6350">
-            <a:solidFill>
-              <a:srgbClr val="C8C8C8"/>
-            </a:solidFill>
-          </a:ln>
-        </p:spPr>
-        <p:style>
-          <a:lnRef idx="1">
-            <a:schemeClr val="accent1"/>
-          </a:lnRef>
-          <a:fillRef idx="3">
-            <a:schemeClr val="accent1"/>
-          </a:fillRef>
-          <a:effectRef idx="2">
-            <a:schemeClr val="accent1"/>
-          </a:effectRef>
-          <a:fontRef idx="minor">
-            <a:schemeClr val="lt1"/>
-          </a:fontRef>
-        </p:style>
-        <p:txBody>
-          <a:bodyPr rtlCol="0" anchor="ctr"/>
-          <a:lstStyle/>
-          <a:p>
-            <a:pPr algn="ctr"/>
-          </a:p>
-        </p:txBody>
-      </p:sp>
-      <p:sp>
-        <p:nvSpPr>
-          <p:cNvPr id="6" name="TextBox 5"/>
-          <p:cNvSpPr txBox="1"/>
-          <p:nvPr/>
-        </p:nvSpPr>
-        <p:spPr>
-          <a:xfrm>
-            <a:off x="210312" y="548640"/>
-            <a:ext cx="1581912" cy="228600"/>
-          </a:xfrm>
-          <a:prstGeom prst="rect">
-            <a:avLst/>
-          </a:prstGeom>
-          <a:noFill/>
-        </p:spPr>
-        <p:txBody>
-          <a:bodyPr wrap="square">
-            <a:spAutoFit/>
-          </a:bodyPr>
-          <a:lstStyle/>
-          <a:p>
-            <a:pPr>
-              <a:defRPr sz="800" b="1">
-                <a:solidFill>
-                  <a:srgbClr val="003366"/>
-                </a:solidFill>
-              </a:defRPr>
-            </a:pPr>
-            <a:r>
-              <a:t>KEY PARTNERS</a:t>
-            </a:r>
-          </a:p>
-        </p:txBody>
-      </p:sp>
-      <p:sp>
-        <p:nvSpPr>
-          <p:cNvPr id="7" name="TextBox 6"/>
-          <p:cNvSpPr txBox="1"/>
-          <p:nvPr/>
-        </p:nvSpPr>
-        <p:spPr>
-          <a:xfrm>
-            <a:off x="210312" y="758952"/>
-            <a:ext cx="1581912" cy="2468880"/>
-          </a:xfrm>
-          <a:prstGeom prst="rect">
-            <a:avLst/>
-          </a:prstGeom>
-          <a:noFill/>
-        </p:spPr>
-        <p:txBody>
-          <a:bodyPr wrap="square">
-            <a:spAutoFit/>
-          </a:bodyPr>
-          <a:lstStyle/>
-          <a:p>
-            <a:pPr>
-              <a:spcAft>
-                <a:spcPts val="100"/>
-              </a:spcAft>
-              <a:defRPr sz="600">
-                <a:solidFill>
-                  <a:srgbClr val="323232"/>
-                </a:solidFill>
-              </a:defRPr>
-            </a:pPr>
-            <a:r>
-              <a:t>AV Ecosystem:</a:t>
-            </a:r>
-          </a:p>
-          <a:p>
-            <a:pPr>
-              <a:spcAft>
-                <a:spcPts val="100"/>
-              </a:spcAft>
-              <a:defRPr sz="600">
-                <a:solidFill>
-                  <a:srgbClr val="323232"/>
-                </a:solidFill>
-              </a:defRPr>
-            </a:pPr>
-            <a:r>
-              <a:t>• Waymo, Cruise, Zoox, Tesla</a:t>
-            </a:r>
-          </a:p>
-          <a:p>
-            <a:pPr>
-              <a:spcAft>
-                <a:spcPts val="100"/>
-              </a:spcAft>
-              <a:defRPr sz="600">
-                <a:solidFill>
-                  <a:srgbClr val="323232"/>
-                </a:solidFill>
-              </a:defRPr>
-            </a:pPr>
-            <a:r>
-              <a:t>• Fleet mgmt software</a:t>
-            </a:r>
-          </a:p>
-          <a:p>
-            <a:pPr>
-              <a:spcAft>
-                <a:spcPts val="100"/>
-              </a:spcAft>
-              <a:defRPr sz="600">
-                <a:solidFill>
-                  <a:srgbClr val="323232"/>
-                </a:solidFill>
-              </a:defRPr>
-            </a:pPr>
-          </a:p>
-          <a:p>
-            <a:pPr>
-              <a:spcAft>
-                <a:spcPts val="100"/>
-              </a:spcAft>
-              <a:defRPr sz="600">
-                <a:solidFill>
-                  <a:srgbClr val="323232"/>
-                </a:solidFill>
-              </a:defRPr>
-            </a:pPr>
-            <a:r>
-              <a:t>Gig Economy:</a:t>
-            </a:r>
-          </a:p>
-          <a:p>
-            <a:pPr>
-              <a:spcAft>
-                <a:spcPts val="100"/>
-              </a:spcAft>
-              <a:defRPr sz="600">
-                <a:solidFill>
-                  <a:srgbClr val="323232"/>
-                </a:solidFill>
-              </a:defRPr>
-            </a:pPr>
-            <a:r>
-              <a:t>• Existing gig platforms</a:t>
-            </a:r>
-          </a:p>
-          <a:p>
-            <a:pPr>
-              <a:spcAft>
-                <a:spcPts val="100"/>
-              </a:spcAft>
-              <a:defRPr sz="600">
-                <a:solidFill>
-                  <a:srgbClr val="323232"/>
-                </a:solidFill>
-              </a:defRPr>
-            </a:pPr>
-            <a:r>
-              <a:t>• Training providers</a:t>
-            </a:r>
-          </a:p>
-          <a:p>
-            <a:pPr>
-              <a:spcAft>
-                <a:spcPts val="100"/>
-              </a:spcAft>
-              <a:defRPr sz="600">
-                <a:solidFill>
-                  <a:srgbClr val="323232"/>
-                </a:solidFill>
-              </a:defRPr>
-            </a:pPr>
-            <a:r>
-              <a:t>• Equipment suppliers</a:t>
-            </a:r>
-          </a:p>
-          <a:p>
-            <a:pPr>
-              <a:spcAft>
-                <a:spcPts val="100"/>
-              </a:spcAft>
-              <a:defRPr sz="600">
-                <a:solidFill>
-                  <a:srgbClr val="323232"/>
-                </a:solidFill>
-              </a:defRPr>
-            </a:pPr>
-          </a:p>
-          <a:p>
-            <a:pPr>
-              <a:spcAft>
-                <a:spcPts val="100"/>
-              </a:spcAft>
-              <a:defRPr sz="600">
-                <a:solidFill>
-                  <a:srgbClr val="323232"/>
-                </a:solidFill>
-              </a:defRPr>
-            </a:pPr>
-            <a:r>
-              <a:t>Supporting:</a:t>
-            </a:r>
-          </a:p>
-          <a:p>
-            <a:pPr>
-              <a:spcAft>
-                <a:spcPts val="100"/>
-              </a:spcAft>
-              <a:defRPr sz="600">
-                <a:solidFill>
-                  <a:srgbClr val="323232"/>
-                </a:solidFill>
-              </a:defRPr>
-            </a:pPr>
-            <a:r>
-              <a:t>• Insurance providers</a:t>
-            </a:r>
-          </a:p>
-          <a:p>
-            <a:pPr>
-              <a:spcAft>
-                <a:spcPts val="100"/>
-              </a:spcAft>
-              <a:defRPr sz="600">
-                <a:solidFill>
-                  <a:srgbClr val="323232"/>
-                </a:solidFill>
-              </a:defRPr>
-            </a:pPr>
-            <a:r>
-              <a:t>• Background checks</a:t>
-            </a:r>
-          </a:p>
-          <a:p>
-            <a:pPr>
-              <a:spcAft>
-                <a:spcPts val="100"/>
-              </a:spcAft>
-              <a:defRPr sz="600">
-                <a:solidFill>
-                  <a:srgbClr val="323232"/>
-                </a:solidFill>
-              </a:defRPr>
-            </a:pPr>
-            <a:r>
-              <a:t>• Payment processing</a:t>
-            </a:r>
-          </a:p>
-        </p:txBody>
-      </p:sp>
-      <p:sp>
-        <p:nvSpPr>
-          <p:cNvPr id="8" name="Rounded Rectangle 7"/>
-          <p:cNvSpPr/>
-          <p:nvPr/>
-        </p:nvSpPr>
-        <p:spPr>
-          <a:xfrm>
-            <a:off x="1901952" y="502920"/>
-            <a:ext cx="1719072" cy="1371600"/>
-          </a:xfrm>
-          <a:prstGeom prst="roundRect">
-            <a:avLst/>
-          </a:prstGeom>
-          <a:solidFill>
-            <a:srgbClr val="E8E4F0"/>
-          </a:solidFill>
-          <a:ln w="6350">
-            <a:solidFill>
-              <a:srgbClr val="C8C8C8"/>
-            </a:solidFill>
-          </a:ln>
-        </p:spPr>
-        <p:style>
-          <a:lnRef idx="1">
-            <a:schemeClr val="accent1"/>
-          </a:lnRef>
-          <a:fillRef idx="3">
-            <a:schemeClr val="accent1"/>
-          </a:fillRef>
-          <a:effectRef idx="2">
-            <a:schemeClr val="accent1"/>
-          </a:effectRef>
-          <a:fontRef idx="minor">
-            <a:schemeClr val="lt1"/>
-          </a:fontRef>
-        </p:style>
-        <p:txBody>
-          <a:bodyPr rtlCol="0" anchor="ctr"/>
-          <a:lstStyle/>
-          <a:p>
-            <a:pPr algn="ctr"/>
-          </a:p>
-        </p:txBody>
-      </p:sp>
-      <p:sp>
-        <p:nvSpPr>
-          <p:cNvPr id="9" name="TextBox 8"/>
-          <p:cNvSpPr txBox="1"/>
-          <p:nvPr/>
-        </p:nvSpPr>
-        <p:spPr>
-          <a:xfrm>
-            <a:off x="1975104" y="548640"/>
-            <a:ext cx="1581912" cy="228600"/>
-          </a:xfrm>
-          <a:prstGeom prst="rect">
-            <a:avLst/>
-          </a:prstGeom>
-          <a:noFill/>
-        </p:spPr>
-        <p:txBody>
-          <a:bodyPr wrap="square">
-            <a:spAutoFit/>
-          </a:bodyPr>
-          <a:lstStyle/>
-          <a:p>
-            <a:pPr>
-              <a:defRPr sz="800" b="1">
-                <a:solidFill>
-                  <a:srgbClr val="003366"/>
-                </a:solidFill>
-              </a:defRPr>
-            </a:pPr>
-            <a:r>
-              <a:t>KEY ACTIVITIES</a:t>
-            </a:r>
-          </a:p>
-        </p:txBody>
-      </p:sp>
-      <p:sp>
-        <p:nvSpPr>
-          <p:cNvPr id="10" name="TextBox 9"/>
-          <p:cNvSpPr txBox="1"/>
-          <p:nvPr/>
-        </p:nvSpPr>
-        <p:spPr>
-          <a:xfrm>
-            <a:off x="1975104" y="758952"/>
-            <a:ext cx="1581912" cy="1051560"/>
-          </a:xfrm>
-          <a:prstGeom prst="rect">
-            <a:avLst/>
-          </a:prstGeom>
-          <a:noFill/>
-        </p:spPr>
-        <p:txBody>
-          <a:bodyPr wrap="square">
-            <a:spAutoFit/>
-          </a:bodyPr>
-          <a:lstStyle/>
-          <a:p>
-            <a:pPr>
-              <a:spcAft>
-                <a:spcPts val="100"/>
-              </a:spcAft>
-              <a:defRPr sz="600">
-                <a:solidFill>
-                  <a:srgbClr val="323232"/>
-                </a:solidFill>
-              </a:defRPr>
-            </a:pPr>
-            <a:r>
-              <a:t>• Platform development</a:t>
-            </a:r>
-          </a:p>
-          <a:p>
-            <a:pPr>
-              <a:spcAft>
-                <a:spcPts val="100"/>
-              </a:spcAft>
-              <a:defRPr sz="600">
-                <a:solidFill>
-                  <a:srgbClr val="323232"/>
-                </a:solidFill>
-              </a:defRPr>
-            </a:pPr>
-            <a:r>
-              <a:t>• Tech recruitment</a:t>
-            </a:r>
-          </a:p>
-          <a:p>
-            <a:pPr>
-              <a:spcAft>
-                <a:spcPts val="100"/>
-              </a:spcAft>
-              <a:defRPr sz="600">
-                <a:solidFill>
-                  <a:srgbClr val="323232"/>
-                </a:solidFill>
-              </a:defRPr>
-            </a:pPr>
-            <a:r>
-              <a:t>• AV-specific training</a:t>
-            </a:r>
-          </a:p>
-          <a:p>
-            <a:pPr>
-              <a:spcAft>
-                <a:spcPts val="100"/>
-              </a:spcAft>
-              <a:defRPr sz="600">
-                <a:solidFill>
-                  <a:srgbClr val="323232"/>
-                </a:solidFill>
-              </a:defRPr>
-            </a:pPr>
-            <a:r>
-              <a:t>• Quality assurance</a:t>
-            </a:r>
-          </a:p>
-          <a:p>
-            <a:pPr>
-              <a:spcAft>
-                <a:spcPts val="100"/>
-              </a:spcAft>
-              <a:defRPr sz="600">
-                <a:solidFill>
-                  <a:srgbClr val="323232"/>
-                </a:solidFill>
-              </a:defRPr>
-            </a:pPr>
-            <a:r>
-              <a:t>• Enterprise sales</a:t>
-            </a:r>
-          </a:p>
-        </p:txBody>
-      </p:sp>
-      <p:sp>
-        <p:nvSpPr>
-          <p:cNvPr id="11" name="Rounded Rectangle 10"/>
-          <p:cNvSpPr/>
-          <p:nvPr/>
-        </p:nvSpPr>
-        <p:spPr>
-          <a:xfrm>
-            <a:off x="1901952" y="1920240"/>
-            <a:ext cx="1719072" cy="1371600"/>
-          </a:xfrm>
-          <a:prstGeom prst="roundRect">
-            <a:avLst/>
-          </a:prstGeom>
-          <a:solidFill>
-            <a:srgbClr val="E8E4F0"/>
-          </a:solidFill>
-          <a:ln w="6350">
-            <a:solidFill>
-              <a:srgbClr val="C8C8C8"/>
-            </a:solidFill>
-          </a:ln>
-        </p:spPr>
-        <p:style>
-          <a:lnRef idx="1">
-            <a:schemeClr val="accent1"/>
-          </a:lnRef>
-          <a:fillRef idx="3">
-            <a:schemeClr val="accent1"/>
-          </a:fillRef>
-          <a:effectRef idx="2">
-            <a:schemeClr val="accent1"/>
-          </a:effectRef>
-          <a:fontRef idx="minor">
-            <a:schemeClr val="lt1"/>
-          </a:fontRef>
-        </p:style>
-        <p:txBody>
-          <a:bodyPr rtlCol="0" anchor="ctr"/>
-          <a:lstStyle/>
-          <a:p>
-            <a:pPr algn="ctr"/>
-          </a:p>
-        </p:txBody>
-      </p:sp>
-      <p:sp>
-        <p:nvSpPr>
-          <p:cNvPr id="12" name="TextBox 11"/>
-          <p:cNvSpPr txBox="1"/>
-          <p:nvPr/>
-        </p:nvSpPr>
-        <p:spPr>
-          <a:xfrm>
-            <a:off x="1975104" y="1965960"/>
-            <a:ext cx="1581912" cy="228600"/>
-          </a:xfrm>
-          <a:prstGeom prst="rect">
-            <a:avLst/>
-          </a:prstGeom>
-          <a:noFill/>
-        </p:spPr>
-        <p:txBody>
-          <a:bodyPr wrap="square">
-            <a:spAutoFit/>
-          </a:bodyPr>
-          <a:lstStyle/>
-          <a:p>
-            <a:pPr>
-              <a:defRPr sz="800" b="1">
-                <a:solidFill>
-                  <a:srgbClr val="003366"/>
-                </a:solidFill>
-              </a:defRPr>
-            </a:pPr>
-            <a:r>
-              <a:t>KEY RESOURCES</a:t>
-            </a:r>
-          </a:p>
-        </p:txBody>
-      </p:sp>
-      <p:sp>
-        <p:nvSpPr>
-          <p:cNvPr id="13" name="TextBox 12"/>
-          <p:cNvSpPr txBox="1"/>
-          <p:nvPr/>
-        </p:nvSpPr>
-        <p:spPr>
-          <a:xfrm>
-            <a:off x="1975104" y="2176272"/>
-            <a:ext cx="1581912" cy="1051560"/>
-          </a:xfrm>
-          <a:prstGeom prst="rect">
-            <a:avLst/>
-          </a:prstGeom>
-          <a:noFill/>
-        </p:spPr>
-        <p:txBody>
-          <a:bodyPr wrap="square">
-            <a:spAutoFit/>
-          </a:bodyPr>
-          <a:lstStyle/>
-          <a:p>
-            <a:pPr>
-              <a:spcAft>
-                <a:spcPts val="100"/>
-              </a:spcAft>
-              <a:defRPr sz="600">
-                <a:solidFill>
-                  <a:srgbClr val="323232"/>
-                </a:solidFill>
-              </a:defRPr>
-            </a:pPr>
-            <a:r>
-              <a:t>Technology:</a:t>
-            </a:r>
-          </a:p>
-          <a:p>
-            <a:pPr>
-              <a:spcAft>
-                <a:spcPts val="100"/>
-              </a:spcAft>
-              <a:defRPr sz="600">
-                <a:solidFill>
-                  <a:srgbClr val="323232"/>
-                </a:solidFill>
-              </a:defRPr>
-            </a:pPr>
-            <a:r>
-              <a:t>• Dispatch platform</a:t>
-            </a:r>
-          </a:p>
-          <a:p>
-            <a:pPr>
-              <a:spcAft>
-                <a:spcPts val="100"/>
-              </a:spcAft>
-              <a:defRPr sz="600">
-                <a:solidFill>
-                  <a:srgbClr val="323232"/>
-                </a:solidFill>
-              </a:defRPr>
-            </a:pPr>
-            <a:r>
-              <a:t>• Fleet dashboard</a:t>
-            </a:r>
-          </a:p>
-          <a:p>
-            <a:pPr>
-              <a:spcAft>
-                <a:spcPts val="100"/>
-              </a:spcAft>
-              <a:defRPr sz="600">
-                <a:solidFill>
-                  <a:srgbClr val="323232"/>
-                </a:solidFill>
-              </a:defRPr>
-            </a:pPr>
-            <a:r>
-              <a:t>• Technician app</a:t>
-            </a:r>
-          </a:p>
-          <a:p>
-            <a:pPr>
-              <a:spcAft>
-                <a:spcPts val="100"/>
-              </a:spcAft>
-              <a:defRPr sz="600">
-                <a:solidFill>
-                  <a:srgbClr val="323232"/>
-                </a:solidFill>
-              </a:defRPr>
-            </a:pPr>
-          </a:p>
-          <a:p>
-            <a:pPr>
-              <a:spcAft>
-                <a:spcPts val="100"/>
-              </a:spcAft>
-              <a:defRPr sz="600">
-                <a:solidFill>
-                  <a:srgbClr val="323232"/>
-                </a:solidFill>
-              </a:defRPr>
-            </a:pPr>
-            <a:r>
-              <a:t>Human:</a:t>
-            </a:r>
-          </a:p>
-          <a:p>
-            <a:pPr>
-              <a:spcAft>
-                <a:spcPts val="100"/>
-              </a:spcAft>
-              <a:defRPr sz="600">
-                <a:solidFill>
-                  <a:srgbClr val="323232"/>
-                </a:solidFill>
-              </a:defRPr>
-            </a:pPr>
-            <a:r>
-              <a:t>• Engineering team</a:t>
-            </a:r>
-          </a:p>
-          <a:p>
-            <a:pPr>
-              <a:spcAft>
-                <a:spcPts val="100"/>
-              </a:spcAft>
-              <a:defRPr sz="600">
-                <a:solidFill>
-                  <a:srgbClr val="323232"/>
-                </a:solidFill>
-              </a:defRPr>
-            </a:pPr>
-            <a:r>
-              <a:t>• Trained tech network</a:t>
-            </a:r>
-          </a:p>
-        </p:txBody>
-      </p:sp>
-      <p:sp>
-        <p:nvSpPr>
-          <p:cNvPr id="14" name="Rounded Rectangle 13"/>
-          <p:cNvSpPr/>
-          <p:nvPr/>
-        </p:nvSpPr>
-        <p:spPr>
-          <a:xfrm>
-            <a:off x="3666744" y="502920"/>
-            <a:ext cx="1719072" cy="2788920"/>
-          </a:xfrm>
-          <a:prstGeom prst="roundRect">
-            <a:avLst/>
-          </a:prstGeom>
-          <a:solidFill>
-            <a:srgbClr val="FCE4D6"/>
-          </a:solidFill>
-          <a:ln w="6350">
-            <a:solidFill>
-              <a:srgbClr val="C8C8C8"/>
-            </a:solidFill>
-          </a:ln>
-        </p:spPr>
-        <p:style>
-          <a:lnRef idx="1">
-            <a:schemeClr val="accent1"/>
-          </a:lnRef>
-          <a:fillRef idx="3">
-            <a:schemeClr val="accent1"/>
-          </a:fillRef>
-          <a:effectRef idx="2">
-            <a:schemeClr val="accent1"/>
-          </a:effectRef>
-          <a:fontRef idx="minor">
-            <a:schemeClr val="lt1"/>
-          </a:fontRef>
-        </p:style>
-        <p:txBody>
-          <a:bodyPr rtlCol="0" anchor="ctr"/>
-          <a:lstStyle/>
-          <a:p>
-            <a:pPr algn="ctr"/>
-          </a:p>
-        </p:txBody>
-      </p:sp>
-      <p:sp>
-        <p:nvSpPr>
-          <p:cNvPr id="15" name="TextBox 14"/>
-          <p:cNvSpPr txBox="1"/>
-          <p:nvPr/>
-        </p:nvSpPr>
-        <p:spPr>
-          <a:xfrm>
-            <a:off x="3739896" y="548640"/>
-            <a:ext cx="1581912" cy="228600"/>
-          </a:xfrm>
-          <a:prstGeom prst="rect">
-            <a:avLst/>
-          </a:prstGeom>
-          <a:noFill/>
-        </p:spPr>
-        <p:txBody>
-          <a:bodyPr wrap="square">
-            <a:spAutoFit/>
-          </a:bodyPr>
-          <a:lstStyle/>
-          <a:p>
-            <a:pPr>
-              <a:defRPr sz="800" b="1">
-                <a:solidFill>
-                  <a:srgbClr val="003366"/>
-                </a:solidFill>
-              </a:defRPr>
-            </a:pPr>
-            <a:r>
-              <a:t>VALUE PROPOSITIONS</a:t>
-            </a:r>
-          </a:p>
-        </p:txBody>
-      </p:sp>
-      <p:sp>
-        <p:nvSpPr>
-          <p:cNvPr id="16" name="TextBox 15"/>
-          <p:cNvSpPr txBox="1"/>
-          <p:nvPr/>
-        </p:nvSpPr>
-        <p:spPr>
-          <a:xfrm>
-            <a:off x="3739896" y="758952"/>
-            <a:ext cx="1581912" cy="2468880"/>
-          </a:xfrm>
-          <a:prstGeom prst="rect">
-            <a:avLst/>
-          </a:prstGeom>
-          <a:noFill/>
-        </p:spPr>
-        <p:txBody>
-          <a:bodyPr wrap="square">
-            <a:spAutoFit/>
-          </a:bodyPr>
-          <a:lstStyle/>
-          <a:p>
-            <a:pPr>
-              <a:spcAft>
-                <a:spcPts val="100"/>
-              </a:spcAft>
-              <a:defRPr sz="600">
-                <a:solidFill>
-                  <a:srgbClr val="323232"/>
-                </a:solidFill>
-              </a:defRPr>
-            </a:pPr>
-            <a:r>
-              <a:t>For Fleet Operators:</a:t>
-            </a:r>
-          </a:p>
-          <a:p>
-            <a:pPr>
-              <a:spcAft>
-                <a:spcPts val="100"/>
-              </a:spcAft>
-              <a:defRPr sz="600">
-                <a:solidFill>
-                  <a:srgbClr val="323232"/>
-                </a:solidFill>
-              </a:defRPr>
-            </a:pPr>
-            <a:r>
-              <a:t>• Reduce downtime</a:t>
-            </a:r>
-          </a:p>
-          <a:p>
-            <a:pPr>
-              <a:spcAft>
-                <a:spcPts val="100"/>
-              </a:spcAft>
-              <a:defRPr sz="600">
-                <a:solidFill>
-                  <a:srgbClr val="323232"/>
-                </a:solidFill>
-              </a:defRPr>
-            </a:pPr>
-            <a:r>
-              <a:t>• Variable cost model</a:t>
-            </a:r>
-          </a:p>
-          <a:p>
-            <a:pPr>
-              <a:spcAft>
-                <a:spcPts val="100"/>
-              </a:spcAft>
-              <a:defRPr sz="600">
-                <a:solidFill>
-                  <a:srgbClr val="323232"/>
-                </a:solidFill>
-              </a:defRPr>
-            </a:pPr>
-            <a:r>
-              <a:t>• Scale instantly</a:t>
-            </a:r>
-          </a:p>
-          <a:p>
-            <a:pPr>
-              <a:spcAft>
-                <a:spcPts val="100"/>
-              </a:spcAft>
-              <a:defRPr sz="600">
-                <a:solidFill>
-                  <a:srgbClr val="323232"/>
-                </a:solidFill>
-              </a:defRPr>
-            </a:pPr>
-            <a:r>
-              <a:t>• 24/7 availability</a:t>
-            </a:r>
-          </a:p>
-          <a:p>
-            <a:pPr>
-              <a:spcAft>
-                <a:spcPts val="100"/>
-              </a:spcAft>
-              <a:defRPr sz="600">
-                <a:solidFill>
-                  <a:srgbClr val="323232"/>
-                </a:solidFill>
-              </a:defRPr>
-            </a:pPr>
-            <a:r>
-              <a:t>• API integration</a:t>
-            </a:r>
-          </a:p>
-          <a:p>
-            <a:pPr>
-              <a:spcAft>
-                <a:spcPts val="100"/>
-              </a:spcAft>
-              <a:defRPr sz="600">
-                <a:solidFill>
-                  <a:srgbClr val="323232"/>
-                </a:solidFill>
-              </a:defRPr>
-            </a:pPr>
-          </a:p>
-          <a:p>
-            <a:pPr>
-              <a:spcAft>
-                <a:spcPts val="100"/>
-              </a:spcAft>
-              <a:defRPr sz="600">
-                <a:solidFill>
-                  <a:srgbClr val="323232"/>
-                </a:solidFill>
-              </a:defRPr>
-            </a:pPr>
-            <a:r>
-              <a:t>vs. In-House:</a:t>
-            </a:r>
-          </a:p>
-          <a:p>
-            <a:pPr>
-              <a:spcAft>
-                <a:spcPts val="100"/>
-              </a:spcAft>
-              <a:defRPr sz="600">
-                <a:solidFill>
-                  <a:srgbClr val="323232"/>
-                </a:solidFill>
-              </a:defRPr>
-            </a:pPr>
-            <a:r>
-              <a:t>• 50% cost reduction</a:t>
-            </a:r>
-          </a:p>
-          <a:p>
-            <a:pPr>
-              <a:spcAft>
-                <a:spcPts val="100"/>
-              </a:spcAft>
-              <a:defRPr sz="600">
-                <a:solidFill>
-                  <a:srgbClr val="323232"/>
-                </a:solidFill>
-              </a:defRPr>
-            </a:pPr>
-            <a:r>
-              <a:t>• 30% more uptime</a:t>
-            </a:r>
-          </a:p>
-          <a:p>
-            <a:pPr>
-              <a:spcAft>
-                <a:spcPts val="100"/>
-              </a:spcAft>
-              <a:defRPr sz="600">
-                <a:solidFill>
-                  <a:srgbClr val="323232"/>
-                </a:solidFill>
-              </a:defRPr>
-            </a:pPr>
-          </a:p>
-          <a:p>
-            <a:pPr>
-              <a:spcAft>
-                <a:spcPts val="100"/>
-              </a:spcAft>
-              <a:defRPr sz="600">
-                <a:solidFill>
-                  <a:srgbClr val="323232"/>
-                </a:solidFill>
-              </a:defRPr>
-            </a:pPr>
-            <a:r>
-              <a:t>For Technicians:</a:t>
-            </a:r>
-          </a:p>
-          <a:p>
-            <a:pPr>
-              <a:spcAft>
-                <a:spcPts val="100"/>
-              </a:spcAft>
-              <a:defRPr sz="600">
-                <a:solidFill>
-                  <a:srgbClr val="323232"/>
-                </a:solidFill>
-              </a:defRPr>
-            </a:pPr>
-            <a:r>
-              <a:t>• Flexible gig work</a:t>
-            </a:r>
-          </a:p>
-          <a:p>
-            <a:pPr>
-              <a:spcAft>
-                <a:spcPts val="100"/>
-              </a:spcAft>
-              <a:defRPr sz="600">
-                <a:solidFill>
-                  <a:srgbClr val="323232"/>
-                </a:solidFill>
-              </a:defRPr>
-            </a:pPr>
-            <a:r>
-              <a:t>• $15-20/hour</a:t>
-            </a:r>
-          </a:p>
-        </p:txBody>
-      </p:sp>
-      <p:sp>
-        <p:nvSpPr>
-          <p:cNvPr id="17" name="Rounded Rectangle 16"/>
-          <p:cNvSpPr/>
-          <p:nvPr/>
-        </p:nvSpPr>
-        <p:spPr>
-          <a:xfrm>
-            <a:off x="5431536" y="502920"/>
-            <a:ext cx="1719072" cy="1371600"/>
-          </a:xfrm>
-          <a:prstGeom prst="roundRect">
-            <a:avLst/>
-          </a:prstGeom>
-          <a:solidFill>
-            <a:srgbClr val="FFF9E6"/>
-          </a:solidFill>
-          <a:ln w="6350">
-            <a:solidFill>
-              <a:srgbClr val="C8C8C8"/>
-            </a:solidFill>
-          </a:ln>
-        </p:spPr>
-        <p:style>
-          <a:lnRef idx="1">
-            <a:schemeClr val="accent1"/>
-          </a:lnRef>
-          <a:fillRef idx="3">
-            <a:schemeClr val="accent1"/>
-          </a:fillRef>
-          <a:effectRef idx="2">
-            <a:schemeClr val="accent1"/>
-          </a:effectRef>
-          <a:fontRef idx="minor">
-            <a:schemeClr val="lt1"/>
-          </a:fontRef>
-        </p:style>
-        <p:txBody>
-          <a:bodyPr rtlCol="0" anchor="ctr"/>
-          <a:lstStyle/>
-          <a:p>
-            <a:pPr algn="ctr"/>
-          </a:p>
-        </p:txBody>
-      </p:sp>
-      <p:sp>
-        <p:nvSpPr>
-          <p:cNvPr id="18" name="TextBox 17"/>
-          <p:cNvSpPr txBox="1"/>
-          <p:nvPr/>
-        </p:nvSpPr>
-        <p:spPr>
-          <a:xfrm>
-            <a:off x="5504688" y="548640"/>
-            <a:ext cx="1581912" cy="228600"/>
-          </a:xfrm>
-          <a:prstGeom prst="rect">
-            <a:avLst/>
-          </a:prstGeom>
-          <a:noFill/>
-        </p:spPr>
-        <p:txBody>
-          <a:bodyPr wrap="square">
-            <a:spAutoFit/>
-          </a:bodyPr>
-          <a:lstStyle/>
-          <a:p>
-            <a:pPr>
-              <a:defRPr sz="800" b="1">
-                <a:solidFill>
-                  <a:srgbClr val="003366"/>
-                </a:solidFill>
-              </a:defRPr>
-            </a:pPr>
-            <a:r>
-              <a:t>CUSTOMER RELATIONSHIPS</a:t>
-            </a:r>
-          </a:p>
-        </p:txBody>
-      </p:sp>
-      <p:sp>
-        <p:nvSpPr>
-          <p:cNvPr id="19" name="TextBox 18"/>
-          <p:cNvSpPr txBox="1"/>
-          <p:nvPr/>
-        </p:nvSpPr>
-        <p:spPr>
-          <a:xfrm>
-            <a:off x="5504688" y="758952"/>
-            <a:ext cx="1581912" cy="1051560"/>
-          </a:xfrm>
-          <a:prstGeom prst="rect">
-            <a:avLst/>
-          </a:prstGeom>
-          <a:noFill/>
-        </p:spPr>
-        <p:txBody>
-          <a:bodyPr wrap="square">
-            <a:spAutoFit/>
-          </a:bodyPr>
-          <a:lstStyle/>
-          <a:p>
-            <a:pPr>
-              <a:spcAft>
-                <a:spcPts val="100"/>
-              </a:spcAft>
-              <a:defRPr sz="600">
-                <a:solidFill>
-                  <a:srgbClr val="323232"/>
-                </a:solidFill>
-              </a:defRPr>
-            </a:pPr>
-            <a:r>
-              <a:t>• Dedicated account mgrs</a:t>
-            </a:r>
-          </a:p>
-          <a:p>
-            <a:pPr>
-              <a:spcAft>
-                <a:spcPts val="100"/>
-              </a:spcAft>
-              <a:defRPr sz="600">
-                <a:solidFill>
-                  <a:srgbClr val="323232"/>
-                </a:solidFill>
-              </a:defRPr>
-            </a:pPr>
-            <a:r>
-              <a:t>• API integration support</a:t>
-            </a:r>
-          </a:p>
-          <a:p>
-            <a:pPr>
-              <a:spcAft>
-                <a:spcPts val="100"/>
-              </a:spcAft>
-              <a:defRPr sz="600">
-                <a:solidFill>
-                  <a:srgbClr val="323232"/>
-                </a:solidFill>
-              </a:defRPr>
-            </a:pPr>
-            <a:r>
-              <a:t>• Performance dashboards</a:t>
-            </a:r>
-          </a:p>
-          <a:p>
-            <a:pPr>
-              <a:spcAft>
-                <a:spcPts val="100"/>
-              </a:spcAft>
-              <a:defRPr sz="600">
-                <a:solidFill>
-                  <a:srgbClr val="323232"/>
-                </a:solidFill>
-              </a:defRPr>
-            </a:pPr>
-            <a:r>
-              <a:t>• SLA guarantees</a:t>
-            </a:r>
-          </a:p>
-          <a:p>
-            <a:pPr>
-              <a:spcAft>
-                <a:spcPts val="100"/>
-              </a:spcAft>
-              <a:defRPr sz="600">
-                <a:solidFill>
-                  <a:srgbClr val="323232"/>
-                </a:solidFill>
-              </a:defRPr>
-            </a:pPr>
-            <a:r>
-              <a:t>• 24/7 support</a:t>
-            </a:r>
-          </a:p>
-        </p:txBody>
-      </p:sp>
-      <p:sp>
-        <p:nvSpPr>
-          <p:cNvPr id="20" name="Rounded Rectangle 19"/>
-          <p:cNvSpPr/>
-          <p:nvPr/>
-        </p:nvSpPr>
-        <p:spPr>
-          <a:xfrm>
-            <a:off x="5431536" y="1920240"/>
-            <a:ext cx="1719072" cy="1371600"/>
-          </a:xfrm>
-          <a:prstGeom prst="roundRect">
-            <a:avLst/>
-          </a:prstGeom>
-          <a:solidFill>
-            <a:srgbClr val="FFF9E6"/>
-          </a:solidFill>
-          <a:ln w="6350">
-            <a:solidFill>
-              <a:srgbClr val="C8C8C8"/>
-            </a:solidFill>
-          </a:ln>
-        </p:spPr>
-        <p:style>
-          <a:lnRef idx="1">
-            <a:schemeClr val="accent1"/>
-          </a:lnRef>
-          <a:fillRef idx="3">
-            <a:schemeClr val="accent1"/>
-          </a:fillRef>
-          <a:effectRef idx="2">
-            <a:schemeClr val="accent1"/>
-          </a:effectRef>
-          <a:fontRef idx="minor">
-            <a:schemeClr val="lt1"/>
-          </a:fontRef>
-        </p:style>
-        <p:txBody>
-          <a:bodyPr rtlCol="0" anchor="ctr"/>
-          <a:lstStyle/>
-          <a:p>
-            <a:pPr algn="ctr"/>
-          </a:p>
-        </p:txBody>
-      </p:sp>
-      <p:sp>
-        <p:nvSpPr>
-          <p:cNvPr id="21" name="TextBox 20"/>
-          <p:cNvSpPr txBox="1"/>
-          <p:nvPr/>
-        </p:nvSpPr>
-        <p:spPr>
-          <a:xfrm>
-            <a:off x="5504688" y="1965960"/>
-            <a:ext cx="1581912" cy="228600"/>
-          </a:xfrm>
-          <a:prstGeom prst="rect">
-            <a:avLst/>
-          </a:prstGeom>
-          <a:noFill/>
-        </p:spPr>
-        <p:txBody>
-          <a:bodyPr wrap="square">
-            <a:spAutoFit/>
-          </a:bodyPr>
-          <a:lstStyle/>
-          <a:p>
-            <a:pPr>
-              <a:defRPr sz="800" b="1">
-                <a:solidFill>
-                  <a:srgbClr val="003366"/>
-                </a:solidFill>
-              </a:defRPr>
-            </a:pPr>
-            <a:r>
-              <a:t>CHANNELS</a:t>
-            </a:r>
-          </a:p>
-        </p:txBody>
-      </p:sp>
-      <p:sp>
-        <p:nvSpPr>
-          <p:cNvPr id="22" name="TextBox 21"/>
-          <p:cNvSpPr txBox="1"/>
-          <p:nvPr/>
-        </p:nvSpPr>
-        <p:spPr>
-          <a:xfrm>
-            <a:off x="5504688" y="2176272"/>
-            <a:ext cx="1581912" cy="1051560"/>
-          </a:xfrm>
-          <a:prstGeom prst="rect">
-            <a:avLst/>
-          </a:prstGeom>
-          <a:noFill/>
-        </p:spPr>
-        <p:txBody>
-          <a:bodyPr wrap="square">
-            <a:spAutoFit/>
-          </a:bodyPr>
-          <a:lstStyle/>
-          <a:p>
-            <a:pPr>
-              <a:spcAft>
-                <a:spcPts val="100"/>
-              </a:spcAft>
-              <a:defRPr sz="600">
-                <a:solidFill>
-                  <a:srgbClr val="323232"/>
-                </a:solidFill>
-              </a:defRPr>
-            </a:pPr>
-            <a:r>
-              <a:t>Acquisition:</a:t>
-            </a:r>
-          </a:p>
-          <a:p>
-            <a:pPr>
-              <a:spcAft>
-                <a:spcPts val="100"/>
-              </a:spcAft>
-              <a:defRPr sz="600">
-                <a:solidFill>
-                  <a:srgbClr val="323232"/>
-                </a:solidFill>
-              </a:defRPr>
-            </a:pPr>
-            <a:r>
-              <a:t>• Direct enterprise sales</a:t>
-            </a:r>
-          </a:p>
-          <a:p>
-            <a:pPr>
-              <a:spcAft>
-                <a:spcPts val="100"/>
-              </a:spcAft>
-              <a:defRPr sz="600">
-                <a:solidFill>
-                  <a:srgbClr val="323232"/>
-                </a:solidFill>
-              </a:defRPr>
-            </a:pPr>
-            <a:r>
-              <a:t>• Industry conferences</a:t>
-            </a:r>
-          </a:p>
-          <a:p>
-            <a:pPr>
-              <a:spcAft>
-                <a:spcPts val="100"/>
-              </a:spcAft>
-              <a:defRPr sz="600">
-                <a:solidFill>
-                  <a:srgbClr val="323232"/>
-                </a:solidFill>
-              </a:defRPr>
-            </a:pPr>
-          </a:p>
-          <a:p>
-            <a:pPr>
-              <a:spcAft>
-                <a:spcPts val="100"/>
-              </a:spcAft>
-              <a:defRPr sz="600">
-                <a:solidFill>
-                  <a:srgbClr val="323232"/>
-                </a:solidFill>
-              </a:defRPr>
-            </a:pPr>
-            <a:r>
-              <a:t>Delivery:</a:t>
-            </a:r>
-          </a:p>
-          <a:p>
-            <a:pPr>
-              <a:spcAft>
-                <a:spcPts val="100"/>
-              </a:spcAft>
-              <a:defRPr sz="600">
-                <a:solidFill>
-                  <a:srgbClr val="323232"/>
-                </a:solidFill>
-              </a:defRPr>
-            </a:pPr>
-            <a:r>
-              <a:t>• Fleet dashboard</a:t>
-            </a:r>
-          </a:p>
-          <a:p>
-            <a:pPr>
-              <a:spcAft>
-                <a:spcPts val="100"/>
-              </a:spcAft>
-              <a:defRPr sz="600">
-                <a:solidFill>
-                  <a:srgbClr val="323232"/>
-                </a:solidFill>
-              </a:defRPr>
-            </a:pPr>
-            <a:r>
-              <a:t>• API integration</a:t>
-            </a:r>
-          </a:p>
-          <a:p>
-            <a:pPr>
-              <a:spcAft>
-                <a:spcPts val="100"/>
-              </a:spcAft>
-              <a:defRPr sz="600">
-                <a:solidFill>
-                  <a:srgbClr val="323232"/>
-                </a:solidFill>
-              </a:defRPr>
-            </a:pPr>
-            <a:r>
-              <a:t>• Mobile dispatch</a:t>
-            </a:r>
-          </a:p>
-        </p:txBody>
-      </p:sp>
-      <p:sp>
-        <p:nvSpPr>
-          <p:cNvPr id="23" name="Rounded Rectangle 22"/>
-          <p:cNvSpPr/>
-          <p:nvPr/>
-        </p:nvSpPr>
-        <p:spPr>
-          <a:xfrm>
-            <a:off x="7196328" y="502920"/>
-            <a:ext cx="1719072" cy="2788920"/>
-          </a:xfrm>
-          <a:prstGeom prst="roundRect">
-            <a:avLst/>
-          </a:prstGeom>
-          <a:solidFill>
-            <a:srgbClr val="FFF9E6"/>
-          </a:solidFill>
-          <a:ln w="6350">
-            <a:solidFill>
-              <a:srgbClr val="C8C8C8"/>
-            </a:solidFill>
-          </a:ln>
-        </p:spPr>
-        <p:style>
-          <a:lnRef idx="1">
-            <a:schemeClr val="accent1"/>
-          </a:lnRef>
-          <a:fillRef idx="3">
-            <a:schemeClr val="accent1"/>
-          </a:fillRef>
-          <a:effectRef idx="2">
-            <a:schemeClr val="accent1"/>
-          </a:effectRef>
-          <a:fontRef idx="minor">
-            <a:schemeClr val="lt1"/>
-          </a:fontRef>
-        </p:style>
-        <p:txBody>
-          <a:bodyPr rtlCol="0" anchor="ctr"/>
-          <a:lstStyle/>
-          <a:p>
-            <a:pPr algn="ctr"/>
-          </a:p>
-        </p:txBody>
-      </p:sp>
-      <p:sp>
-        <p:nvSpPr>
-          <p:cNvPr id="24" name="TextBox 23"/>
-          <p:cNvSpPr txBox="1"/>
-          <p:nvPr/>
-        </p:nvSpPr>
-        <p:spPr>
-          <a:xfrm>
-            <a:off x="7269480" y="548640"/>
-            <a:ext cx="1581912" cy="228600"/>
-          </a:xfrm>
-          <a:prstGeom prst="rect">
-            <a:avLst/>
-          </a:prstGeom>
-          <a:noFill/>
-        </p:spPr>
-        <p:txBody>
-          <a:bodyPr wrap="square">
-            <a:spAutoFit/>
-          </a:bodyPr>
-          <a:lstStyle/>
-          <a:p>
-            <a:pPr>
-              <a:defRPr sz="800" b="1">
-                <a:solidFill>
-                  <a:srgbClr val="003366"/>
-                </a:solidFill>
-              </a:defRPr>
-            </a:pPr>
-            <a:r>
-              <a:t>CUSTOMER SEGMENTS</a:t>
-            </a:r>
-          </a:p>
-        </p:txBody>
-      </p:sp>
-      <p:sp>
-        <p:nvSpPr>
-          <p:cNvPr id="25" name="TextBox 24"/>
-          <p:cNvSpPr txBox="1"/>
-          <p:nvPr/>
-        </p:nvSpPr>
-        <p:spPr>
-          <a:xfrm>
-            <a:off x="7269480" y="758952"/>
-            <a:ext cx="1581912" cy="2468880"/>
-          </a:xfrm>
-          <a:prstGeom prst="rect">
-            <a:avLst/>
-          </a:prstGeom>
-          <a:noFill/>
-        </p:spPr>
-        <p:txBody>
-          <a:bodyPr wrap="square">
-            <a:spAutoFit/>
-          </a:bodyPr>
-          <a:lstStyle/>
-          <a:p>
-            <a:pPr>
-              <a:spcAft>
-                <a:spcPts val="100"/>
-              </a:spcAft>
-              <a:defRPr sz="600">
-                <a:solidFill>
-                  <a:srgbClr val="323232"/>
-                </a:solidFill>
-              </a:defRPr>
-            </a:pPr>
-            <a:r>
-              <a:t>Primary:</a:t>
-            </a:r>
-          </a:p>
-          <a:p>
-            <a:pPr>
-              <a:spcAft>
-                <a:spcPts val="100"/>
-              </a:spcAft>
-              <a:defRPr sz="600">
-                <a:solidFill>
-                  <a:srgbClr val="323232"/>
-                </a:solidFill>
-              </a:defRPr>
-            </a:pPr>
-            <a:r>
-              <a:t>• Waymo (2,500+ vehicles)</a:t>
-            </a:r>
-          </a:p>
-          <a:p>
-            <a:pPr>
-              <a:spcAft>
-                <a:spcPts val="100"/>
-              </a:spcAft>
-              <a:defRPr sz="600">
-                <a:solidFill>
-                  <a:srgbClr val="323232"/>
-                </a:solidFill>
-              </a:defRPr>
-            </a:pPr>
-            <a:r>
-              <a:t>• Cruise (rebuilding)</a:t>
-            </a:r>
-          </a:p>
-          <a:p>
-            <a:pPr>
-              <a:spcAft>
-                <a:spcPts val="100"/>
-              </a:spcAft>
-              <a:defRPr sz="600">
-                <a:solidFill>
-                  <a:srgbClr val="323232"/>
-                </a:solidFill>
-              </a:defRPr>
-            </a:pPr>
-            <a:r>
-              <a:t>• Zoox (Amazon)</a:t>
-            </a:r>
-          </a:p>
-          <a:p>
-            <a:pPr>
-              <a:spcAft>
-                <a:spcPts val="100"/>
-              </a:spcAft>
-              <a:defRPr sz="600">
-                <a:solidFill>
-                  <a:srgbClr val="323232"/>
-                </a:solidFill>
-              </a:defRPr>
-            </a:pPr>
-            <a:r>
-              <a:t>• Tesla Robotaxi</a:t>
-            </a:r>
-          </a:p>
-          <a:p>
-            <a:pPr>
-              <a:spcAft>
-                <a:spcPts val="100"/>
-              </a:spcAft>
-              <a:defRPr sz="600">
-                <a:solidFill>
-                  <a:srgbClr val="323232"/>
-                </a:solidFill>
-              </a:defRPr>
-            </a:pPr>
-          </a:p>
-          <a:p>
-            <a:pPr>
-              <a:spcAft>
-                <a:spcPts val="100"/>
-              </a:spcAft>
-              <a:defRPr sz="600">
-                <a:solidFill>
-                  <a:srgbClr val="323232"/>
-                </a:solidFill>
-              </a:defRPr>
-            </a:pPr>
-            <a:r>
-              <a:t>Secondary:</a:t>
-            </a:r>
-          </a:p>
-          <a:p>
-            <a:pPr>
-              <a:spcAft>
-                <a:spcPts val="100"/>
-              </a:spcAft>
-              <a:defRPr sz="600">
-                <a:solidFill>
-                  <a:srgbClr val="323232"/>
-                </a:solidFill>
-              </a:defRPr>
-            </a:pPr>
-            <a:r>
-              <a:t>• Amazon Delivery EVs</a:t>
-            </a:r>
-          </a:p>
-          <a:p>
-            <a:pPr>
-              <a:spcAft>
-                <a:spcPts val="100"/>
-              </a:spcAft>
-              <a:defRPr sz="600">
-                <a:solidFill>
-                  <a:srgbClr val="323232"/>
-                </a:solidFill>
-              </a:defRPr>
-            </a:pPr>
-            <a:r>
-              <a:t>• FedEx/UPS electric</a:t>
-            </a:r>
-          </a:p>
-          <a:p>
-            <a:pPr>
-              <a:spcAft>
-                <a:spcPts val="100"/>
-              </a:spcAft>
-              <a:defRPr sz="600">
-                <a:solidFill>
-                  <a:srgbClr val="323232"/>
-                </a:solidFill>
-              </a:defRPr>
-            </a:pPr>
-          </a:p>
-          <a:p>
-            <a:pPr>
-              <a:spcAft>
-                <a:spcPts val="100"/>
-              </a:spcAft>
-              <a:defRPr sz="600">
-                <a:solidFill>
-                  <a:srgbClr val="323232"/>
-                </a:solidFill>
-              </a:defRPr>
-            </a:pPr>
-            <a:r>
-              <a:t>Buyers:</a:t>
-            </a:r>
-          </a:p>
-          <a:p>
-            <a:pPr>
-              <a:spcAft>
-                <a:spcPts val="100"/>
-              </a:spcAft>
-              <a:defRPr sz="600">
-                <a:solidFill>
-                  <a:srgbClr val="323232"/>
-                </a:solidFill>
-              </a:defRPr>
-            </a:pPr>
-            <a:r>
-              <a:t>• VP of Operations</a:t>
-            </a:r>
-          </a:p>
-          <a:p>
-            <a:pPr>
-              <a:spcAft>
-                <a:spcPts val="100"/>
-              </a:spcAft>
-              <a:defRPr sz="600">
-                <a:solidFill>
-                  <a:srgbClr val="323232"/>
-                </a:solidFill>
-              </a:defRPr>
-            </a:pPr>
-            <a:r>
-              <a:t>• Fleet Ops Manager</a:t>
-            </a:r>
-          </a:p>
-        </p:txBody>
-      </p:sp>
-      <p:sp>
-        <p:nvSpPr>
-          <p:cNvPr id="26" name="Rounded Rectangle 25"/>
-          <p:cNvSpPr/>
-          <p:nvPr/>
-        </p:nvSpPr>
-        <p:spPr>
-          <a:xfrm>
-            <a:off x="137160" y="3337560"/>
-            <a:ext cx="3483864" cy="914400"/>
-          </a:xfrm>
-          <a:prstGeom prst="roundRect">
-            <a:avLst/>
-          </a:prstGeom>
-          <a:solidFill>
-            <a:srgbClr val="F0F0F0"/>
-          </a:solidFill>
-          <a:ln w="6350">
-            <a:solidFill>
-              <a:srgbClr val="C8C8C8"/>
-            </a:solidFill>
-          </a:ln>
-        </p:spPr>
-        <p:style>
-          <a:lnRef idx="1">
-            <a:schemeClr val="accent1"/>
-          </a:lnRef>
-          <a:fillRef idx="3">
-            <a:schemeClr val="accent1"/>
-          </a:fillRef>
-          <a:effectRef idx="2">
-            <a:schemeClr val="accent1"/>
-          </a:effectRef>
-          <a:fontRef idx="minor">
-            <a:schemeClr val="lt1"/>
-          </a:fontRef>
-        </p:style>
-        <p:txBody>
-          <a:bodyPr rtlCol="0" anchor="ctr"/>
-          <a:lstStyle/>
-          <a:p>
-            <a:pPr algn="ctr"/>
-          </a:p>
-        </p:txBody>
-      </p:sp>
-      <p:sp>
-        <p:nvSpPr>
-          <p:cNvPr id="27" name="TextBox 26"/>
-          <p:cNvSpPr txBox="1"/>
-          <p:nvPr/>
-        </p:nvSpPr>
-        <p:spPr>
-          <a:xfrm>
-            <a:off x="210312" y="3383280"/>
-            <a:ext cx="3346704" cy="228600"/>
-          </a:xfrm>
-          <a:prstGeom prst="rect">
-            <a:avLst/>
-          </a:prstGeom>
-          <a:noFill/>
-        </p:spPr>
-        <p:txBody>
-          <a:bodyPr wrap="square">
-            <a:spAutoFit/>
-          </a:bodyPr>
-          <a:lstStyle/>
-          <a:p>
-            <a:pPr>
-              <a:defRPr sz="800" b="1">
-                <a:solidFill>
-                  <a:srgbClr val="003366"/>
-                </a:solidFill>
-              </a:defRPr>
-            </a:pPr>
-            <a:r>
-              <a:t>COST STRUCTURE</a:t>
-            </a:r>
-          </a:p>
-        </p:txBody>
-      </p:sp>
-      <p:sp>
-        <p:nvSpPr>
-          <p:cNvPr id="28" name="TextBox 27"/>
-          <p:cNvSpPr txBox="1"/>
-          <p:nvPr/>
-        </p:nvSpPr>
-        <p:spPr>
-          <a:xfrm>
-            <a:off x="210312" y="3593592"/>
-            <a:ext cx="3346704" cy="594360"/>
-          </a:xfrm>
-          <a:prstGeom prst="rect">
-            <a:avLst/>
-          </a:prstGeom>
-          <a:noFill/>
-        </p:spPr>
-        <p:txBody>
-          <a:bodyPr wrap="square">
-            <a:spAutoFit/>
-          </a:bodyPr>
-          <a:lstStyle/>
-          <a:p>
-            <a:pPr>
-              <a:spcAft>
-                <a:spcPts val="100"/>
-              </a:spcAft>
-              <a:defRPr sz="600">
-                <a:solidFill>
-                  <a:srgbClr val="323232"/>
-                </a:solidFill>
-              </a:defRPr>
-            </a:pPr>
-            <a:r>
-              <a:t>Variable: Tech payouts (65-70%), Payment processing (2-3%)</a:t>
-            </a:r>
-          </a:p>
-          <a:p>
-            <a:pPr>
-              <a:spcAft>
-                <a:spcPts val="100"/>
-              </a:spcAft>
-              <a:defRPr sz="600">
-                <a:solidFill>
-                  <a:srgbClr val="323232"/>
-                </a:solidFill>
-              </a:defRPr>
-            </a:pPr>
-            <a:r>
-              <a:t>Fixed: Platform ($15-20K/mo), Team ($40-60K/mo), Marketing ($10-15K/mo)</a:t>
-            </a:r>
-          </a:p>
-          <a:p>
-            <a:pPr>
-              <a:spcAft>
-                <a:spcPts val="100"/>
-              </a:spcAft>
-              <a:defRPr sz="600">
-                <a:solidFill>
-                  <a:srgbClr val="323232"/>
-                </a:solidFill>
-              </a:defRPr>
-            </a:pPr>
-            <a:r>
-              <a:t>Seed: $1.5M total</a:t>
-            </a:r>
-          </a:p>
-        </p:txBody>
-      </p:sp>
-      <p:sp>
-        <p:nvSpPr>
-          <p:cNvPr id="29" name="Rounded Rectangle 28"/>
-          <p:cNvSpPr/>
-          <p:nvPr/>
-        </p:nvSpPr>
-        <p:spPr>
-          <a:xfrm>
-            <a:off x="3666744" y="3337560"/>
-            <a:ext cx="5248656" cy="914400"/>
-          </a:xfrm>
-          <a:prstGeom prst="roundRect">
-            <a:avLst/>
-          </a:prstGeom>
-          <a:solidFill>
-            <a:srgbClr val="DBEAFE"/>
-          </a:solidFill>
-          <a:ln w="6350">
-            <a:solidFill>
-              <a:srgbClr val="C8C8C8"/>
-            </a:solidFill>
-          </a:ln>
-        </p:spPr>
-        <p:style>
-          <a:lnRef idx="1">
-            <a:schemeClr val="accent1"/>
-          </a:lnRef>
-          <a:fillRef idx="3">
-            <a:schemeClr val="accent1"/>
-          </a:fillRef>
-          <a:effectRef idx="2">
-            <a:schemeClr val="accent1"/>
-          </a:effectRef>
-          <a:fontRef idx="minor">
-            <a:schemeClr val="lt1"/>
-          </a:fontRef>
-        </p:style>
-        <p:txBody>
-          <a:bodyPr rtlCol="0" anchor="ctr"/>
-          <a:lstStyle/>
-          <a:p>
-            <a:pPr algn="ctr"/>
-          </a:p>
-        </p:txBody>
-      </p:sp>
-      <p:sp>
-        <p:nvSpPr>
-          <p:cNvPr id="30" name="TextBox 29"/>
-          <p:cNvSpPr txBox="1"/>
-          <p:nvPr/>
-        </p:nvSpPr>
-        <p:spPr>
-          <a:xfrm>
-            <a:off x="3739896" y="3383280"/>
-            <a:ext cx="5111496" cy="228600"/>
-          </a:xfrm>
-          <a:prstGeom prst="rect">
-            <a:avLst/>
-          </a:prstGeom>
-          <a:noFill/>
-        </p:spPr>
-        <p:txBody>
-          <a:bodyPr wrap="square">
-            <a:spAutoFit/>
-          </a:bodyPr>
-          <a:lstStyle/>
-          <a:p>
-            <a:pPr>
-              <a:defRPr sz="800" b="1">
-                <a:solidFill>
-                  <a:srgbClr val="003366"/>
-                </a:solidFill>
-              </a:defRPr>
-            </a:pPr>
-            <a:r>
-              <a:t>REVENUE STREAMS</a:t>
-            </a:r>
-          </a:p>
-        </p:txBody>
-      </p:sp>
-      <p:sp>
-        <p:nvSpPr>
-          <p:cNvPr id="31" name="TextBox 30"/>
-          <p:cNvSpPr txBox="1"/>
-          <p:nvPr/>
-        </p:nvSpPr>
-        <p:spPr>
-          <a:xfrm>
-            <a:off x="3739896" y="3593592"/>
-            <a:ext cx="5111496" cy="594360"/>
-          </a:xfrm>
-          <a:prstGeom prst="rect">
-            <a:avLst/>
-          </a:prstGeom>
-          <a:noFill/>
-        </p:spPr>
-        <p:txBody>
-          <a:bodyPr wrap="square">
-            <a:spAutoFit/>
-          </a:bodyPr>
-          <a:lstStyle/>
-          <a:p>
-            <a:pPr>
-              <a:spcAft>
-                <a:spcPts val="100"/>
-              </a:spcAft>
-              <a:defRPr sz="600">
-                <a:solidFill>
-                  <a:srgbClr val="323232"/>
-                </a:solidFill>
-              </a:defRPr>
-            </a:pPr>
-            <a:r>
-              <a:t>Services: Quick ($12-18) | Deep ($45-75) | Emergency ($75-150)</a:t>
-            </a:r>
-          </a:p>
-          <a:p>
-            <a:pPr>
-              <a:spcAft>
-                <a:spcPts val="100"/>
-              </a:spcAft>
-              <a:defRPr sz="600">
-                <a:solidFill>
-                  <a:srgbClr val="323232"/>
-                </a:solidFill>
-              </a:defRPr>
-            </a:pPr>
-            <a:r>
-              <a:t>Unit Economics: Avg $15/service, 30% margin ($4-5), Target 10K/day</a:t>
-            </a:r>
-          </a:p>
-          <a:p>
-            <a:pPr>
-              <a:spcAft>
-                <a:spcPts val="100"/>
-              </a:spcAft>
-              <a:defRPr sz="600">
-                <a:solidFill>
-                  <a:srgbClr val="323232"/>
-                </a:solidFill>
-              </a:defRPr>
-            </a:pPr>
-            <a:r>
-              <a:t>Projections: Y1 $1.2M → Y2 $5.5M → Y3 $15M | TAM 2032: $5.5B</a:t>
             </a:r>
           </a:p>
         </p:txBody>

</xml_diff>